<commit_message>
Updated car loan image to show how things are calculated
</commit_message>
<xml_diff>
--- a/Finance/loans.pptx
+++ b/Finance/loans.pptx
@@ -245,7 +245,7 @@
           <a:p>
             <a:fld id="{855B1FBD-4CDE-074D-957F-E13CC52E1F54}" type="datetimeFigureOut">
               <a:rPr lang="en-US" smtClean="0"/>
-              <a:t>11/27/18</a:t>
+              <a:t>11/28/18</a:t>
             </a:fld>
             <a:endParaRPr lang="en-US"/>
           </a:p>
@@ -415,7 +415,7 @@
           <a:p>
             <a:fld id="{855B1FBD-4CDE-074D-957F-E13CC52E1F54}" type="datetimeFigureOut">
               <a:rPr lang="en-US" smtClean="0"/>
-              <a:t>11/27/18</a:t>
+              <a:t>11/28/18</a:t>
             </a:fld>
             <a:endParaRPr lang="en-US"/>
           </a:p>
@@ -595,7 +595,7 @@
           <a:p>
             <a:fld id="{855B1FBD-4CDE-074D-957F-E13CC52E1F54}" type="datetimeFigureOut">
               <a:rPr lang="en-US" smtClean="0"/>
-              <a:t>11/27/18</a:t>
+              <a:t>11/28/18</a:t>
             </a:fld>
             <a:endParaRPr lang="en-US"/>
           </a:p>
@@ -765,7 +765,7 @@
           <a:p>
             <a:fld id="{855B1FBD-4CDE-074D-957F-E13CC52E1F54}" type="datetimeFigureOut">
               <a:rPr lang="en-US" smtClean="0"/>
-              <a:t>11/27/18</a:t>
+              <a:t>11/28/18</a:t>
             </a:fld>
             <a:endParaRPr lang="en-US"/>
           </a:p>
@@ -1011,7 +1011,7 @@
           <a:p>
             <a:fld id="{855B1FBD-4CDE-074D-957F-E13CC52E1F54}" type="datetimeFigureOut">
               <a:rPr lang="en-US" smtClean="0"/>
-              <a:t>11/27/18</a:t>
+              <a:t>11/28/18</a:t>
             </a:fld>
             <a:endParaRPr lang="en-US"/>
           </a:p>
@@ -1243,7 +1243,7 @@
           <a:p>
             <a:fld id="{855B1FBD-4CDE-074D-957F-E13CC52E1F54}" type="datetimeFigureOut">
               <a:rPr lang="en-US" smtClean="0"/>
-              <a:t>11/27/18</a:t>
+              <a:t>11/28/18</a:t>
             </a:fld>
             <a:endParaRPr lang="en-US"/>
           </a:p>
@@ -1610,7 +1610,7 @@
           <a:p>
             <a:fld id="{855B1FBD-4CDE-074D-957F-E13CC52E1F54}" type="datetimeFigureOut">
               <a:rPr lang="en-US" smtClean="0"/>
-              <a:t>11/27/18</a:t>
+              <a:t>11/28/18</a:t>
             </a:fld>
             <a:endParaRPr lang="en-US"/>
           </a:p>
@@ -1728,7 +1728,7 @@
           <a:p>
             <a:fld id="{855B1FBD-4CDE-074D-957F-E13CC52E1F54}" type="datetimeFigureOut">
               <a:rPr lang="en-US" smtClean="0"/>
-              <a:t>11/27/18</a:t>
+              <a:t>11/28/18</a:t>
             </a:fld>
             <a:endParaRPr lang="en-US"/>
           </a:p>
@@ -1823,7 +1823,7 @@
           <a:p>
             <a:fld id="{855B1FBD-4CDE-074D-957F-E13CC52E1F54}" type="datetimeFigureOut">
               <a:rPr lang="en-US" smtClean="0"/>
-              <a:t>11/27/18</a:t>
+              <a:t>11/28/18</a:t>
             </a:fld>
             <a:endParaRPr lang="en-US"/>
           </a:p>
@@ -2100,7 +2100,7 @@
           <a:p>
             <a:fld id="{855B1FBD-4CDE-074D-957F-E13CC52E1F54}" type="datetimeFigureOut">
               <a:rPr lang="en-US" smtClean="0"/>
-              <a:t>11/27/18</a:t>
+              <a:t>11/28/18</a:t>
             </a:fld>
             <a:endParaRPr lang="en-US"/>
           </a:p>
@@ -2353,7 +2353,7 @@
           <a:p>
             <a:fld id="{855B1FBD-4CDE-074D-957F-E13CC52E1F54}" type="datetimeFigureOut">
               <a:rPr lang="en-US" smtClean="0"/>
-              <a:t>11/27/18</a:t>
+              <a:t>11/28/18</a:t>
             </a:fld>
             <a:endParaRPr lang="en-US"/>
           </a:p>
@@ -2566,7 +2566,7 @@
           <a:p>
             <a:fld id="{855B1FBD-4CDE-074D-957F-E13CC52E1F54}" type="datetimeFigureOut">
               <a:rPr lang="en-US" smtClean="0"/>
-              <a:t>11/27/18</a:t>
+              <a:t>11/28/18</a:t>
             </a:fld>
             <a:endParaRPr lang="en-US"/>
           </a:p>
@@ -3406,8 +3406,8 @@
             </p:sp>
           </mc:Fallback>
         </mc:AlternateContent>
-        <mc:AlternateContent xmlns:mc="http://schemas.openxmlformats.org/markup-compatibility/2006">
-          <mc:Choice xmlns:a14="http://schemas.microsoft.com/office/drawing/2010/main" Requires="a14">
+        <mc:AlternateContent xmlns:mc="http://schemas.openxmlformats.org/markup-compatibility/2006" xmlns:a14="http://schemas.microsoft.com/office/drawing/2010/main">
+          <mc:Choice Requires="a14">
             <p:sp>
               <p:nvSpPr>
                 <p:cNvPr id="4" name="Rectangle 3"/>
@@ -3466,26 +3466,13 @@
                 <a:p>
                   <a:r>
                     <a:rPr lang="en-US" sz="3000" dirty="0" smtClean="0"/>
-                    <a:t>n = </a:t>
+                    <a:t>n = term (number of payments)</a:t>
                   </a:r>
-                  <a:r>
-                    <a:rPr lang="en-US" sz="3000" dirty="0" smtClean="0"/>
-                    <a:t>term (number </a:t>
-                  </a:r>
-                  <a:r>
-                    <a:rPr lang="en-US" sz="3000" dirty="0" smtClean="0"/>
-                    <a:t>of </a:t>
-                  </a:r>
-                  <a:r>
-                    <a:rPr lang="en-US" sz="3000" dirty="0" smtClean="0"/>
-                    <a:t>payments)</a:t>
-                  </a:r>
-                  <a:endParaRPr lang="en-US" sz="3000" dirty="0" smtClean="0"/>
                 </a:p>
               </p:txBody>
             </p:sp>
           </mc:Choice>
-          <mc:Fallback>
+          <mc:Fallback xmlns="">
             <p:sp>
               <p:nvSpPr>
                 <p:cNvPr id="4" name="Rectangle 3"/>
@@ -3555,80 +3542,408 @@
           <a:chExt cx="0" cy="0"/>
         </a:xfrm>
       </p:grpSpPr>
-      <p:pic>
-        <p:nvPicPr>
-          <p:cNvPr id="7" name="Picture 6"/>
-          <p:cNvPicPr>
-            <a:picLocks noChangeAspect="1"/>
-          </p:cNvPicPr>
+      <p:grpSp>
+        <p:nvGrpSpPr>
+          <p:cNvPr id="13" name="Group 12"/>
+          <p:cNvGrpSpPr/>
           <p:nvPr/>
-        </p:nvPicPr>
-        <p:blipFill>
-          <a:blip r:embed="rId2">
-            <a:extLst>
-              <a:ext uri="{28A0092B-C50C-407E-A947-70E740481C1C}">
-                <a14:useLocalDpi xmlns:a14="http://schemas.microsoft.com/office/drawing/2010/main" val="0"/>
-              </a:ext>
-            </a:extLst>
-          </a:blip>
-          <a:stretch>
-            <a:fillRect/>
-          </a:stretch>
-        </p:blipFill>
-        <p:spPr>
+        </p:nvGrpSpPr>
+        <p:grpSpPr>
           <a:xfrm>
-            <a:off x="6217920" y="0"/>
-            <a:ext cx="6858000" cy="6858000"/>
+            <a:off x="-707739" y="-74652"/>
+            <a:ext cx="12575889" cy="6273723"/>
+            <a:chOff x="-707739" y="-74652"/>
+            <a:chExt cx="12575889" cy="6273723"/>
           </a:xfrm>
-          <a:prstGeom prst="rect">
-            <a:avLst/>
-          </a:prstGeom>
-        </p:spPr>
-      </p:pic>
-      <mc:AlternateContent xmlns:mc="http://schemas.openxmlformats.org/markup-compatibility/2006">
-        <mc:Choice xmlns:a14="http://schemas.microsoft.com/office/drawing/2010/main" Requires="a14">
-          <p:sp>
-            <p:nvSpPr>
-              <p:cNvPr id="10" name="TextBox 9"/>
-              <p:cNvSpPr txBox="1"/>
-              <p:nvPr/>
-            </p:nvSpPr>
-            <p:spPr>
-              <a:xfrm>
-                <a:off x="155200" y="995433"/>
-                <a:ext cx="5885009" cy="1854547"/>
-              </a:xfrm>
-              <a:prstGeom prst="rect">
-                <a:avLst/>
-              </a:prstGeom>
-              <a:noFill/>
-            </p:spPr>
-            <p:txBody>
-              <a:bodyPr wrap="square" rtlCol="0">
-                <a:spAutoFit/>
-              </a:bodyPr>
-              <a:lstStyle/>
-              <a:p>
-                <a:pPr/>
-                <a14:m>
-                  <m:oMathPara xmlns:m="http://schemas.openxmlformats.org/officeDocument/2006/math">
-                    <m:oMathParaPr>
-                      <m:jc m:val="centerGroup"/>
-                    </m:oMathParaPr>
+        </p:grpSpPr>
+        <mc:AlternateContent xmlns:mc="http://schemas.openxmlformats.org/markup-compatibility/2006">
+          <mc:Choice xmlns:a14="http://schemas.microsoft.com/office/drawing/2010/main" Requires="a14">
+            <p:sp>
+              <p:nvSpPr>
+                <p:cNvPr id="10" name="TextBox 9"/>
+                <p:cNvSpPr txBox="1"/>
+                <p:nvPr/>
+              </p:nvSpPr>
+              <p:spPr>
+                <a:xfrm>
+                  <a:off x="155200" y="995433"/>
+                  <a:ext cx="5885009" cy="1854547"/>
+                </a:xfrm>
+                <a:prstGeom prst="rect">
+                  <a:avLst/>
+                </a:prstGeom>
+                <a:noFill/>
+              </p:spPr>
+              <p:txBody>
+                <a:bodyPr wrap="square" rtlCol="0">
+                  <a:spAutoFit/>
+                </a:bodyPr>
+                <a:lstStyle/>
+                <a:p>
+                  <a:pPr/>
+                  <a14:m>
+                    <m:oMathPara xmlns:m="http://schemas.openxmlformats.org/officeDocument/2006/math">
+                      <m:oMathParaPr>
+                        <m:jc m:val="centerGroup"/>
+                      </m:oMathParaPr>
+                      <m:oMath xmlns:m="http://schemas.openxmlformats.org/officeDocument/2006/math">
+                        <m:r>
+                          <m:rPr>
+                            <m:sty m:val="p"/>
+                          </m:rPr>
+                          <a:rPr lang="en-US" sz="5500" b="0" i="0" smtClean="0">
+                            <a:latin typeface="Cambria Math" charset="0"/>
+                            <a:ea typeface="Cambria Math" charset="0"/>
+                            <a:cs typeface="Cambria Math" charset="0"/>
+                          </a:rPr>
+                          <m:t>P</m:t>
+                        </m:r>
+                        <m:r>
+                          <a:rPr lang="en-US" sz="5500" b="0" i="1" smtClean="0">
+                            <a:latin typeface="Cambria Math" charset="0"/>
+                            <a:ea typeface="Cambria Math" charset="0"/>
+                            <a:cs typeface="Cambria Math" charset="0"/>
+                          </a:rPr>
+                          <m:t> ∗ </m:t>
+                        </m:r>
+                        <m:f>
+                          <m:fPr>
+                            <m:ctrlPr>
+                              <a:rPr lang="mr-IN" sz="5500" b="0" i="1" smtClean="0">
+                                <a:latin typeface="Cambria Math" charset="0"/>
+                                <a:ea typeface="Cambria Math" charset="0"/>
+                                <a:cs typeface="Cambria Math" charset="0"/>
+                              </a:rPr>
+                            </m:ctrlPr>
+                          </m:fPr>
+                          <m:num>
+                            <m:r>
+                              <m:rPr>
+                                <m:sty m:val="p"/>
+                              </m:rPr>
+                              <a:rPr lang="en-US" sz="5500" b="0" i="0" smtClean="0">
+                                <a:latin typeface="Cambria Math" charset="0"/>
+                                <a:ea typeface="Cambria Math" charset="0"/>
+                                <a:cs typeface="Cambria Math" charset="0"/>
+                              </a:rPr>
+                              <m:t>r</m:t>
+                            </m:r>
+                            <m:d>
+                              <m:dPr>
+                                <m:ctrlPr>
+                                  <a:rPr lang="en-US" sz="5500" b="0" i="1" smtClean="0">
+                                    <a:latin typeface="Cambria Math" charset="0"/>
+                                    <a:ea typeface="Cambria Math" charset="0"/>
+                                    <a:cs typeface="Cambria Math" charset="0"/>
+                                  </a:rPr>
+                                </m:ctrlPr>
+                              </m:dPr>
+                              <m:e>
+                                <m:r>
+                                  <a:rPr lang="en-US" sz="5500" b="0" i="0" smtClean="0">
+                                    <a:latin typeface="Cambria Math" charset="0"/>
+                                    <a:ea typeface="Cambria Math" charset="0"/>
+                                    <a:cs typeface="Cambria Math" charset="0"/>
+                                  </a:rPr>
+                                  <m:t>1+</m:t>
+                                </m:r>
+                                <m:r>
+                                  <m:rPr>
+                                    <m:sty m:val="p"/>
+                                  </m:rPr>
+                                  <a:rPr lang="en-US" sz="5500" b="0" i="0" smtClean="0">
+                                    <a:latin typeface="Cambria Math" charset="0"/>
+                                    <a:ea typeface="Cambria Math" charset="0"/>
+                                    <a:cs typeface="Cambria Math" charset="0"/>
+                                  </a:rPr>
+                                  <m:t>r</m:t>
+                                </m:r>
+                              </m:e>
+                            </m:d>
+                            <m:r>
+                              <a:rPr lang="en-US" sz="5500" b="0" i="1" baseline="30000" smtClean="0">
+                                <a:latin typeface="Cambria Math" charset="0"/>
+                                <a:ea typeface="Cambria Math" charset="0"/>
+                                <a:cs typeface="Cambria Math" charset="0"/>
+                              </a:rPr>
+                              <m:t>𝑛</m:t>
+                            </m:r>
+                            <m:r>
+                              <a:rPr lang="en-US" sz="5500" b="0" i="1" smtClean="0">
+                                <a:latin typeface="Cambria Math" charset="0"/>
+                                <a:ea typeface="Cambria Math" charset="0"/>
+                                <a:cs typeface="Cambria Math" charset="0"/>
+                              </a:rPr>
+                              <m:t> </m:t>
+                            </m:r>
+                          </m:num>
+                          <m:den>
+                            <m:d>
+                              <m:dPr>
+                                <m:ctrlPr>
+                                  <a:rPr lang="en-US" sz="5500" b="0" i="1" smtClean="0">
+                                    <a:latin typeface="Cambria Math" charset="0"/>
+                                    <a:ea typeface="Cambria Math" charset="0"/>
+                                    <a:cs typeface="Cambria Math" charset="0"/>
+                                  </a:rPr>
+                                </m:ctrlPr>
+                              </m:dPr>
+                              <m:e>
+                                <m:r>
+                                  <a:rPr lang="en-US" sz="5500" b="0" i="0" smtClean="0">
+                                    <a:latin typeface="Cambria Math" charset="0"/>
+                                    <a:ea typeface="Cambria Math" charset="0"/>
+                                    <a:cs typeface="Cambria Math" charset="0"/>
+                                  </a:rPr>
+                                  <m:t>1+</m:t>
+                                </m:r>
+                                <m:r>
+                                  <m:rPr>
+                                    <m:sty m:val="p"/>
+                                  </m:rPr>
+                                  <a:rPr lang="en-US" sz="5500" b="0" i="0" smtClean="0">
+                                    <a:latin typeface="Cambria Math" charset="0"/>
+                                    <a:ea typeface="Cambria Math" charset="0"/>
+                                    <a:cs typeface="Cambria Math" charset="0"/>
+                                  </a:rPr>
+                                  <m:t>r</m:t>
+                                </m:r>
+                              </m:e>
+                            </m:d>
+                            <m:r>
+                              <a:rPr lang="en-US" sz="5500" b="0" i="1" baseline="30000" smtClean="0">
+                                <a:latin typeface="Cambria Math" charset="0"/>
+                                <a:ea typeface="Cambria Math" charset="0"/>
+                                <a:cs typeface="Cambria Math" charset="0"/>
+                              </a:rPr>
+                              <m:t>𝑛</m:t>
+                            </m:r>
+                            <m:r>
+                              <a:rPr lang="en-US" sz="5500" b="0" i="1" smtClean="0">
+                                <a:latin typeface="Cambria Math" charset="0"/>
+                                <a:ea typeface="Cambria Math" charset="0"/>
+                                <a:cs typeface="Cambria Math" charset="0"/>
+                              </a:rPr>
+                              <m:t>−1</m:t>
+                            </m:r>
+                          </m:den>
+                        </m:f>
+                      </m:oMath>
+                    </m:oMathPara>
+                  </a14:m>
+                  <a:endParaRPr lang="en-US" sz="5500" dirty="0">
+                    <a:latin typeface="Cambria Math" charset="0"/>
+                    <a:ea typeface="Cambria Math" charset="0"/>
+                    <a:cs typeface="Cambria Math" charset="0"/>
+                  </a:endParaRPr>
+                </a:p>
+              </p:txBody>
+            </p:sp>
+          </mc:Choice>
+          <mc:Fallback>
+            <p:sp>
+              <p:nvSpPr>
+                <p:cNvPr id="10" name="TextBox 9"/>
+                <p:cNvSpPr txBox="1">
+                  <a:spLocks noRot="1" noChangeAspect="1" noMove="1" noResize="1" noEditPoints="1" noAdjustHandles="1" noChangeArrowheads="1" noChangeShapeType="1" noTextEdit="1"/>
+                </p:cNvSpPr>
+                <p:nvPr/>
+              </p:nvSpPr>
+              <p:spPr>
+                <a:xfrm>
+                  <a:off x="155200" y="995433"/>
+                  <a:ext cx="5885009" cy="1854547"/>
+                </a:xfrm>
+                <a:prstGeom prst="rect">
+                  <a:avLst/>
+                </a:prstGeom>
+                <a:blipFill rotWithShape="0">
+                  <a:blip r:embed="rId2"/>
+                  <a:stretch>
+                    <a:fillRect/>
+                  </a:stretch>
+                </a:blipFill>
+              </p:spPr>
+              <p:txBody>
+                <a:bodyPr/>
+                <a:lstStyle/>
+                <a:p>
+                  <a:r>
+                    <a:rPr lang="en-US">
+                      <a:noFill/>
+                    </a:rPr>
+                    <a:t> </a:t>
+                  </a:r>
+                </a:p>
+              </p:txBody>
+            </p:sp>
+          </mc:Fallback>
+        </mc:AlternateContent>
+        <p:sp>
+          <p:nvSpPr>
+            <p:cNvPr id="5" name="TextBox 4"/>
+            <p:cNvSpPr txBox="1"/>
+            <p:nvPr/>
+          </p:nvSpPr>
+          <p:spPr>
+            <a:xfrm>
+              <a:off x="6645561" y="-74652"/>
+              <a:ext cx="4937760" cy="646331"/>
+            </a:xfrm>
+            <a:prstGeom prst="rect">
+              <a:avLst/>
+            </a:prstGeom>
+            <a:noFill/>
+          </p:spPr>
+          <p:txBody>
+            <a:bodyPr wrap="square" rtlCol="0">
+              <a:spAutoFit/>
+            </a:bodyPr>
+            <a:lstStyle/>
+            <a:p>
+              <a:r>
+                <a:rPr lang="en-US" sz="3600" b="1" dirty="0" smtClean="0"/>
+                <a:t>Python Calculation</a:t>
+              </a:r>
+              <a:endParaRPr lang="en-US" sz="3600" b="1" dirty="0"/>
+            </a:p>
+          </p:txBody>
+        </p:sp>
+        <p:sp>
+          <p:nvSpPr>
+            <p:cNvPr id="6" name="TextBox 5"/>
+            <p:cNvSpPr txBox="1"/>
+            <p:nvPr/>
+          </p:nvSpPr>
+          <p:spPr>
+            <a:xfrm>
+              <a:off x="-707739" y="3273734"/>
+              <a:ext cx="4937760" cy="646331"/>
+            </a:xfrm>
+            <a:prstGeom prst="rect">
+              <a:avLst/>
+            </a:prstGeom>
+            <a:noFill/>
+          </p:spPr>
+          <p:txBody>
+            <a:bodyPr wrap="square" rtlCol="0">
+              <a:spAutoFit/>
+            </a:bodyPr>
+            <a:lstStyle/>
+            <a:p>
+              <a:r>
+                <a:rPr lang="en-US" sz="3600" b="1" dirty="0" smtClean="0"/>
+                <a:t>Calculation</a:t>
+              </a:r>
+              <a:endParaRPr lang="en-US" sz="3600" b="1" dirty="0"/>
+            </a:p>
+          </p:txBody>
+        </p:sp>
+        <p:pic>
+          <p:nvPicPr>
+            <p:cNvPr id="11" name="Picture 10"/>
+            <p:cNvPicPr>
+              <a:picLocks noChangeAspect="1"/>
+            </p:cNvPicPr>
+            <p:nvPr/>
+          </p:nvPicPr>
+          <p:blipFill>
+            <a:blip r:embed="rId3">
+              <a:extLst>
+                <a:ext uri="{28A0092B-C50C-407E-A947-70E740481C1C}">
+                  <a14:useLocalDpi xmlns:a14="http://schemas.microsoft.com/office/drawing/2010/main" val="0"/>
+                </a:ext>
+              </a:extLst>
+            </a:blip>
+            <a:stretch>
+              <a:fillRect/>
+            </a:stretch>
+          </p:blipFill>
+          <p:spPr>
+            <a:xfrm>
+              <a:off x="8323193" y="769265"/>
+              <a:ext cx="3260128" cy="2504469"/>
+            </a:xfrm>
+            <a:prstGeom prst="rect">
+              <a:avLst/>
+            </a:prstGeom>
+          </p:spPr>
+        </p:pic>
+        <p:sp>
+          <p:nvSpPr>
+            <p:cNvPr id="12" name="TextBox 11"/>
+            <p:cNvSpPr txBox="1"/>
+            <p:nvPr/>
+          </p:nvSpPr>
+          <p:spPr>
+            <a:xfrm>
+              <a:off x="-707739" y="-74652"/>
+              <a:ext cx="4937760" cy="646331"/>
+            </a:xfrm>
+            <a:prstGeom prst="rect">
+              <a:avLst/>
+            </a:prstGeom>
+            <a:noFill/>
+          </p:spPr>
+          <p:txBody>
+            <a:bodyPr wrap="square" rtlCol="0">
+              <a:spAutoFit/>
+            </a:bodyPr>
+            <a:lstStyle/>
+            <a:p>
+              <a:r>
+                <a:rPr lang="en-US" sz="3600" b="1" dirty="0" smtClean="0"/>
+                <a:t>EMI Formula</a:t>
+              </a:r>
+              <a:endParaRPr lang="en-US" sz="3600" b="1" dirty="0"/>
+            </a:p>
+          </p:txBody>
+        </p:sp>
+        <mc:AlternateContent xmlns:mc="http://schemas.openxmlformats.org/markup-compatibility/2006">
+          <mc:Choice xmlns:a14="http://schemas.microsoft.com/office/drawing/2010/main" Requires="a14">
+            <p:sp>
+              <p:nvSpPr>
+                <p:cNvPr id="9" name="TextBox 8"/>
+                <p:cNvSpPr txBox="1"/>
+                <p:nvPr/>
+              </p:nvSpPr>
+              <p:spPr>
+                <a:xfrm>
+                  <a:off x="-498189" y="4343820"/>
+                  <a:ext cx="12366339" cy="1855251"/>
+                </a:xfrm>
+                <a:prstGeom prst="rect">
+                  <a:avLst/>
+                </a:prstGeom>
+                <a:noFill/>
+              </p:spPr>
+              <p:txBody>
+                <a:bodyPr wrap="square" rtlCol="0">
+                  <a:spAutoFit/>
+                </a:bodyPr>
+                <a:lstStyle/>
+                <a:p>
+                  <a:pPr algn="ctr"/>
+                  <a14:m>
                     <m:oMath xmlns:m="http://schemas.openxmlformats.org/officeDocument/2006/math">
                       <m:r>
-                        <m:rPr>
-                          <m:sty m:val="p"/>
-                        </m:rPr>
-                        <a:rPr lang="en-US" sz="5500" b="0" i="0" smtClean="0">
+                        <a:rPr lang="en-US" sz="5000" smtClean="0">
                           <a:latin typeface="Cambria Math" charset="0"/>
                           <a:ea typeface="Cambria Math" charset="0"/>
                           <a:cs typeface="Cambria Math" charset="0"/>
                         </a:rPr>
-                        <m:t>P</m:t>
+                        <m:t>(</m:t>
                       </m:r>
                       <m:r>
-                        <a:rPr lang="en-US" sz="5500" b="0" i="1" smtClean="0">
+                        <a:rPr lang="en-US" sz="5000" b="0" i="0" smtClean="0">
+                          <a:latin typeface="Cambria Math" charset="0"/>
+                          <a:ea typeface="Cambria Math" charset="0"/>
+                          <a:cs typeface="Cambria Math" charset="0"/>
+                        </a:rPr>
+                        <m:t>31115 ∗1.075)</m:t>
+                      </m:r>
+                      <m:r>
+                        <a:rPr lang="en-US" sz="5000" b="0" i="1" smtClean="0">
                           <a:latin typeface="Cambria Math" charset="0"/>
                           <a:ea typeface="Cambria Math" charset="0"/>
                           <a:cs typeface="Cambria Math" charset="0"/>
@@ -3638,7 +3953,7 @@
                       <m:f>
                         <m:fPr>
                           <m:ctrlPr>
-                            <a:rPr lang="mr-IN" sz="5500" b="0" i="1" smtClean="0">
+                            <a:rPr lang="mr-IN" sz="5000" b="0" i="1" smtClean="0">
                               <a:latin typeface="Cambria Math" charset="0"/>
                               <a:ea typeface="Cambria Math" charset="0"/>
                               <a:cs typeface="Cambria Math" charset="0"/>
@@ -3646,21 +3961,41 @@
                           </m:ctrlPr>
                         </m:fPr>
                         <m:num>
-                          <m:r>
-                            <m:rPr>
-                              <m:sty m:val="p"/>
-                            </m:rPr>
-                            <a:rPr lang="en-US" sz="5500" b="0" i="0" smtClean="0">
-                              <a:latin typeface="Cambria Math" charset="0"/>
-                              <a:ea typeface="Cambria Math" charset="0"/>
-                              <a:cs typeface="Cambria Math" charset="0"/>
-                            </a:rPr>
-                            <m:t>r</m:t>
-                          </m:r>
+                          <m:f>
+                            <m:fPr>
+                              <m:ctrlPr>
+                                <a:rPr lang="mr-IN" sz="5000" b="0" i="1" smtClean="0">
+                                  <a:latin typeface="Cambria Math" charset="0"/>
+                                  <a:ea typeface="Cambria Math" charset="0"/>
+                                  <a:cs typeface="Cambria Math" charset="0"/>
+                                </a:rPr>
+                              </m:ctrlPr>
+                            </m:fPr>
+                            <m:num>
+                              <m:r>
+                                <a:rPr lang="en-US" sz="5000" b="0" i="1" smtClean="0">
+                                  <a:latin typeface="Cambria Math" charset="0"/>
+                                  <a:ea typeface="Cambria Math" charset="0"/>
+                                  <a:cs typeface="Cambria Math" charset="0"/>
+                                </a:rPr>
+                                <m:t>0.0702</m:t>
+                              </m:r>
+                            </m:num>
+                            <m:den>
+                              <m:r>
+                                <a:rPr lang="en-US" sz="5000" b="0" i="1" smtClean="0">
+                                  <a:latin typeface="Cambria Math" charset="0"/>
+                                  <a:ea typeface="Cambria Math" charset="0"/>
+                                  <a:cs typeface="Cambria Math" charset="0"/>
+                                </a:rPr>
+                                <m:t>12</m:t>
+                              </m:r>
+                            </m:den>
+                          </m:f>
                           <m:d>
                             <m:dPr>
                               <m:ctrlPr>
-                                <a:rPr lang="en-US" sz="5500" b="0" i="1" smtClean="0">
+                                <a:rPr lang="en-US" sz="5000" b="0" i="1" smtClean="0">
                                   <a:latin typeface="Cambria Math" charset="0"/>
                                   <a:ea typeface="Cambria Math" charset="0"/>
                                   <a:cs typeface="Cambria Math" charset="0"/>
@@ -3669,36 +4004,56 @@
                             </m:dPr>
                             <m:e>
                               <m:r>
-                                <a:rPr lang="en-US" sz="5500" b="0" i="0" smtClean="0">
+                                <a:rPr lang="en-US" sz="5000" b="0" i="0" smtClean="0">
                                   <a:latin typeface="Cambria Math" charset="0"/>
                                   <a:ea typeface="Cambria Math" charset="0"/>
                                   <a:cs typeface="Cambria Math" charset="0"/>
                                 </a:rPr>
                                 <m:t>1+</m:t>
                               </m:r>
-                              <m:r>
-                                <m:rPr>
-                                  <m:sty m:val="p"/>
-                                </m:rPr>
-                                <a:rPr lang="en-US" sz="5500" b="0" i="0" smtClean="0">
-                                  <a:latin typeface="Cambria Math" charset="0"/>
-                                  <a:ea typeface="Cambria Math" charset="0"/>
-                                  <a:cs typeface="Cambria Math" charset="0"/>
-                                </a:rPr>
-                                <m:t>r</m:t>
-                              </m:r>
+                              <m:f>
+                                <m:fPr>
+                                  <m:ctrlPr>
+                                    <a:rPr lang="mr-IN" sz="5000" b="0" i="1" smtClean="0">
+                                      <a:latin typeface="Cambria Math" charset="0"/>
+                                      <a:ea typeface="Cambria Math" charset="0"/>
+                                      <a:cs typeface="Cambria Math" charset="0"/>
+                                    </a:rPr>
+                                  </m:ctrlPr>
+                                </m:fPr>
+                                <m:num>
+                                  <m:r>
+                                    <a:rPr lang="en-US" sz="5000" b="0" i="1" smtClean="0">
+                                      <a:latin typeface="Cambria Math" charset="0"/>
+                                      <a:ea typeface="Cambria Math" charset="0"/>
+                                      <a:cs typeface="Cambria Math" charset="0"/>
+                                    </a:rPr>
+                                    <m:t>0.0702</m:t>
+                                  </m:r>
+                                </m:num>
+                                <m:den>
+                                  <m:r>
+                                    <a:rPr lang="en-US" sz="5000" b="0" i="1" smtClean="0">
+                                      <a:latin typeface="Cambria Math" charset="0"/>
+                                      <a:ea typeface="Cambria Math" charset="0"/>
+                                      <a:cs typeface="Cambria Math" charset="0"/>
+                                    </a:rPr>
+                                    <m:t>12</m:t>
+                                  </m:r>
+                                </m:den>
+                              </m:f>
                             </m:e>
                           </m:d>
                           <m:r>
-                            <a:rPr lang="en-US" sz="5500" b="0" i="1" baseline="30000" smtClean="0">
+                            <a:rPr lang="en-US" sz="5000" b="0" i="1" baseline="30000" smtClean="0">
                               <a:latin typeface="Cambria Math" charset="0"/>
                               <a:ea typeface="Cambria Math" charset="0"/>
                               <a:cs typeface="Cambria Math" charset="0"/>
                             </a:rPr>
-                            <m:t>𝑛</m:t>
+                            <m:t>60</m:t>
                           </m:r>
                           <m:r>
-                            <a:rPr lang="en-US" sz="5500" b="0" i="1" smtClean="0">
+                            <a:rPr lang="en-US" sz="5000" b="0" i="1" smtClean="0">
                               <a:latin typeface="Cambria Math" charset="0"/>
                               <a:ea typeface="Cambria Math" charset="0"/>
                               <a:cs typeface="Cambria Math" charset="0"/>
@@ -3710,7 +4065,7 @@
                           <m:d>
                             <m:dPr>
                               <m:ctrlPr>
-                                <a:rPr lang="en-US" sz="5500" b="0" i="1" smtClean="0">
+                                <a:rPr lang="en-US" sz="5000" b="0" i="1" smtClean="0">
                                   <a:latin typeface="Cambria Math" charset="0"/>
                                   <a:ea typeface="Cambria Math" charset="0"/>
                                   <a:cs typeface="Cambria Math" charset="0"/>
@@ -3719,36 +4074,56 @@
                             </m:dPr>
                             <m:e>
                               <m:r>
-                                <a:rPr lang="en-US" sz="5500" b="0" i="0" smtClean="0">
+                                <a:rPr lang="en-US" sz="5000" b="0" i="0" smtClean="0">
                                   <a:latin typeface="Cambria Math" charset="0"/>
                                   <a:ea typeface="Cambria Math" charset="0"/>
                                   <a:cs typeface="Cambria Math" charset="0"/>
                                 </a:rPr>
                                 <m:t>1+</m:t>
                               </m:r>
-                              <m:r>
-                                <m:rPr>
-                                  <m:sty m:val="p"/>
-                                </m:rPr>
-                                <a:rPr lang="en-US" sz="5500" b="0" i="0" smtClean="0">
-                                  <a:latin typeface="Cambria Math" charset="0"/>
-                                  <a:ea typeface="Cambria Math" charset="0"/>
-                                  <a:cs typeface="Cambria Math" charset="0"/>
-                                </a:rPr>
-                                <m:t>r</m:t>
-                              </m:r>
+                              <m:f>
+                                <m:fPr>
+                                  <m:ctrlPr>
+                                    <a:rPr lang="mr-IN" sz="5000" b="0" i="1" smtClean="0">
+                                      <a:latin typeface="Cambria Math" charset="0"/>
+                                      <a:ea typeface="Cambria Math" charset="0"/>
+                                      <a:cs typeface="Cambria Math" charset="0"/>
+                                    </a:rPr>
+                                  </m:ctrlPr>
+                                </m:fPr>
+                                <m:num>
+                                  <m:r>
+                                    <a:rPr lang="en-US" sz="5000" b="0" i="1" smtClean="0">
+                                      <a:latin typeface="Cambria Math" charset="0"/>
+                                      <a:ea typeface="Cambria Math" charset="0"/>
+                                      <a:cs typeface="Cambria Math" charset="0"/>
+                                    </a:rPr>
+                                    <m:t>0.0702</m:t>
+                                  </m:r>
+                                </m:num>
+                                <m:den>
+                                  <m:r>
+                                    <a:rPr lang="en-US" sz="5000" b="0" i="1" smtClean="0">
+                                      <a:latin typeface="Cambria Math" charset="0"/>
+                                      <a:ea typeface="Cambria Math" charset="0"/>
+                                      <a:cs typeface="Cambria Math" charset="0"/>
+                                    </a:rPr>
+                                    <m:t>12</m:t>
+                                  </m:r>
+                                </m:den>
+                              </m:f>
                             </m:e>
                           </m:d>
                           <m:r>
-                            <a:rPr lang="en-US" sz="5500" b="0" i="1" baseline="30000" smtClean="0">
+                            <a:rPr lang="en-US" sz="5000" b="0" i="1" baseline="30000" smtClean="0">
                               <a:latin typeface="Cambria Math" charset="0"/>
                               <a:ea typeface="Cambria Math" charset="0"/>
                               <a:cs typeface="Cambria Math" charset="0"/>
                             </a:rPr>
-                            <m:t>𝑛</m:t>
+                            <m:t>60</m:t>
                           </m:r>
                           <m:r>
-                            <a:rPr lang="en-US" sz="5500" b="0" i="1" smtClean="0">
+                            <a:rPr lang="en-US" sz="5000" b="0" i="1" smtClean="0">
                               <a:latin typeface="Cambria Math" charset="0"/>
                               <a:ea typeface="Cambria Math" charset="0"/>
                               <a:cs typeface="Cambria Math" charset="0"/>
@@ -3758,176 +4133,59 @@
                         </m:den>
                       </m:f>
                     </m:oMath>
-                  </m:oMathPara>
-                </a14:m>
-                <a:endParaRPr lang="en-US" sz="5500" dirty="0">
-                  <a:latin typeface="Cambria Math" charset="0"/>
-                  <a:ea typeface="Cambria Math" charset="0"/>
-                  <a:cs typeface="Cambria Math" charset="0"/>
-                </a:endParaRPr>
-              </a:p>
-            </p:txBody>
-          </p:sp>
-        </mc:Choice>
-        <mc:Fallback>
-          <p:sp>
-            <p:nvSpPr>
-              <p:cNvPr id="10" name="TextBox 9"/>
-              <p:cNvSpPr txBox="1">
-                <a:spLocks noRot="1" noChangeAspect="1" noMove="1" noResize="1" noEditPoints="1" noAdjustHandles="1" noChangeArrowheads="1" noChangeShapeType="1" noTextEdit="1"/>
-              </p:cNvSpPr>
-              <p:nvPr/>
-            </p:nvSpPr>
-            <p:spPr>
-              <a:xfrm>
-                <a:off x="155200" y="995433"/>
-                <a:ext cx="5885009" cy="1854547"/>
-              </a:xfrm>
-              <a:prstGeom prst="rect">
-                <a:avLst/>
-              </a:prstGeom>
-              <a:blipFill rotWithShape="0">
-                <a:blip r:embed="rId3"/>
-                <a:stretch>
-                  <a:fillRect/>
-                </a:stretch>
-              </a:blipFill>
-            </p:spPr>
-            <p:txBody>
-              <a:bodyPr/>
-              <a:lstStyle/>
-              <a:p>
-                <a:r>
-                  <a:rPr lang="en-US">
-                    <a:noFill/>
-                  </a:rPr>
-                  <a:t> </a:t>
-                </a:r>
-              </a:p>
-            </p:txBody>
-          </p:sp>
-        </mc:Fallback>
-      </mc:AlternateContent>
-      <p:sp>
-        <p:nvSpPr>
-          <p:cNvPr id="5" name="TextBox 4"/>
-          <p:cNvSpPr txBox="1"/>
-          <p:nvPr/>
-        </p:nvSpPr>
-        <p:spPr>
-          <a:xfrm>
-            <a:off x="6283611" y="97646"/>
-            <a:ext cx="4937760" cy="646331"/>
-          </a:xfrm>
-          <a:prstGeom prst="rect">
-            <a:avLst/>
-          </a:prstGeom>
-          <a:noFill/>
-        </p:spPr>
-        <p:txBody>
-          <a:bodyPr wrap="square" rtlCol="0">
-            <a:spAutoFit/>
-          </a:bodyPr>
-          <a:lstStyle/>
-          <a:p>
-            <a:r>
-              <a:rPr lang="en-US" sz="3600" b="1" dirty="0" smtClean="0"/>
-              <a:t>Calculation</a:t>
-            </a:r>
-            <a:endParaRPr lang="en-US" sz="3600" b="1" dirty="0"/>
-          </a:p>
-        </p:txBody>
-      </p:sp>
-      <p:sp>
-        <p:nvSpPr>
-          <p:cNvPr id="6" name="TextBox 5"/>
-          <p:cNvSpPr txBox="1"/>
-          <p:nvPr/>
-        </p:nvSpPr>
-        <p:spPr>
-          <a:xfrm>
-            <a:off x="-860139" y="3253839"/>
-            <a:ext cx="4937760" cy="646331"/>
-          </a:xfrm>
-          <a:prstGeom prst="rect">
-            <a:avLst/>
-          </a:prstGeom>
-          <a:noFill/>
-        </p:spPr>
-        <p:txBody>
-          <a:bodyPr wrap="square" rtlCol="0">
-            <a:spAutoFit/>
-          </a:bodyPr>
-          <a:lstStyle/>
-          <a:p>
-            <a:r>
-              <a:rPr lang="en-US" sz="3600" b="1" dirty="0" smtClean="0"/>
-              <a:t>Python Calculation</a:t>
-            </a:r>
-            <a:endParaRPr lang="en-US" sz="3600" b="1" dirty="0"/>
-          </a:p>
-        </p:txBody>
-      </p:sp>
-      <p:pic>
-        <p:nvPicPr>
-          <p:cNvPr id="11" name="Picture 10"/>
-          <p:cNvPicPr>
-            <a:picLocks noChangeAspect="1"/>
-          </p:cNvPicPr>
-          <p:nvPr/>
-        </p:nvPicPr>
-        <p:blipFill>
-          <a:blip r:embed="rId4">
-            <a:extLst>
-              <a:ext uri="{28A0092B-C50C-407E-A947-70E740481C1C}">
-                <a14:useLocalDpi xmlns:a14="http://schemas.microsoft.com/office/drawing/2010/main" val="0"/>
-              </a:ext>
-            </a:extLst>
-          </a:blip>
-          <a:stretch>
-            <a:fillRect/>
-          </a:stretch>
-        </p:blipFill>
-        <p:spPr>
-          <a:xfrm>
-            <a:off x="1152549" y="3904488"/>
-            <a:ext cx="3890309" cy="2953512"/>
-          </a:xfrm>
-          <a:prstGeom prst="rect">
-            <a:avLst/>
-          </a:prstGeom>
-        </p:spPr>
-      </p:pic>
-      <p:sp>
-        <p:nvSpPr>
-          <p:cNvPr id="12" name="TextBox 11"/>
-          <p:cNvSpPr txBox="1"/>
-          <p:nvPr/>
-        </p:nvSpPr>
-        <p:spPr>
-          <a:xfrm>
-            <a:off x="-707739" y="97646"/>
-            <a:ext cx="4937760" cy="646331"/>
-          </a:xfrm>
-          <a:prstGeom prst="rect">
-            <a:avLst/>
-          </a:prstGeom>
-          <a:noFill/>
-        </p:spPr>
-        <p:txBody>
-          <a:bodyPr wrap="square" rtlCol="0">
-            <a:spAutoFit/>
-          </a:bodyPr>
-          <a:lstStyle/>
-          <a:p>
-            <a:r>
-              <a:rPr lang="en-US" sz="3600" b="1" dirty="0" smtClean="0"/>
-              <a:t>EMI Formula</a:t>
-            </a:r>
-            <a:endParaRPr lang="en-US" sz="3600" b="1" dirty="0"/>
-          </a:p>
-        </p:txBody>
-      </p:sp>
+                  </a14:m>
+                  <a:r>
+                    <a:rPr lang="en-US" sz="5000" dirty="0" smtClean="0">
+                      <a:latin typeface="Cambria Math" charset="0"/>
+                      <a:ea typeface="Cambria Math" charset="0"/>
+                      <a:cs typeface="Cambria Math" charset="0"/>
+                    </a:rPr>
+                    <a:t> = 662.64</a:t>
+                  </a:r>
+                </a:p>
+              </p:txBody>
+            </p:sp>
+          </mc:Choice>
+          <mc:Fallback>
+            <p:sp>
+              <p:nvSpPr>
+                <p:cNvPr id="9" name="TextBox 8"/>
+                <p:cNvSpPr txBox="1">
+                  <a:spLocks noRot="1" noChangeAspect="1" noMove="1" noResize="1" noEditPoints="1" noAdjustHandles="1" noChangeArrowheads="1" noChangeShapeType="1" noTextEdit="1"/>
+                </p:cNvSpPr>
+                <p:nvPr/>
+              </p:nvSpPr>
+              <p:spPr>
+                <a:xfrm>
+                  <a:off x="-498189" y="4343820"/>
+                  <a:ext cx="12366339" cy="1855251"/>
+                </a:xfrm>
+                <a:prstGeom prst="rect">
+                  <a:avLst/>
+                </a:prstGeom>
+                <a:blipFill rotWithShape="0">
+                  <a:blip r:embed="rId4"/>
+                  <a:stretch>
+                    <a:fillRect r="-1626"/>
+                  </a:stretch>
+                </a:blipFill>
+              </p:spPr>
+              <p:txBody>
+                <a:bodyPr/>
+                <a:lstStyle/>
+                <a:p>
+                  <a:r>
+                    <a:rPr lang="en-US">
+                      <a:noFill/>
+                    </a:rPr>
+                    <a:t> </a:t>
+                  </a:r>
+                </a:p>
+              </p:txBody>
+            </p:sp>
+          </mc:Fallback>
+        </mc:AlternateContent>
+      </p:grpSp>
     </p:spTree>
     <p:extLst>
       <p:ext uri="{BB962C8B-B14F-4D97-AF65-F5344CB8AC3E}">

</xml_diff>

<commit_message>
Updated car loan for dealing with fees
</commit_message>
<xml_diff>
--- a/Finance/loans.pptx
+++ b/Finance/loans.pptx
@@ -8,6 +8,7 @@
     <p:sldId id="256" r:id="rId2"/>
     <p:sldId id="257" r:id="rId3"/>
     <p:sldId id="258" r:id="rId4"/>
+    <p:sldId id="259" r:id="rId5"/>
   </p:sldIdLst>
   <p:sldSz cx="12192000" cy="6858000"/>
   <p:notesSz cx="6858000" cy="9144000"/>
@@ -245,7 +246,7 @@
           <a:p>
             <a:fld id="{855B1FBD-4CDE-074D-957F-E13CC52E1F54}" type="datetimeFigureOut">
               <a:rPr lang="en-US" smtClean="0"/>
-              <a:t>11/28/18</a:t>
+              <a:t>11/29/18</a:t>
             </a:fld>
             <a:endParaRPr lang="en-US"/>
           </a:p>
@@ -415,7 +416,7 @@
           <a:p>
             <a:fld id="{855B1FBD-4CDE-074D-957F-E13CC52E1F54}" type="datetimeFigureOut">
               <a:rPr lang="en-US" smtClean="0"/>
-              <a:t>11/28/18</a:t>
+              <a:t>11/29/18</a:t>
             </a:fld>
             <a:endParaRPr lang="en-US"/>
           </a:p>
@@ -595,7 +596,7 @@
           <a:p>
             <a:fld id="{855B1FBD-4CDE-074D-957F-E13CC52E1F54}" type="datetimeFigureOut">
               <a:rPr lang="en-US" smtClean="0"/>
-              <a:t>11/28/18</a:t>
+              <a:t>11/29/18</a:t>
             </a:fld>
             <a:endParaRPr lang="en-US"/>
           </a:p>
@@ -765,7 +766,7 @@
           <a:p>
             <a:fld id="{855B1FBD-4CDE-074D-957F-E13CC52E1F54}" type="datetimeFigureOut">
               <a:rPr lang="en-US" smtClean="0"/>
-              <a:t>11/28/18</a:t>
+              <a:t>11/29/18</a:t>
             </a:fld>
             <a:endParaRPr lang="en-US"/>
           </a:p>
@@ -1011,7 +1012,7 @@
           <a:p>
             <a:fld id="{855B1FBD-4CDE-074D-957F-E13CC52E1F54}" type="datetimeFigureOut">
               <a:rPr lang="en-US" smtClean="0"/>
-              <a:t>11/28/18</a:t>
+              <a:t>11/29/18</a:t>
             </a:fld>
             <a:endParaRPr lang="en-US"/>
           </a:p>
@@ -1243,7 +1244,7 @@
           <a:p>
             <a:fld id="{855B1FBD-4CDE-074D-957F-E13CC52E1F54}" type="datetimeFigureOut">
               <a:rPr lang="en-US" smtClean="0"/>
-              <a:t>11/28/18</a:t>
+              <a:t>11/29/18</a:t>
             </a:fld>
             <a:endParaRPr lang="en-US"/>
           </a:p>
@@ -1610,7 +1611,7 @@
           <a:p>
             <a:fld id="{855B1FBD-4CDE-074D-957F-E13CC52E1F54}" type="datetimeFigureOut">
               <a:rPr lang="en-US" smtClean="0"/>
-              <a:t>11/28/18</a:t>
+              <a:t>11/29/18</a:t>
             </a:fld>
             <a:endParaRPr lang="en-US"/>
           </a:p>
@@ -1728,7 +1729,7 @@
           <a:p>
             <a:fld id="{855B1FBD-4CDE-074D-957F-E13CC52E1F54}" type="datetimeFigureOut">
               <a:rPr lang="en-US" smtClean="0"/>
-              <a:t>11/28/18</a:t>
+              <a:t>11/29/18</a:t>
             </a:fld>
             <a:endParaRPr lang="en-US"/>
           </a:p>
@@ -1823,7 +1824,7 @@
           <a:p>
             <a:fld id="{855B1FBD-4CDE-074D-957F-E13CC52E1F54}" type="datetimeFigureOut">
               <a:rPr lang="en-US" smtClean="0"/>
-              <a:t>11/28/18</a:t>
+              <a:t>11/29/18</a:t>
             </a:fld>
             <a:endParaRPr lang="en-US"/>
           </a:p>
@@ -2100,7 +2101,7 @@
           <a:p>
             <a:fld id="{855B1FBD-4CDE-074D-957F-E13CC52E1F54}" type="datetimeFigureOut">
               <a:rPr lang="en-US" smtClean="0"/>
-              <a:t>11/28/18</a:t>
+              <a:t>11/29/18</a:t>
             </a:fld>
             <a:endParaRPr lang="en-US"/>
           </a:p>
@@ -2353,7 +2354,7 @@
           <a:p>
             <a:fld id="{855B1FBD-4CDE-074D-957F-E13CC52E1F54}" type="datetimeFigureOut">
               <a:rPr lang="en-US" smtClean="0"/>
-              <a:t>11/28/18</a:t>
+              <a:t>11/29/18</a:t>
             </a:fld>
             <a:endParaRPr lang="en-US"/>
           </a:p>
@@ -2566,7 +2567,7 @@
           <a:p>
             <a:fld id="{855B1FBD-4CDE-074D-957F-E13CC52E1F54}" type="datetimeFigureOut">
               <a:rPr lang="en-US" smtClean="0"/>
-              <a:t>11/28/18</a:t>
+              <a:t>11/29/18</a:t>
             </a:fld>
             <a:endParaRPr lang="en-US"/>
           </a:p>
@@ -3544,20 +3545,50 @@
       </p:grpSpPr>
       <p:grpSp>
         <p:nvGrpSpPr>
-          <p:cNvPr id="13" name="Group 12"/>
+          <p:cNvPr id="3" name="Group 2"/>
           <p:cNvGrpSpPr/>
           <p:nvPr/>
         </p:nvGrpSpPr>
         <p:grpSpPr>
           <a:xfrm>
             <a:off x="-707739" y="-74652"/>
-            <a:ext cx="12575889" cy="6273723"/>
+            <a:ext cx="12575889" cy="6238457"/>
             <a:chOff x="-707739" y="-74652"/>
-            <a:chExt cx="12575889" cy="6273723"/>
+            <a:chExt cx="12575889" cy="6238457"/>
           </a:xfrm>
         </p:grpSpPr>
-        <mc:AlternateContent xmlns:mc="http://schemas.openxmlformats.org/markup-compatibility/2006">
-          <mc:Choice xmlns:a14="http://schemas.microsoft.com/office/drawing/2010/main" Requires="a14">
+        <p:pic>
+          <p:nvPicPr>
+            <p:cNvPr id="2" name="Picture 1"/>
+            <p:cNvPicPr>
+              <a:picLocks noChangeAspect="1"/>
+            </p:cNvPicPr>
+            <p:nvPr/>
+          </p:nvPicPr>
+          <p:blipFill>
+            <a:blip r:embed="rId2">
+              <a:extLst>
+                <a:ext uri="{28A0092B-C50C-407E-A947-70E740481C1C}">
+                  <a14:useLocalDpi xmlns:a14="http://schemas.microsoft.com/office/drawing/2010/main" val="0"/>
+                </a:ext>
+              </a:extLst>
+            </a:blip>
+            <a:stretch>
+              <a:fillRect/>
+            </a:stretch>
+          </p:blipFill>
+          <p:spPr>
+            <a:xfrm>
+              <a:off x="8275680" y="769265"/>
+              <a:ext cx="3307641" cy="2505456"/>
+            </a:xfrm>
+            <a:prstGeom prst="rect">
+              <a:avLst/>
+            </a:prstGeom>
+          </p:spPr>
+        </p:pic>
+        <mc:AlternateContent xmlns:mc="http://schemas.openxmlformats.org/markup-compatibility/2006" xmlns:a14="http://schemas.microsoft.com/office/drawing/2010/main">
+          <mc:Choice Requires="a14">
             <p:sp>
               <p:nvSpPr>
                 <p:cNvPr id="10" name="TextBox 9"/>
@@ -3740,7 +3771,7 @@
               </p:txBody>
             </p:sp>
           </mc:Choice>
-          <mc:Fallback>
+          <mc:Fallback xmlns="">
             <p:sp>
               <p:nvSpPr>
                 <p:cNvPr id="10" name="TextBox 9"/>
@@ -3758,7 +3789,7 @@
                   <a:avLst/>
                 </a:prstGeom>
                 <a:blipFill rotWithShape="0">
-                  <a:blip r:embed="rId2"/>
+                  <a:blip r:embed="rId3"/>
                   <a:stretch>
                     <a:fillRect/>
                   </a:stretch>
@@ -3839,36 +3870,6 @@
             </a:p>
           </p:txBody>
         </p:sp>
-        <p:pic>
-          <p:nvPicPr>
-            <p:cNvPr id="11" name="Picture 10"/>
-            <p:cNvPicPr>
-              <a:picLocks noChangeAspect="1"/>
-            </p:cNvPicPr>
-            <p:nvPr/>
-          </p:nvPicPr>
-          <p:blipFill>
-            <a:blip r:embed="rId3">
-              <a:extLst>
-                <a:ext uri="{28A0092B-C50C-407E-A947-70E740481C1C}">
-                  <a14:useLocalDpi xmlns:a14="http://schemas.microsoft.com/office/drawing/2010/main" val="0"/>
-                </a:ext>
-              </a:extLst>
-            </a:blip>
-            <a:stretch>
-              <a:fillRect/>
-            </a:stretch>
-          </p:blipFill>
-          <p:spPr>
-            <a:xfrm>
-              <a:off x="8323193" y="769265"/>
-              <a:ext cx="3260128" cy="2504469"/>
-            </a:xfrm>
-            <a:prstGeom prst="rect">
-              <a:avLst/>
-            </a:prstGeom>
-          </p:spPr>
-        </p:pic>
         <p:sp>
           <p:nvSpPr>
             <p:cNvPr id="12" name="TextBox 11"/>
@@ -3899,8 +3900,8 @@
             </a:p>
           </p:txBody>
         </p:sp>
-        <mc:AlternateContent xmlns:mc="http://schemas.openxmlformats.org/markup-compatibility/2006">
-          <mc:Choice xmlns:a14="http://schemas.microsoft.com/office/drawing/2010/main" Requires="a14">
+        <mc:AlternateContent xmlns:mc="http://schemas.openxmlformats.org/markup-compatibility/2006" xmlns:a14="http://schemas.microsoft.com/office/drawing/2010/main">
+          <mc:Choice Requires="a14">
             <p:sp>
               <p:nvSpPr>
                 <p:cNvPr id="9" name="TextBox 8"/>
@@ -3910,7 +3911,7 @@
               <p:spPr>
                 <a:xfrm>
                   <a:off x="-498189" y="4343820"/>
-                  <a:ext cx="12366339" cy="1855251"/>
+                  <a:ext cx="12366339" cy="1819985"/>
                 </a:xfrm>
                 <a:prstGeom prst="rect">
                   <a:avLst/>
@@ -3927,7 +3928,7 @@
                   <a14:m>
                     <m:oMath xmlns:m="http://schemas.openxmlformats.org/officeDocument/2006/math">
                       <m:r>
-                        <a:rPr lang="en-US" sz="5000" smtClean="0">
+                        <a:rPr lang="en-US" sz="4900" smtClean="0">
                           <a:latin typeface="Cambria Math" charset="0"/>
                           <a:ea typeface="Cambria Math" charset="0"/>
                           <a:cs typeface="Cambria Math" charset="0"/>
@@ -3935,7 +3936,7 @@
                         <m:t>(</m:t>
                       </m:r>
                       <m:r>
-                        <a:rPr lang="en-US" sz="5000" b="0" i="0" smtClean="0">
+                        <a:rPr lang="en-US" sz="4900" b="0" i="0" smtClean="0">
                           <a:latin typeface="Cambria Math" charset="0"/>
                           <a:ea typeface="Cambria Math" charset="0"/>
                           <a:cs typeface="Cambria Math" charset="0"/>
@@ -3943,7 +3944,7 @@
                         <m:t>31115 ∗1.075)</m:t>
                       </m:r>
                       <m:r>
-                        <a:rPr lang="en-US" sz="5000" b="0" i="1" smtClean="0">
+                        <a:rPr lang="en-US" sz="4900" b="0" i="1" smtClean="0">
                           <a:latin typeface="Cambria Math" charset="0"/>
                           <a:ea typeface="Cambria Math" charset="0"/>
                           <a:cs typeface="Cambria Math" charset="0"/>
@@ -3953,7 +3954,7 @@
                       <m:f>
                         <m:fPr>
                           <m:ctrlPr>
-                            <a:rPr lang="mr-IN" sz="5000" b="0" i="1" smtClean="0">
+                            <a:rPr lang="mr-IN" sz="4900" b="0" i="1" smtClean="0">
                               <a:latin typeface="Cambria Math" charset="0"/>
                               <a:ea typeface="Cambria Math" charset="0"/>
                               <a:cs typeface="Cambria Math" charset="0"/>
@@ -3964,7 +3965,7 @@
                           <m:f>
                             <m:fPr>
                               <m:ctrlPr>
-                                <a:rPr lang="mr-IN" sz="5000" b="0" i="1" smtClean="0">
+                                <a:rPr lang="mr-IN" sz="4900" b="0" i="1" smtClean="0">
                                   <a:latin typeface="Cambria Math" charset="0"/>
                                   <a:ea typeface="Cambria Math" charset="0"/>
                                   <a:cs typeface="Cambria Math" charset="0"/>
@@ -3973,7 +3974,7 @@
                             </m:fPr>
                             <m:num>
                               <m:r>
-                                <a:rPr lang="en-US" sz="5000" b="0" i="1" smtClean="0">
+                                <a:rPr lang="en-US" sz="4900" b="0" i="1" smtClean="0">
                                   <a:latin typeface="Cambria Math" charset="0"/>
                                   <a:ea typeface="Cambria Math" charset="0"/>
                                   <a:cs typeface="Cambria Math" charset="0"/>
@@ -3983,7 +3984,7 @@
                             </m:num>
                             <m:den>
                               <m:r>
-                                <a:rPr lang="en-US" sz="5000" b="0" i="1" smtClean="0">
+                                <a:rPr lang="en-US" sz="4900" b="0" i="1" smtClean="0">
                                   <a:latin typeface="Cambria Math" charset="0"/>
                                   <a:ea typeface="Cambria Math" charset="0"/>
                                   <a:cs typeface="Cambria Math" charset="0"/>
@@ -3995,7 +3996,7 @@
                           <m:d>
                             <m:dPr>
                               <m:ctrlPr>
-                                <a:rPr lang="en-US" sz="5000" b="0" i="1" smtClean="0">
+                                <a:rPr lang="en-US" sz="4900" b="0" i="1" smtClean="0">
                                   <a:latin typeface="Cambria Math" charset="0"/>
                                   <a:ea typeface="Cambria Math" charset="0"/>
                                   <a:cs typeface="Cambria Math" charset="0"/>
@@ -4004,7 +4005,7 @@
                             </m:dPr>
                             <m:e>
                               <m:r>
-                                <a:rPr lang="en-US" sz="5000" b="0" i="0" smtClean="0">
+                                <a:rPr lang="en-US" sz="4900" b="0" i="0" smtClean="0">
                                   <a:latin typeface="Cambria Math" charset="0"/>
                                   <a:ea typeface="Cambria Math" charset="0"/>
                                   <a:cs typeface="Cambria Math" charset="0"/>
@@ -4014,7 +4015,7 @@
                               <m:f>
                                 <m:fPr>
                                   <m:ctrlPr>
-                                    <a:rPr lang="mr-IN" sz="5000" b="0" i="1" smtClean="0">
+                                    <a:rPr lang="mr-IN" sz="4900" b="0" i="1" smtClean="0">
                                       <a:latin typeface="Cambria Math" charset="0"/>
                                       <a:ea typeface="Cambria Math" charset="0"/>
                                       <a:cs typeface="Cambria Math" charset="0"/>
@@ -4023,7 +4024,7 @@
                                 </m:fPr>
                                 <m:num>
                                   <m:r>
-                                    <a:rPr lang="en-US" sz="5000" b="0" i="1" smtClean="0">
+                                    <a:rPr lang="en-US" sz="4900" b="0" i="1" smtClean="0">
                                       <a:latin typeface="Cambria Math" charset="0"/>
                                       <a:ea typeface="Cambria Math" charset="0"/>
                                       <a:cs typeface="Cambria Math" charset="0"/>
@@ -4033,7 +4034,7 @@
                                 </m:num>
                                 <m:den>
                                   <m:r>
-                                    <a:rPr lang="en-US" sz="5000" b="0" i="1" smtClean="0">
+                                    <a:rPr lang="en-US" sz="4900" b="0" i="1" smtClean="0">
                                       <a:latin typeface="Cambria Math" charset="0"/>
                                       <a:ea typeface="Cambria Math" charset="0"/>
                                       <a:cs typeface="Cambria Math" charset="0"/>
@@ -4045,7 +4046,7 @@
                             </m:e>
                           </m:d>
                           <m:r>
-                            <a:rPr lang="en-US" sz="5000" b="0" i="1" baseline="30000" smtClean="0">
+                            <a:rPr lang="en-US" sz="4900" b="0" i="1" baseline="30000" smtClean="0">
                               <a:latin typeface="Cambria Math" charset="0"/>
                               <a:ea typeface="Cambria Math" charset="0"/>
                               <a:cs typeface="Cambria Math" charset="0"/>
@@ -4053,7 +4054,7 @@
                             <m:t>60</m:t>
                           </m:r>
                           <m:r>
-                            <a:rPr lang="en-US" sz="5000" b="0" i="1" smtClean="0">
+                            <a:rPr lang="en-US" sz="4900" b="0" i="1" smtClean="0">
                               <a:latin typeface="Cambria Math" charset="0"/>
                               <a:ea typeface="Cambria Math" charset="0"/>
                               <a:cs typeface="Cambria Math" charset="0"/>
@@ -4065,7 +4066,7 @@
                           <m:d>
                             <m:dPr>
                               <m:ctrlPr>
-                                <a:rPr lang="en-US" sz="5000" b="0" i="1" smtClean="0">
+                                <a:rPr lang="en-US" sz="4900" b="0" i="1" smtClean="0">
                                   <a:latin typeface="Cambria Math" charset="0"/>
                                   <a:ea typeface="Cambria Math" charset="0"/>
                                   <a:cs typeface="Cambria Math" charset="0"/>
@@ -4074,7 +4075,7 @@
                             </m:dPr>
                             <m:e>
                               <m:r>
-                                <a:rPr lang="en-US" sz="5000" b="0" i="0" smtClean="0">
+                                <a:rPr lang="en-US" sz="4900" b="0" i="0" smtClean="0">
                                   <a:latin typeface="Cambria Math" charset="0"/>
                                   <a:ea typeface="Cambria Math" charset="0"/>
                                   <a:cs typeface="Cambria Math" charset="0"/>
@@ -4084,7 +4085,7 @@
                               <m:f>
                                 <m:fPr>
                                   <m:ctrlPr>
-                                    <a:rPr lang="mr-IN" sz="5000" b="0" i="1" smtClean="0">
+                                    <a:rPr lang="mr-IN" sz="4900" b="0" i="1" smtClean="0">
                                       <a:latin typeface="Cambria Math" charset="0"/>
                                       <a:ea typeface="Cambria Math" charset="0"/>
                                       <a:cs typeface="Cambria Math" charset="0"/>
@@ -4093,7 +4094,7 @@
                                 </m:fPr>
                                 <m:num>
                                   <m:r>
-                                    <a:rPr lang="en-US" sz="5000" b="0" i="1" smtClean="0">
+                                    <a:rPr lang="en-US" sz="4900" b="0" i="1" smtClean="0">
                                       <a:latin typeface="Cambria Math" charset="0"/>
                                       <a:ea typeface="Cambria Math" charset="0"/>
                                       <a:cs typeface="Cambria Math" charset="0"/>
@@ -4103,7 +4104,7 @@
                                 </m:num>
                                 <m:den>
                                   <m:r>
-                                    <a:rPr lang="en-US" sz="5000" b="0" i="1" smtClean="0">
+                                    <a:rPr lang="en-US" sz="4900" b="0" i="1" smtClean="0">
                                       <a:latin typeface="Cambria Math" charset="0"/>
                                       <a:ea typeface="Cambria Math" charset="0"/>
                                       <a:cs typeface="Cambria Math" charset="0"/>
@@ -4115,7 +4116,7 @@
                             </m:e>
                           </m:d>
                           <m:r>
-                            <a:rPr lang="en-US" sz="5000" b="0" i="1" baseline="30000" smtClean="0">
+                            <a:rPr lang="en-US" sz="4900" b="0" i="1" baseline="30000" smtClean="0">
                               <a:latin typeface="Cambria Math" charset="0"/>
                               <a:ea typeface="Cambria Math" charset="0"/>
                               <a:cs typeface="Cambria Math" charset="0"/>
@@ -4123,7 +4124,7 @@
                             <m:t>60</m:t>
                           </m:r>
                           <m:r>
-                            <a:rPr lang="en-US" sz="5000" b="0" i="1" smtClean="0">
+                            <a:rPr lang="en-US" sz="4900" b="0" i="1" smtClean="0">
                               <a:latin typeface="Cambria Math" charset="0"/>
                               <a:ea typeface="Cambria Math" charset="0"/>
                               <a:cs typeface="Cambria Math" charset="0"/>
@@ -4135,18 +4136,18 @@
                     </m:oMath>
                   </a14:m>
                   <a:r>
-                    <a:rPr lang="en-US" sz="5000" dirty="0" smtClean="0">
+                    <a:rPr lang="en-US" sz="4900" dirty="0" smtClean="0">
                       <a:latin typeface="Cambria Math" charset="0"/>
                       <a:ea typeface="Cambria Math" charset="0"/>
                       <a:cs typeface="Cambria Math" charset="0"/>
                     </a:rPr>
-                    <a:t> = 662.64</a:t>
+                    <a:t> = $662.64</a:t>
                   </a:r>
                 </a:p>
               </p:txBody>
             </p:sp>
           </mc:Choice>
-          <mc:Fallback>
+          <mc:Fallback xmlns="">
             <p:sp>
               <p:nvSpPr>
                 <p:cNvPr id="9" name="TextBox 8"/>
@@ -4158,7 +4159,7 @@
               <p:spPr>
                 <a:xfrm>
                   <a:off x="-498189" y="4343820"/>
-                  <a:ext cx="12366339" cy="1855251"/>
+                  <a:ext cx="12366339" cy="1819985"/>
                 </a:xfrm>
                 <a:prstGeom prst="rect">
                   <a:avLst/>
@@ -4166,7 +4167,7 @@
                 <a:blipFill rotWithShape="0">
                   <a:blip r:embed="rId4"/>
                   <a:stretch>
-                    <a:fillRect r="-1626"/>
+                    <a:fillRect r="-1774"/>
                   </a:stretch>
                 </a:blipFill>
               </p:spPr>
@@ -4190,6 +4191,764 @@
     <p:extLst>
       <p:ext uri="{BB962C8B-B14F-4D97-AF65-F5344CB8AC3E}">
         <p14:creationId xmlns:p14="http://schemas.microsoft.com/office/powerpoint/2010/main" val="425274178"/>
+      </p:ext>
+    </p:extLst>
+  </p:cSld>
+  <p:clrMapOvr>
+    <a:masterClrMapping/>
+  </p:clrMapOvr>
+</p:sld>
+</file>
+
+<file path=ppt/slides/slide4.xml><?xml version="1.0" encoding="utf-8"?>
+<p:sld xmlns:a="http://schemas.openxmlformats.org/drawingml/2006/main" xmlns:r="http://schemas.openxmlformats.org/officeDocument/2006/relationships" xmlns:p="http://schemas.openxmlformats.org/presentationml/2006/main">
+  <p:cSld>
+    <p:spTree>
+      <p:nvGrpSpPr>
+        <p:cNvPr id="1" name=""/>
+        <p:cNvGrpSpPr/>
+        <p:nvPr/>
+      </p:nvGrpSpPr>
+      <p:grpSpPr>
+        <a:xfrm>
+          <a:off x="0" y="0"/>
+          <a:ext cx="0" cy="0"/>
+          <a:chOff x="0" y="0"/>
+          <a:chExt cx="0" cy="0"/>
+        </a:xfrm>
+      </p:grpSpPr>
+      <p:pic>
+        <p:nvPicPr>
+          <p:cNvPr id="12" name="Picture 11"/>
+          <p:cNvPicPr>
+            <a:picLocks noChangeAspect="1"/>
+          </p:cNvPicPr>
+          <p:nvPr/>
+        </p:nvPicPr>
+        <p:blipFill>
+          <a:blip r:embed="rId2">
+            <a:extLst>
+              <a:ext uri="{28A0092B-C50C-407E-A947-70E740481C1C}">
+                <a14:useLocalDpi xmlns:a14="http://schemas.microsoft.com/office/drawing/2010/main" val="0"/>
+              </a:ext>
+            </a:extLst>
+          </a:blip>
+          <a:stretch>
+            <a:fillRect/>
+          </a:stretch>
+        </p:blipFill>
+        <p:spPr>
+          <a:xfrm>
+            <a:off x="6295257" y="768278"/>
+            <a:ext cx="5288064" cy="2505456"/>
+          </a:xfrm>
+          <a:prstGeom prst="rect">
+            <a:avLst/>
+          </a:prstGeom>
+        </p:spPr>
+      </p:pic>
+      <mc:AlternateContent xmlns:mc="http://schemas.openxmlformats.org/markup-compatibility/2006">
+        <mc:Choice xmlns:a14="http://schemas.microsoft.com/office/drawing/2010/main" Requires="a14">
+          <p:sp>
+            <p:nvSpPr>
+              <p:cNvPr id="6" name="TextBox 5"/>
+              <p:cNvSpPr txBox="1"/>
+              <p:nvPr/>
+            </p:nvSpPr>
+            <p:spPr>
+              <a:xfrm>
+                <a:off x="155200" y="995433"/>
+                <a:ext cx="5885009" cy="1854547"/>
+              </a:xfrm>
+              <a:prstGeom prst="rect">
+                <a:avLst/>
+              </a:prstGeom>
+              <a:noFill/>
+            </p:spPr>
+            <p:txBody>
+              <a:bodyPr wrap="square" rtlCol="0">
+                <a:spAutoFit/>
+              </a:bodyPr>
+              <a:lstStyle/>
+              <a:p>
+                <a:pPr/>
+                <a14:m>
+                  <m:oMathPara xmlns:m="http://schemas.openxmlformats.org/officeDocument/2006/math">
+                    <m:oMathParaPr>
+                      <m:jc m:val="centerGroup"/>
+                    </m:oMathParaPr>
+                    <m:oMath xmlns:m="http://schemas.openxmlformats.org/officeDocument/2006/math">
+                      <m:r>
+                        <m:rPr>
+                          <m:sty m:val="p"/>
+                        </m:rPr>
+                        <a:rPr lang="en-US" sz="5500" b="0" i="0" smtClean="0">
+                          <a:latin typeface="Cambria Math" charset="0"/>
+                          <a:ea typeface="Cambria Math" charset="0"/>
+                          <a:cs typeface="Cambria Math" charset="0"/>
+                        </a:rPr>
+                        <m:t>P</m:t>
+                      </m:r>
+                      <m:r>
+                        <a:rPr lang="en-US" sz="5500" b="0" i="1" smtClean="0">
+                          <a:latin typeface="Cambria Math" charset="0"/>
+                          <a:ea typeface="Cambria Math" charset="0"/>
+                          <a:cs typeface="Cambria Math" charset="0"/>
+                        </a:rPr>
+                        <m:t> ∗ </m:t>
+                      </m:r>
+                      <m:f>
+                        <m:fPr>
+                          <m:ctrlPr>
+                            <a:rPr lang="mr-IN" sz="5500" b="0" i="1" smtClean="0">
+                              <a:latin typeface="Cambria Math" charset="0"/>
+                              <a:ea typeface="Cambria Math" charset="0"/>
+                              <a:cs typeface="Cambria Math" charset="0"/>
+                            </a:rPr>
+                          </m:ctrlPr>
+                        </m:fPr>
+                        <m:num>
+                          <m:r>
+                            <m:rPr>
+                              <m:sty m:val="p"/>
+                            </m:rPr>
+                            <a:rPr lang="en-US" sz="5500" b="0" i="0" smtClean="0">
+                              <a:latin typeface="Cambria Math" charset="0"/>
+                              <a:ea typeface="Cambria Math" charset="0"/>
+                              <a:cs typeface="Cambria Math" charset="0"/>
+                            </a:rPr>
+                            <m:t>r</m:t>
+                          </m:r>
+                          <m:d>
+                            <m:dPr>
+                              <m:ctrlPr>
+                                <a:rPr lang="en-US" sz="5500" b="0" i="1" smtClean="0">
+                                  <a:latin typeface="Cambria Math" charset="0"/>
+                                  <a:ea typeface="Cambria Math" charset="0"/>
+                                  <a:cs typeface="Cambria Math" charset="0"/>
+                                </a:rPr>
+                              </m:ctrlPr>
+                            </m:dPr>
+                            <m:e>
+                              <m:r>
+                                <a:rPr lang="en-US" sz="5500" b="0" i="0" smtClean="0">
+                                  <a:latin typeface="Cambria Math" charset="0"/>
+                                  <a:ea typeface="Cambria Math" charset="0"/>
+                                  <a:cs typeface="Cambria Math" charset="0"/>
+                                </a:rPr>
+                                <m:t>1+</m:t>
+                              </m:r>
+                              <m:r>
+                                <m:rPr>
+                                  <m:sty m:val="p"/>
+                                </m:rPr>
+                                <a:rPr lang="en-US" sz="5500" b="0" i="0" smtClean="0">
+                                  <a:latin typeface="Cambria Math" charset="0"/>
+                                  <a:ea typeface="Cambria Math" charset="0"/>
+                                  <a:cs typeface="Cambria Math" charset="0"/>
+                                </a:rPr>
+                                <m:t>r</m:t>
+                              </m:r>
+                            </m:e>
+                          </m:d>
+                          <m:r>
+                            <a:rPr lang="en-US" sz="5500" b="0" i="1" baseline="30000" smtClean="0">
+                              <a:latin typeface="Cambria Math" charset="0"/>
+                              <a:ea typeface="Cambria Math" charset="0"/>
+                              <a:cs typeface="Cambria Math" charset="0"/>
+                            </a:rPr>
+                            <m:t>𝑛</m:t>
+                          </m:r>
+                          <m:r>
+                            <a:rPr lang="en-US" sz="5500" b="0" i="1" smtClean="0">
+                              <a:latin typeface="Cambria Math" charset="0"/>
+                              <a:ea typeface="Cambria Math" charset="0"/>
+                              <a:cs typeface="Cambria Math" charset="0"/>
+                            </a:rPr>
+                            <m:t> </m:t>
+                          </m:r>
+                        </m:num>
+                        <m:den>
+                          <m:d>
+                            <m:dPr>
+                              <m:ctrlPr>
+                                <a:rPr lang="en-US" sz="5500" b="0" i="1" smtClean="0">
+                                  <a:latin typeface="Cambria Math" charset="0"/>
+                                  <a:ea typeface="Cambria Math" charset="0"/>
+                                  <a:cs typeface="Cambria Math" charset="0"/>
+                                </a:rPr>
+                              </m:ctrlPr>
+                            </m:dPr>
+                            <m:e>
+                              <m:r>
+                                <a:rPr lang="en-US" sz="5500" b="0" i="0" smtClean="0">
+                                  <a:latin typeface="Cambria Math" charset="0"/>
+                                  <a:ea typeface="Cambria Math" charset="0"/>
+                                  <a:cs typeface="Cambria Math" charset="0"/>
+                                </a:rPr>
+                                <m:t>1+</m:t>
+                              </m:r>
+                              <m:r>
+                                <m:rPr>
+                                  <m:sty m:val="p"/>
+                                </m:rPr>
+                                <a:rPr lang="en-US" sz="5500" b="0" i="0" smtClean="0">
+                                  <a:latin typeface="Cambria Math" charset="0"/>
+                                  <a:ea typeface="Cambria Math" charset="0"/>
+                                  <a:cs typeface="Cambria Math" charset="0"/>
+                                </a:rPr>
+                                <m:t>r</m:t>
+                              </m:r>
+                            </m:e>
+                          </m:d>
+                          <m:r>
+                            <a:rPr lang="en-US" sz="5500" b="0" i="1" baseline="30000" smtClean="0">
+                              <a:latin typeface="Cambria Math" charset="0"/>
+                              <a:ea typeface="Cambria Math" charset="0"/>
+                              <a:cs typeface="Cambria Math" charset="0"/>
+                            </a:rPr>
+                            <m:t>𝑛</m:t>
+                          </m:r>
+                          <m:r>
+                            <a:rPr lang="en-US" sz="5500" b="0" i="1" smtClean="0">
+                              <a:latin typeface="Cambria Math" charset="0"/>
+                              <a:ea typeface="Cambria Math" charset="0"/>
+                              <a:cs typeface="Cambria Math" charset="0"/>
+                            </a:rPr>
+                            <m:t>−1</m:t>
+                          </m:r>
+                        </m:den>
+                      </m:f>
+                    </m:oMath>
+                  </m:oMathPara>
+                </a14:m>
+                <a:endParaRPr lang="en-US" sz="5500" dirty="0">
+                  <a:latin typeface="Cambria Math" charset="0"/>
+                  <a:ea typeface="Cambria Math" charset="0"/>
+                  <a:cs typeface="Cambria Math" charset="0"/>
+                </a:endParaRPr>
+              </a:p>
+            </p:txBody>
+          </p:sp>
+        </mc:Choice>
+        <mc:Fallback>
+          <p:sp>
+            <p:nvSpPr>
+              <p:cNvPr id="6" name="TextBox 5"/>
+              <p:cNvSpPr txBox="1">
+                <a:spLocks noRot="1" noChangeAspect="1" noMove="1" noResize="1" noEditPoints="1" noAdjustHandles="1" noChangeArrowheads="1" noChangeShapeType="1" noTextEdit="1"/>
+              </p:cNvSpPr>
+              <p:nvPr/>
+            </p:nvSpPr>
+            <p:spPr>
+              <a:xfrm>
+                <a:off x="155200" y="995433"/>
+                <a:ext cx="5885009" cy="1854547"/>
+              </a:xfrm>
+              <a:prstGeom prst="rect">
+                <a:avLst/>
+              </a:prstGeom>
+              <a:blipFill rotWithShape="0">
+                <a:blip r:embed="rId3"/>
+                <a:stretch>
+                  <a:fillRect/>
+                </a:stretch>
+              </a:blipFill>
+            </p:spPr>
+            <p:txBody>
+              <a:bodyPr/>
+              <a:lstStyle/>
+              <a:p>
+                <a:r>
+                  <a:rPr lang="en-US">
+                    <a:noFill/>
+                  </a:rPr>
+                  <a:t> </a:t>
+                </a:r>
+              </a:p>
+            </p:txBody>
+          </p:sp>
+        </mc:Fallback>
+      </mc:AlternateContent>
+      <p:sp>
+        <p:nvSpPr>
+          <p:cNvPr id="7" name="TextBox 6"/>
+          <p:cNvSpPr txBox="1"/>
+          <p:nvPr/>
+        </p:nvSpPr>
+        <p:spPr>
+          <a:xfrm>
+            <a:off x="6645561" y="-74652"/>
+            <a:ext cx="4937760" cy="646331"/>
+          </a:xfrm>
+          <a:prstGeom prst="rect">
+            <a:avLst/>
+          </a:prstGeom>
+          <a:noFill/>
+        </p:spPr>
+        <p:txBody>
+          <a:bodyPr wrap="square" rtlCol="0">
+            <a:spAutoFit/>
+          </a:bodyPr>
+          <a:lstStyle/>
+          <a:p>
+            <a:r>
+              <a:rPr lang="en-US" sz="3600" b="1" dirty="0" smtClean="0"/>
+              <a:t>Python Calculation</a:t>
+            </a:r>
+            <a:endParaRPr lang="en-US" sz="3600" b="1" dirty="0"/>
+          </a:p>
+        </p:txBody>
+      </p:sp>
+      <p:sp>
+        <p:nvSpPr>
+          <p:cNvPr id="8" name="TextBox 7"/>
+          <p:cNvSpPr txBox="1"/>
+          <p:nvPr/>
+        </p:nvSpPr>
+        <p:spPr>
+          <a:xfrm>
+            <a:off x="-707739" y="3273734"/>
+            <a:ext cx="4937760" cy="646331"/>
+          </a:xfrm>
+          <a:prstGeom prst="rect">
+            <a:avLst/>
+          </a:prstGeom>
+          <a:noFill/>
+        </p:spPr>
+        <p:txBody>
+          <a:bodyPr wrap="square" rtlCol="0">
+            <a:spAutoFit/>
+          </a:bodyPr>
+          <a:lstStyle/>
+          <a:p>
+            <a:r>
+              <a:rPr lang="en-US" sz="3600" b="1" dirty="0" smtClean="0"/>
+              <a:t>Principal Calculation</a:t>
+            </a:r>
+            <a:endParaRPr lang="en-US" sz="3600" b="1" dirty="0"/>
+          </a:p>
+        </p:txBody>
+      </p:sp>
+      <p:sp>
+        <p:nvSpPr>
+          <p:cNvPr id="9" name="TextBox 8"/>
+          <p:cNvSpPr txBox="1"/>
+          <p:nvPr/>
+        </p:nvSpPr>
+        <p:spPr>
+          <a:xfrm>
+            <a:off x="-707739" y="-74652"/>
+            <a:ext cx="4937760" cy="646331"/>
+          </a:xfrm>
+          <a:prstGeom prst="rect">
+            <a:avLst/>
+          </a:prstGeom>
+          <a:noFill/>
+        </p:spPr>
+        <p:txBody>
+          <a:bodyPr wrap="square" rtlCol="0">
+            <a:spAutoFit/>
+          </a:bodyPr>
+          <a:lstStyle/>
+          <a:p>
+            <a:r>
+              <a:rPr lang="en-US" sz="3600" b="1" dirty="0" smtClean="0"/>
+              <a:t>EMI Formula</a:t>
+            </a:r>
+            <a:endParaRPr lang="en-US" sz="3600" b="1" dirty="0"/>
+          </a:p>
+        </p:txBody>
+      </p:sp>
+      <mc:AlternateContent xmlns:mc="http://schemas.openxmlformats.org/markup-compatibility/2006">
+        <mc:Choice xmlns:a14="http://schemas.microsoft.com/office/drawing/2010/main" Requires="a14">
+          <p:sp>
+            <p:nvSpPr>
+              <p:cNvPr id="10" name="TextBox 9"/>
+              <p:cNvSpPr txBox="1"/>
+              <p:nvPr/>
+            </p:nvSpPr>
+            <p:spPr>
+              <a:xfrm>
+                <a:off x="-6286500" y="4343820"/>
+                <a:ext cx="21164549" cy="3349507"/>
+              </a:xfrm>
+              <a:prstGeom prst="rect">
+                <a:avLst/>
+              </a:prstGeom>
+              <a:noFill/>
+            </p:spPr>
+            <p:txBody>
+              <a:bodyPr wrap="square" rtlCol="0">
+                <a:spAutoFit/>
+              </a:bodyPr>
+              <a:lstStyle/>
+              <a:p>
+                <a:pPr algn="ctr"/>
+                <a14:m>
+                  <m:oMath xmlns:m="http://schemas.openxmlformats.org/officeDocument/2006/math">
+                    <m:r>
+                      <m:rPr>
+                        <m:nor/>
+                      </m:rPr>
+                      <a:rPr lang="en-US" sz="4000" dirty="0" smtClean="0">
+                        <a:latin typeface="Cambria Math" charset="0"/>
+                        <a:ea typeface="Cambria Math" charset="0"/>
+                        <a:cs typeface="Cambria Math" charset="0"/>
+                      </a:rPr>
+                      <m:t>(</m:t>
+                    </m:r>
+                    <m:r>
+                      <m:rPr>
+                        <m:nor/>
+                      </m:rPr>
+                      <a:rPr lang="en-US" sz="4000" b="0" i="0" dirty="0" smtClean="0">
+                        <a:latin typeface="Cambria Math" charset="0"/>
+                        <a:ea typeface="Cambria Math" charset="0"/>
+                        <a:cs typeface="Cambria Math" charset="0"/>
+                      </a:rPr>
+                      <m:t>31115 + </m:t>
+                    </m:r>
+                    <m:r>
+                      <m:rPr>
+                        <m:nor/>
+                      </m:rPr>
+                      <a:rPr lang="en-US" sz="4000" dirty="0" smtClean="0">
+                        <a:latin typeface="Cambria Math" charset="0"/>
+                        <a:ea typeface="Cambria Math" charset="0"/>
+                        <a:cs typeface="Cambria Math" charset="0"/>
+                      </a:rPr>
+                      <m:t>(32615 * 0.0975 ) + (50 + 200 + 65 + 80) )</m:t>
+                    </m:r>
+                  </m:oMath>
+                </a14:m>
+                <a:r>
+                  <a:rPr lang="en-US" sz="4000" dirty="0" smtClean="0">
+                    <a:latin typeface="Cambria Math" charset="0"/>
+                    <a:ea typeface="Cambria Math" charset="0"/>
+                    <a:cs typeface="Cambria Math" charset="0"/>
+                  </a:rPr>
+                  <a:t> = </a:t>
+                </a:r>
+                <a:endParaRPr lang="en-US" sz="4000" dirty="0">
+                  <a:latin typeface="Cambria Math" charset="0"/>
+                  <a:ea typeface="Cambria Math" charset="0"/>
+                  <a:cs typeface="Cambria Math" charset="0"/>
+                </a:endParaRPr>
+              </a:p>
+              <a:p>
+                <a:pPr algn="ctr"/>
+                <a14:m>
+                  <m:oMathPara xmlns:m="http://schemas.openxmlformats.org/officeDocument/2006/math">
+                    <m:oMathParaPr>
+                      <m:jc m:val="centerGroup"/>
+                    </m:oMathParaPr>
+                    <m:oMath xmlns:m="http://schemas.openxmlformats.org/officeDocument/2006/math">
+                      <m:r>
+                        <a:rPr lang="en-US" sz="4000" b="0" i="1" smtClean="0">
+                          <a:latin typeface="Cambria Math" charset="0"/>
+                          <a:ea typeface="Cambria Math" charset="0"/>
+                          <a:cs typeface="Cambria Math" charset="0"/>
+                        </a:rPr>
+                        <m:t> </m:t>
+                      </m:r>
+                    </m:oMath>
+                  </m:oMathPara>
+                </a14:m>
+                <a:endParaRPr lang="en-US" sz="4000" b="0" i="1" dirty="0" smtClean="0">
+                  <a:latin typeface="Cambria Math" charset="0"/>
+                  <a:ea typeface="Cambria Math" charset="0"/>
+                  <a:cs typeface="Cambria Math" charset="0"/>
+                </a:endParaRPr>
+              </a:p>
+              <a:p>
+                <a:pPr algn="ctr"/>
+                <a:endParaRPr lang="en-US" sz="4000" b="0" i="1" smtClean="0">
+                  <a:latin typeface="Cambria Math" charset="0"/>
+                  <a:ea typeface="Cambria Math" charset="0"/>
+                  <a:cs typeface="Cambria Math" charset="0"/>
+                </a:endParaRPr>
+              </a:p>
+              <a:p>
+                <a:pPr algn="ctr"/>
+                <a14:m>
+                  <m:oMath xmlns:m="http://schemas.openxmlformats.org/officeDocument/2006/math">
+                    <m:r>
+                      <a:rPr lang="en-US" sz="4000" b="0" i="1" smtClean="0">
+                        <a:latin typeface="Cambria Math" charset="0"/>
+                        <a:ea typeface="Cambria Math" charset="0"/>
+                        <a:cs typeface="Cambria Math" charset="0"/>
+                      </a:rPr>
+                      <m:t>∗ </m:t>
+                    </m:r>
+                    <m:f>
+                      <m:fPr>
+                        <m:ctrlPr>
+                          <a:rPr lang="mr-IN" sz="4000" b="0" i="1" smtClean="0">
+                            <a:latin typeface="Cambria Math" charset="0"/>
+                            <a:ea typeface="Cambria Math" charset="0"/>
+                            <a:cs typeface="Cambria Math" charset="0"/>
+                          </a:rPr>
+                        </m:ctrlPr>
+                      </m:fPr>
+                      <m:num>
+                        <m:f>
+                          <m:fPr>
+                            <m:ctrlPr>
+                              <a:rPr lang="mr-IN" sz="4000" b="0" i="1" smtClean="0">
+                                <a:latin typeface="Cambria Math" charset="0"/>
+                                <a:ea typeface="Cambria Math" charset="0"/>
+                                <a:cs typeface="Cambria Math" charset="0"/>
+                              </a:rPr>
+                            </m:ctrlPr>
+                          </m:fPr>
+                          <m:num>
+                            <m:r>
+                              <a:rPr lang="en-US" sz="4000" b="0" i="1" smtClean="0">
+                                <a:latin typeface="Cambria Math" charset="0"/>
+                                <a:ea typeface="Cambria Math" charset="0"/>
+                                <a:cs typeface="Cambria Math" charset="0"/>
+                              </a:rPr>
+                              <m:t>0.0</m:t>
+                            </m:r>
+                            <m:r>
+                              <a:rPr lang="en-US" sz="4000" b="0" i="1" smtClean="0">
+                                <a:latin typeface="Cambria Math" charset="0"/>
+                                <a:ea typeface="Cambria Math" charset="0"/>
+                                <a:cs typeface="Cambria Math" charset="0"/>
+                              </a:rPr>
+                              <m:t>9</m:t>
+                            </m:r>
+                            <m:r>
+                              <a:rPr lang="en-US" sz="4000" b="0" i="1" smtClean="0">
+                                <a:latin typeface="Cambria Math" charset="0"/>
+                                <a:ea typeface="Cambria Math" charset="0"/>
+                                <a:cs typeface="Cambria Math" charset="0"/>
+                              </a:rPr>
+                              <m:t>02</m:t>
+                            </m:r>
+                          </m:num>
+                          <m:den>
+                            <m:r>
+                              <a:rPr lang="en-US" sz="4000" b="0" i="1" smtClean="0">
+                                <a:latin typeface="Cambria Math" charset="0"/>
+                                <a:ea typeface="Cambria Math" charset="0"/>
+                                <a:cs typeface="Cambria Math" charset="0"/>
+                              </a:rPr>
+                              <m:t>12</m:t>
+                            </m:r>
+                          </m:den>
+                        </m:f>
+                        <m:d>
+                          <m:dPr>
+                            <m:ctrlPr>
+                              <a:rPr lang="en-US" sz="4000" b="0" i="1" smtClean="0">
+                                <a:latin typeface="Cambria Math" charset="0"/>
+                                <a:ea typeface="Cambria Math" charset="0"/>
+                                <a:cs typeface="Cambria Math" charset="0"/>
+                              </a:rPr>
+                            </m:ctrlPr>
+                          </m:dPr>
+                          <m:e>
+                            <m:r>
+                              <a:rPr lang="en-US" sz="4000" b="0" i="0" smtClean="0">
+                                <a:latin typeface="Cambria Math" charset="0"/>
+                                <a:ea typeface="Cambria Math" charset="0"/>
+                                <a:cs typeface="Cambria Math" charset="0"/>
+                              </a:rPr>
+                              <m:t>1+</m:t>
+                            </m:r>
+                            <m:f>
+                              <m:fPr>
+                                <m:ctrlPr>
+                                  <a:rPr lang="mr-IN" sz="4000" b="0" i="1" smtClean="0">
+                                    <a:latin typeface="Cambria Math" charset="0"/>
+                                    <a:ea typeface="Cambria Math" charset="0"/>
+                                    <a:cs typeface="Cambria Math" charset="0"/>
+                                  </a:rPr>
+                                </m:ctrlPr>
+                              </m:fPr>
+                              <m:num>
+                                <m:r>
+                                  <a:rPr lang="en-US" sz="4000" b="0" i="1" smtClean="0">
+                                    <a:latin typeface="Cambria Math" charset="0"/>
+                                    <a:ea typeface="Cambria Math" charset="0"/>
+                                    <a:cs typeface="Cambria Math" charset="0"/>
+                                  </a:rPr>
+                                  <m:t>0.0702</m:t>
+                                </m:r>
+                              </m:num>
+                              <m:den>
+                                <m:r>
+                                  <a:rPr lang="en-US" sz="4000" b="0" i="1" smtClean="0">
+                                    <a:latin typeface="Cambria Math" charset="0"/>
+                                    <a:ea typeface="Cambria Math" charset="0"/>
+                                    <a:cs typeface="Cambria Math" charset="0"/>
+                                  </a:rPr>
+                                  <m:t>12</m:t>
+                                </m:r>
+                              </m:den>
+                            </m:f>
+                          </m:e>
+                        </m:d>
+                        <m:r>
+                          <a:rPr lang="en-US" sz="4000" b="0" i="1" baseline="30000" smtClean="0">
+                            <a:latin typeface="Cambria Math" charset="0"/>
+                            <a:ea typeface="Cambria Math" charset="0"/>
+                            <a:cs typeface="Cambria Math" charset="0"/>
+                          </a:rPr>
+                          <m:t>60</m:t>
+                        </m:r>
+                        <m:r>
+                          <a:rPr lang="en-US" sz="4000" b="0" i="1" smtClean="0">
+                            <a:latin typeface="Cambria Math" charset="0"/>
+                            <a:ea typeface="Cambria Math" charset="0"/>
+                            <a:cs typeface="Cambria Math" charset="0"/>
+                          </a:rPr>
+                          <m:t> </m:t>
+                        </m:r>
+                      </m:num>
+                      <m:den>
+                        <m:d>
+                          <m:dPr>
+                            <m:ctrlPr>
+                              <a:rPr lang="en-US" sz="4000" b="0" i="1" smtClean="0">
+                                <a:latin typeface="Cambria Math" charset="0"/>
+                                <a:ea typeface="Cambria Math" charset="0"/>
+                                <a:cs typeface="Cambria Math" charset="0"/>
+                              </a:rPr>
+                            </m:ctrlPr>
+                          </m:dPr>
+                          <m:e>
+                            <m:r>
+                              <a:rPr lang="en-US" sz="4000" b="0" i="0" smtClean="0">
+                                <a:latin typeface="Cambria Math" charset="0"/>
+                                <a:ea typeface="Cambria Math" charset="0"/>
+                                <a:cs typeface="Cambria Math" charset="0"/>
+                              </a:rPr>
+                              <m:t>1+</m:t>
+                            </m:r>
+                            <m:f>
+                              <m:fPr>
+                                <m:ctrlPr>
+                                  <a:rPr lang="mr-IN" sz="4000" b="0" i="1" smtClean="0">
+                                    <a:latin typeface="Cambria Math" charset="0"/>
+                                    <a:ea typeface="Cambria Math" charset="0"/>
+                                    <a:cs typeface="Cambria Math" charset="0"/>
+                                  </a:rPr>
+                                </m:ctrlPr>
+                              </m:fPr>
+                              <m:num>
+                                <m:r>
+                                  <a:rPr lang="en-US" sz="4000" b="0" i="1" smtClean="0">
+                                    <a:latin typeface="Cambria Math" charset="0"/>
+                                    <a:ea typeface="Cambria Math" charset="0"/>
+                                    <a:cs typeface="Cambria Math" charset="0"/>
+                                  </a:rPr>
+                                  <m:t>0.0702</m:t>
+                                </m:r>
+                              </m:num>
+                              <m:den>
+                                <m:r>
+                                  <a:rPr lang="en-US" sz="4000" b="0" i="1" smtClean="0">
+                                    <a:latin typeface="Cambria Math" charset="0"/>
+                                    <a:ea typeface="Cambria Math" charset="0"/>
+                                    <a:cs typeface="Cambria Math" charset="0"/>
+                                  </a:rPr>
+                                  <m:t>12</m:t>
+                                </m:r>
+                              </m:den>
+                            </m:f>
+                          </m:e>
+                        </m:d>
+                        <m:r>
+                          <a:rPr lang="en-US" sz="4000" b="0" i="1" baseline="30000" smtClean="0">
+                            <a:latin typeface="Cambria Math" charset="0"/>
+                            <a:ea typeface="Cambria Math" charset="0"/>
+                            <a:cs typeface="Cambria Math" charset="0"/>
+                          </a:rPr>
+                          <m:t>60</m:t>
+                        </m:r>
+                        <m:r>
+                          <a:rPr lang="en-US" sz="4000" b="0" i="1" smtClean="0">
+                            <a:latin typeface="Cambria Math" charset="0"/>
+                            <a:ea typeface="Cambria Math" charset="0"/>
+                            <a:cs typeface="Cambria Math" charset="0"/>
+                          </a:rPr>
+                          <m:t>−1</m:t>
+                        </m:r>
+                      </m:den>
+                    </m:f>
+                  </m:oMath>
+                </a14:m>
+                <a:r>
+                  <a:rPr lang="en-US" sz="4000" dirty="0" smtClean="0">
+                    <a:latin typeface="Cambria Math" charset="0"/>
+                    <a:ea typeface="Cambria Math" charset="0"/>
+                    <a:cs typeface="Cambria Math" charset="0"/>
+                  </a:rPr>
+                  <a:t> = $</a:t>
+                </a:r>
+                <a:r>
+                  <a:rPr lang="en-US" sz="4000" dirty="0" smtClean="0">
+                    <a:latin typeface="Cambria Math" charset="0"/>
+                    <a:ea typeface="Cambria Math" charset="0"/>
+                    <a:cs typeface="Cambria Math" charset="0"/>
+                  </a:rPr>
+                  <a:t>687.64</a:t>
+                </a:r>
+                <a:endParaRPr lang="en-US" sz="4000" dirty="0" smtClean="0">
+                  <a:latin typeface="Cambria Math" charset="0"/>
+                  <a:ea typeface="Cambria Math" charset="0"/>
+                  <a:cs typeface="Cambria Math" charset="0"/>
+                </a:endParaRPr>
+              </a:p>
+            </p:txBody>
+          </p:sp>
+        </mc:Choice>
+        <mc:Fallback>
+          <p:sp>
+            <p:nvSpPr>
+              <p:cNvPr id="10" name="TextBox 9"/>
+              <p:cNvSpPr txBox="1">
+                <a:spLocks noRot="1" noChangeAspect="1" noMove="1" noResize="1" noEditPoints="1" noAdjustHandles="1" noChangeArrowheads="1" noChangeShapeType="1" noTextEdit="1"/>
+              </p:cNvSpPr>
+              <p:nvPr/>
+            </p:nvSpPr>
+            <p:spPr>
+              <a:xfrm>
+                <a:off x="-6286500" y="4343820"/>
+                <a:ext cx="21164549" cy="3349507"/>
+              </a:xfrm>
+              <a:prstGeom prst="rect">
+                <a:avLst/>
+              </a:prstGeom>
+              <a:blipFill rotWithShape="0">
+                <a:blip r:embed="rId4"/>
+                <a:stretch>
+                  <a:fillRect t="-3279"/>
+                </a:stretch>
+              </a:blipFill>
+            </p:spPr>
+            <p:txBody>
+              <a:bodyPr/>
+              <a:lstStyle/>
+              <a:p>
+                <a:r>
+                  <a:rPr lang="en-US">
+                    <a:noFill/>
+                  </a:rPr>
+                  <a:t> </a:t>
+                </a:r>
+              </a:p>
+            </p:txBody>
+          </p:sp>
+        </mc:Fallback>
+      </mc:AlternateContent>
+    </p:spTree>
+    <p:extLst>
+      <p:ext uri="{BB962C8B-B14F-4D97-AF65-F5344CB8AC3E}">
+        <p14:creationId xmlns:p14="http://schemas.microsoft.com/office/powerpoint/2010/main" val="1273491676"/>
       </p:ext>
     </p:extLst>
   </p:cSld>

</xml_diff>

<commit_message>
Updated car loan example 2 image
</commit_message>
<xml_diff>
--- a/Finance/loans.pptx
+++ b/Finance/loans.pptx
@@ -246,7 +246,7 @@
           <a:p>
             <a:fld id="{855B1FBD-4CDE-074D-957F-E13CC52E1F54}" type="datetimeFigureOut">
               <a:rPr lang="en-US" smtClean="0"/>
-              <a:t>11/29/18</a:t>
+              <a:t>11/30/18</a:t>
             </a:fld>
             <a:endParaRPr lang="en-US"/>
           </a:p>
@@ -416,7 +416,7 @@
           <a:p>
             <a:fld id="{855B1FBD-4CDE-074D-957F-E13CC52E1F54}" type="datetimeFigureOut">
               <a:rPr lang="en-US" smtClean="0"/>
-              <a:t>11/29/18</a:t>
+              <a:t>11/30/18</a:t>
             </a:fld>
             <a:endParaRPr lang="en-US"/>
           </a:p>
@@ -596,7 +596,7 @@
           <a:p>
             <a:fld id="{855B1FBD-4CDE-074D-957F-E13CC52E1F54}" type="datetimeFigureOut">
               <a:rPr lang="en-US" smtClean="0"/>
-              <a:t>11/29/18</a:t>
+              <a:t>11/30/18</a:t>
             </a:fld>
             <a:endParaRPr lang="en-US"/>
           </a:p>
@@ -766,7 +766,7 @@
           <a:p>
             <a:fld id="{855B1FBD-4CDE-074D-957F-E13CC52E1F54}" type="datetimeFigureOut">
               <a:rPr lang="en-US" smtClean="0"/>
-              <a:t>11/29/18</a:t>
+              <a:t>11/30/18</a:t>
             </a:fld>
             <a:endParaRPr lang="en-US"/>
           </a:p>
@@ -1012,7 +1012,7 @@
           <a:p>
             <a:fld id="{855B1FBD-4CDE-074D-957F-E13CC52E1F54}" type="datetimeFigureOut">
               <a:rPr lang="en-US" smtClean="0"/>
-              <a:t>11/29/18</a:t>
+              <a:t>11/30/18</a:t>
             </a:fld>
             <a:endParaRPr lang="en-US"/>
           </a:p>
@@ -1244,7 +1244,7 @@
           <a:p>
             <a:fld id="{855B1FBD-4CDE-074D-957F-E13CC52E1F54}" type="datetimeFigureOut">
               <a:rPr lang="en-US" smtClean="0"/>
-              <a:t>11/29/18</a:t>
+              <a:t>11/30/18</a:t>
             </a:fld>
             <a:endParaRPr lang="en-US"/>
           </a:p>
@@ -1611,7 +1611,7 @@
           <a:p>
             <a:fld id="{855B1FBD-4CDE-074D-957F-E13CC52E1F54}" type="datetimeFigureOut">
               <a:rPr lang="en-US" smtClean="0"/>
-              <a:t>11/29/18</a:t>
+              <a:t>11/30/18</a:t>
             </a:fld>
             <a:endParaRPr lang="en-US"/>
           </a:p>
@@ -1729,7 +1729,7 @@
           <a:p>
             <a:fld id="{855B1FBD-4CDE-074D-957F-E13CC52E1F54}" type="datetimeFigureOut">
               <a:rPr lang="en-US" smtClean="0"/>
-              <a:t>11/29/18</a:t>
+              <a:t>11/30/18</a:t>
             </a:fld>
             <a:endParaRPr lang="en-US"/>
           </a:p>
@@ -1824,7 +1824,7 @@
           <a:p>
             <a:fld id="{855B1FBD-4CDE-074D-957F-E13CC52E1F54}" type="datetimeFigureOut">
               <a:rPr lang="en-US" smtClean="0"/>
-              <a:t>11/29/18</a:t>
+              <a:t>11/30/18</a:t>
             </a:fld>
             <a:endParaRPr lang="en-US"/>
           </a:p>
@@ -2101,7 +2101,7 @@
           <a:p>
             <a:fld id="{855B1FBD-4CDE-074D-957F-E13CC52E1F54}" type="datetimeFigureOut">
               <a:rPr lang="en-US" smtClean="0"/>
-              <a:t>11/29/18</a:t>
+              <a:t>11/30/18</a:t>
             </a:fld>
             <a:endParaRPr lang="en-US"/>
           </a:p>
@@ -2354,7 +2354,7 @@
           <a:p>
             <a:fld id="{855B1FBD-4CDE-074D-957F-E13CC52E1F54}" type="datetimeFigureOut">
               <a:rPr lang="en-US" smtClean="0"/>
-              <a:t>11/29/18</a:t>
+              <a:t>11/30/18</a:t>
             </a:fld>
             <a:endParaRPr lang="en-US"/>
           </a:p>
@@ -2567,7 +2567,7 @@
           <a:p>
             <a:fld id="{855B1FBD-4CDE-074D-957F-E13CC52E1F54}" type="datetimeFigureOut">
               <a:rPr lang="en-US" smtClean="0"/>
-              <a:t>11/29/18</a:t>
+              <a:t>11/30/18</a:t>
             </a:fld>
             <a:endParaRPr lang="en-US"/>
           </a:p>
@@ -4217,90 +4217,417 @@
           <a:chExt cx="0" cy="0"/>
         </a:xfrm>
       </p:grpSpPr>
-      <p:pic>
-        <p:nvPicPr>
-          <p:cNvPr id="12" name="Picture 11"/>
-          <p:cNvPicPr>
-            <a:picLocks noChangeAspect="1"/>
-          </p:cNvPicPr>
+      <p:grpSp>
+        <p:nvGrpSpPr>
+          <p:cNvPr id="4" name="Group 3"/>
+          <p:cNvGrpSpPr/>
           <p:nvPr/>
-        </p:nvPicPr>
-        <p:blipFill>
-          <a:blip r:embed="rId2">
-            <a:extLst>
-              <a:ext uri="{28A0092B-C50C-407E-A947-70E740481C1C}">
-                <a14:useLocalDpi xmlns:a14="http://schemas.microsoft.com/office/drawing/2010/main" val="0"/>
-              </a:ext>
-            </a:extLst>
-          </a:blip>
-          <a:stretch>
-            <a:fillRect/>
-          </a:stretch>
-        </p:blipFill>
-        <p:spPr>
+        </p:nvGrpSpPr>
+        <p:grpSpPr>
           <a:xfrm>
-            <a:off x="6295257" y="768278"/>
-            <a:ext cx="5288064" cy="2505456"/>
+            <a:off x="-707739" y="-74652"/>
+            <a:ext cx="14035082" cy="5639190"/>
+            <a:chOff x="-707739" y="-74652"/>
+            <a:chExt cx="14035082" cy="5639190"/>
           </a:xfrm>
-          <a:prstGeom prst="rect">
-            <a:avLst/>
-          </a:prstGeom>
-        </p:spPr>
-      </p:pic>
-      <mc:AlternateContent xmlns:mc="http://schemas.openxmlformats.org/markup-compatibility/2006">
-        <mc:Choice xmlns:a14="http://schemas.microsoft.com/office/drawing/2010/main" Requires="a14">
-          <p:sp>
-            <p:nvSpPr>
-              <p:cNvPr id="6" name="TextBox 5"/>
-              <p:cNvSpPr txBox="1"/>
-              <p:nvPr/>
-            </p:nvSpPr>
-            <p:spPr>
-              <a:xfrm>
-                <a:off x="155200" y="995433"/>
-                <a:ext cx="5885009" cy="1854547"/>
-              </a:xfrm>
-              <a:prstGeom prst="rect">
-                <a:avLst/>
-              </a:prstGeom>
-              <a:noFill/>
-            </p:spPr>
-            <p:txBody>
-              <a:bodyPr wrap="square" rtlCol="0">
-                <a:spAutoFit/>
-              </a:bodyPr>
-              <a:lstStyle/>
-              <a:p>
-                <a:pPr/>
-                <a14:m>
-                  <m:oMathPara xmlns:m="http://schemas.openxmlformats.org/officeDocument/2006/math">
-                    <m:oMathParaPr>
-                      <m:jc m:val="centerGroup"/>
-                    </m:oMathParaPr>
+        </p:grpSpPr>
+        <mc:AlternateContent xmlns:mc="http://schemas.openxmlformats.org/markup-compatibility/2006" xmlns:a14="http://schemas.microsoft.com/office/drawing/2010/main">
+          <mc:Choice Requires="a14">
+            <p:sp>
+              <p:nvSpPr>
+                <p:cNvPr id="6" name="TextBox 5"/>
+                <p:cNvSpPr txBox="1"/>
+                <p:nvPr/>
+              </p:nvSpPr>
+              <p:spPr>
+                <a:xfrm>
+                  <a:off x="155200" y="995433"/>
+                  <a:ext cx="5885009" cy="1854547"/>
+                </a:xfrm>
+                <a:prstGeom prst="rect">
+                  <a:avLst/>
+                </a:prstGeom>
+                <a:noFill/>
+              </p:spPr>
+              <p:txBody>
+                <a:bodyPr wrap="square" rtlCol="0">
+                  <a:spAutoFit/>
+                </a:bodyPr>
+                <a:lstStyle/>
+                <a:p>
+                  <a:pPr/>
+                  <a14:m>
+                    <m:oMathPara xmlns:m="http://schemas.openxmlformats.org/officeDocument/2006/math">
+                      <m:oMathParaPr>
+                        <m:jc m:val="centerGroup"/>
+                      </m:oMathParaPr>
+                      <m:oMath xmlns:m="http://schemas.openxmlformats.org/officeDocument/2006/math">
+                        <m:r>
+                          <m:rPr>
+                            <m:sty m:val="p"/>
+                          </m:rPr>
+                          <a:rPr lang="en-US" sz="5500" b="0" i="0" smtClean="0">
+                            <a:latin typeface="Cambria Math" charset="0"/>
+                            <a:ea typeface="Cambria Math" charset="0"/>
+                            <a:cs typeface="Cambria Math" charset="0"/>
+                          </a:rPr>
+                          <m:t>P</m:t>
+                        </m:r>
+                        <m:r>
+                          <a:rPr lang="en-US" sz="5500" b="0" i="1" smtClean="0">
+                            <a:latin typeface="Cambria Math" charset="0"/>
+                            <a:ea typeface="Cambria Math" charset="0"/>
+                            <a:cs typeface="Cambria Math" charset="0"/>
+                          </a:rPr>
+                          <m:t> ∗ </m:t>
+                        </m:r>
+                        <m:f>
+                          <m:fPr>
+                            <m:ctrlPr>
+                              <a:rPr lang="mr-IN" sz="5500" b="0" i="1" smtClean="0">
+                                <a:latin typeface="Cambria Math" charset="0"/>
+                                <a:ea typeface="Cambria Math" charset="0"/>
+                                <a:cs typeface="Cambria Math" charset="0"/>
+                              </a:rPr>
+                            </m:ctrlPr>
+                          </m:fPr>
+                          <m:num>
+                            <m:r>
+                              <m:rPr>
+                                <m:sty m:val="p"/>
+                              </m:rPr>
+                              <a:rPr lang="en-US" sz="5500" b="0" i="0" smtClean="0">
+                                <a:latin typeface="Cambria Math" charset="0"/>
+                                <a:ea typeface="Cambria Math" charset="0"/>
+                                <a:cs typeface="Cambria Math" charset="0"/>
+                              </a:rPr>
+                              <m:t>r</m:t>
+                            </m:r>
+                            <m:d>
+                              <m:dPr>
+                                <m:ctrlPr>
+                                  <a:rPr lang="en-US" sz="5500" b="0" i="1" smtClean="0">
+                                    <a:latin typeface="Cambria Math" charset="0"/>
+                                    <a:ea typeface="Cambria Math" charset="0"/>
+                                    <a:cs typeface="Cambria Math" charset="0"/>
+                                  </a:rPr>
+                                </m:ctrlPr>
+                              </m:dPr>
+                              <m:e>
+                                <m:r>
+                                  <a:rPr lang="en-US" sz="5500" b="0" i="0" smtClean="0">
+                                    <a:latin typeface="Cambria Math" charset="0"/>
+                                    <a:ea typeface="Cambria Math" charset="0"/>
+                                    <a:cs typeface="Cambria Math" charset="0"/>
+                                  </a:rPr>
+                                  <m:t>1+</m:t>
+                                </m:r>
+                                <m:r>
+                                  <m:rPr>
+                                    <m:sty m:val="p"/>
+                                  </m:rPr>
+                                  <a:rPr lang="en-US" sz="5500" b="0" i="0" smtClean="0">
+                                    <a:latin typeface="Cambria Math" charset="0"/>
+                                    <a:ea typeface="Cambria Math" charset="0"/>
+                                    <a:cs typeface="Cambria Math" charset="0"/>
+                                  </a:rPr>
+                                  <m:t>r</m:t>
+                                </m:r>
+                              </m:e>
+                            </m:d>
+                            <m:r>
+                              <a:rPr lang="en-US" sz="5500" b="0" i="1" baseline="30000" smtClean="0">
+                                <a:latin typeface="Cambria Math" charset="0"/>
+                                <a:ea typeface="Cambria Math" charset="0"/>
+                                <a:cs typeface="Cambria Math" charset="0"/>
+                              </a:rPr>
+                              <m:t>𝑛</m:t>
+                            </m:r>
+                            <m:r>
+                              <a:rPr lang="en-US" sz="5500" b="0" i="1" smtClean="0">
+                                <a:latin typeface="Cambria Math" charset="0"/>
+                                <a:ea typeface="Cambria Math" charset="0"/>
+                                <a:cs typeface="Cambria Math" charset="0"/>
+                              </a:rPr>
+                              <m:t> </m:t>
+                            </m:r>
+                          </m:num>
+                          <m:den>
+                            <m:d>
+                              <m:dPr>
+                                <m:ctrlPr>
+                                  <a:rPr lang="en-US" sz="5500" b="0" i="1" smtClean="0">
+                                    <a:latin typeface="Cambria Math" charset="0"/>
+                                    <a:ea typeface="Cambria Math" charset="0"/>
+                                    <a:cs typeface="Cambria Math" charset="0"/>
+                                  </a:rPr>
+                                </m:ctrlPr>
+                              </m:dPr>
+                              <m:e>
+                                <m:r>
+                                  <a:rPr lang="en-US" sz="5500" b="0" i="0" smtClean="0">
+                                    <a:latin typeface="Cambria Math" charset="0"/>
+                                    <a:ea typeface="Cambria Math" charset="0"/>
+                                    <a:cs typeface="Cambria Math" charset="0"/>
+                                  </a:rPr>
+                                  <m:t>1+</m:t>
+                                </m:r>
+                                <m:r>
+                                  <m:rPr>
+                                    <m:sty m:val="p"/>
+                                  </m:rPr>
+                                  <a:rPr lang="en-US" sz="5500" b="0" i="0" smtClean="0">
+                                    <a:latin typeface="Cambria Math" charset="0"/>
+                                    <a:ea typeface="Cambria Math" charset="0"/>
+                                    <a:cs typeface="Cambria Math" charset="0"/>
+                                  </a:rPr>
+                                  <m:t>r</m:t>
+                                </m:r>
+                              </m:e>
+                            </m:d>
+                            <m:r>
+                              <a:rPr lang="en-US" sz="5500" b="0" i="1" baseline="30000" smtClean="0">
+                                <a:latin typeface="Cambria Math" charset="0"/>
+                                <a:ea typeface="Cambria Math" charset="0"/>
+                                <a:cs typeface="Cambria Math" charset="0"/>
+                              </a:rPr>
+                              <m:t>𝑛</m:t>
+                            </m:r>
+                            <m:r>
+                              <a:rPr lang="en-US" sz="5500" b="0" i="1" smtClean="0">
+                                <a:latin typeface="Cambria Math" charset="0"/>
+                                <a:ea typeface="Cambria Math" charset="0"/>
+                                <a:cs typeface="Cambria Math" charset="0"/>
+                              </a:rPr>
+                              <m:t>−1</m:t>
+                            </m:r>
+                          </m:den>
+                        </m:f>
+                      </m:oMath>
+                    </m:oMathPara>
+                  </a14:m>
+                  <a:endParaRPr lang="en-US" sz="5500" dirty="0">
+                    <a:latin typeface="Cambria Math" charset="0"/>
+                    <a:ea typeface="Cambria Math" charset="0"/>
+                    <a:cs typeface="Cambria Math" charset="0"/>
+                  </a:endParaRPr>
+                </a:p>
+              </p:txBody>
+            </p:sp>
+          </mc:Choice>
+          <mc:Fallback xmlns="">
+            <p:sp>
+              <p:nvSpPr>
+                <p:cNvPr id="6" name="TextBox 5"/>
+                <p:cNvSpPr txBox="1">
+                  <a:spLocks noRot="1" noChangeAspect="1" noMove="1" noResize="1" noEditPoints="1" noAdjustHandles="1" noChangeArrowheads="1" noChangeShapeType="1" noTextEdit="1"/>
+                </p:cNvSpPr>
+                <p:nvPr/>
+              </p:nvSpPr>
+              <p:spPr>
+                <a:xfrm>
+                  <a:off x="155200" y="995433"/>
+                  <a:ext cx="5885009" cy="1854547"/>
+                </a:xfrm>
+                <a:prstGeom prst="rect">
+                  <a:avLst/>
+                </a:prstGeom>
+                <a:blipFill rotWithShape="0">
+                  <a:blip r:embed="rId2"/>
+                  <a:stretch>
+                    <a:fillRect/>
+                  </a:stretch>
+                </a:blipFill>
+              </p:spPr>
+              <p:txBody>
+                <a:bodyPr/>
+                <a:lstStyle/>
+                <a:p>
+                  <a:r>
+                    <a:rPr lang="en-US">
+                      <a:noFill/>
+                    </a:rPr>
+                    <a:t> </a:t>
+                  </a:r>
+                </a:p>
+              </p:txBody>
+            </p:sp>
+          </mc:Fallback>
+        </mc:AlternateContent>
+        <p:sp>
+          <p:nvSpPr>
+            <p:cNvPr id="7" name="TextBox 6"/>
+            <p:cNvSpPr txBox="1"/>
+            <p:nvPr/>
+          </p:nvSpPr>
+          <p:spPr>
+            <a:xfrm>
+              <a:off x="6645561" y="-74652"/>
+              <a:ext cx="4937760" cy="646331"/>
+            </a:xfrm>
+            <a:prstGeom prst="rect">
+              <a:avLst/>
+            </a:prstGeom>
+            <a:noFill/>
+          </p:spPr>
+          <p:txBody>
+            <a:bodyPr wrap="square" rtlCol="0">
+              <a:spAutoFit/>
+            </a:bodyPr>
+            <a:lstStyle/>
+            <a:p>
+              <a:r>
+                <a:rPr lang="en-US" sz="3600" b="1" dirty="0" smtClean="0"/>
+                <a:t>Python Calculation</a:t>
+              </a:r>
+              <a:endParaRPr lang="en-US" sz="3600" b="1" dirty="0"/>
+            </a:p>
+          </p:txBody>
+        </p:sp>
+        <p:sp>
+          <p:nvSpPr>
+            <p:cNvPr id="8" name="TextBox 7"/>
+            <p:cNvSpPr txBox="1"/>
+            <p:nvPr/>
+          </p:nvSpPr>
+          <p:spPr>
+            <a:xfrm>
+              <a:off x="-707739" y="3273734"/>
+              <a:ext cx="4937760" cy="646331"/>
+            </a:xfrm>
+            <a:prstGeom prst="rect">
+              <a:avLst/>
+            </a:prstGeom>
+            <a:noFill/>
+          </p:spPr>
+          <p:txBody>
+            <a:bodyPr wrap="square" rtlCol="0">
+              <a:spAutoFit/>
+            </a:bodyPr>
+            <a:lstStyle/>
+            <a:p>
+              <a:r>
+                <a:rPr lang="en-US" sz="3600" b="1" dirty="0" smtClean="0"/>
+                <a:t>Calculation</a:t>
+              </a:r>
+              <a:endParaRPr lang="en-US" sz="3600" b="1" dirty="0"/>
+            </a:p>
+          </p:txBody>
+        </p:sp>
+        <p:sp>
+          <p:nvSpPr>
+            <p:cNvPr id="9" name="TextBox 8"/>
+            <p:cNvSpPr txBox="1"/>
+            <p:nvPr/>
+          </p:nvSpPr>
+          <p:spPr>
+            <a:xfrm>
+              <a:off x="-707739" y="-74652"/>
+              <a:ext cx="4937760" cy="646331"/>
+            </a:xfrm>
+            <a:prstGeom prst="rect">
+              <a:avLst/>
+            </a:prstGeom>
+            <a:noFill/>
+          </p:spPr>
+          <p:txBody>
+            <a:bodyPr wrap="square" rtlCol="0">
+              <a:spAutoFit/>
+            </a:bodyPr>
+            <a:lstStyle/>
+            <a:p>
+              <a:r>
+                <a:rPr lang="en-US" sz="3600" b="1" dirty="0" smtClean="0"/>
+                <a:t>EMI Formula</a:t>
+              </a:r>
+              <a:endParaRPr lang="en-US" sz="3600" b="1" dirty="0"/>
+            </a:p>
+          </p:txBody>
+        </p:sp>
+        <mc:AlternateContent xmlns:mc="http://schemas.openxmlformats.org/markup-compatibility/2006">
+          <mc:Choice xmlns:a14="http://schemas.microsoft.com/office/drawing/2010/main" Requires="a14">
+            <p:sp>
+              <p:nvSpPr>
+                <p:cNvPr id="10" name="TextBox 9"/>
+                <p:cNvSpPr txBox="1"/>
+                <p:nvPr/>
+              </p:nvSpPr>
+              <p:spPr>
+                <a:xfrm>
+                  <a:off x="-707739" y="4343819"/>
+                  <a:ext cx="14035082" cy="1220719"/>
+                </a:xfrm>
+                <a:prstGeom prst="rect">
+                  <a:avLst/>
+                </a:prstGeom>
+                <a:noFill/>
+              </p:spPr>
+              <p:txBody>
+                <a:bodyPr wrap="square" rtlCol="0">
+                  <a:spAutoFit/>
+                </a:bodyPr>
+                <a:lstStyle/>
+                <a:p>
+                  <a:pPr algn="ctr"/>
+                  <a14:m>
                     <m:oMath xmlns:m="http://schemas.openxmlformats.org/officeDocument/2006/math">
                       <m:r>
                         <m:rPr>
-                          <m:sty m:val="p"/>
+                          <m:nor/>
                         </m:rPr>
-                        <a:rPr lang="en-US" sz="5500" b="0" i="0" smtClean="0">
+                        <a:rPr lang="en-US" sz="3200" b="0" i="0" dirty="0" smtClean="0">
                           <a:latin typeface="Cambria Math" charset="0"/>
                           <a:ea typeface="Cambria Math" charset="0"/>
                           <a:cs typeface="Cambria Math" charset="0"/>
                         </a:rPr>
-                        <m:t>P</m:t>
+                        <m:t>[31115+</m:t>
                       </m:r>
                       <m:r>
-                        <a:rPr lang="en-US" sz="5500" b="0" i="1" smtClean="0">
+                        <m:rPr>
+                          <m:nor/>
+                        </m:rPr>
+                        <a:rPr lang="en-US" sz="3200" dirty="0" smtClean="0">
                           <a:latin typeface="Cambria Math" charset="0"/>
                           <a:ea typeface="Cambria Math" charset="0"/>
                           <a:cs typeface="Cambria Math" charset="0"/>
                         </a:rPr>
-                        <m:t> ∗ </m:t>
+                        <m:t>(32615∗0.0975 )+(50+200+65+80) </m:t>
+                      </m:r>
+                      <m:r>
+                        <m:rPr>
+                          <m:nor/>
+                        </m:rPr>
+                        <a:rPr lang="en-US" sz="3200" b="0" i="0" dirty="0" smtClean="0">
+                          <a:latin typeface="Cambria Math" charset="0"/>
+                          <a:ea typeface="Cambria Math" charset="0"/>
+                          <a:cs typeface="Cambria Math" charset="0"/>
+                        </a:rPr>
+                        <m:t>]</m:t>
+                      </m:r>
+                    </m:oMath>
+                  </a14:m>
+                  <a:r>
+                    <a:rPr lang="en-US" sz="3200" dirty="0" smtClean="0">
+                      <a:latin typeface="Cambria Math" charset="0"/>
+                      <a:ea typeface="Cambria Math" charset="0"/>
+                      <a:cs typeface="Cambria Math" charset="0"/>
+                    </a:rPr>
+                    <a:t> </a:t>
+                  </a:r>
+                  <a14:m>
+                    <m:oMath xmlns:m="http://schemas.openxmlformats.org/officeDocument/2006/math">
+                      <m:r>
+                        <a:rPr lang="en-US" sz="3200" b="0" i="1" smtClean="0">
+                          <a:latin typeface="Cambria Math" charset="0"/>
+                          <a:ea typeface="Cambria Math" charset="0"/>
+                          <a:cs typeface="Cambria Math" charset="0"/>
+                        </a:rPr>
+                        <m:t>∗ </m:t>
                       </m:r>
                       <m:f>
                         <m:fPr>
                           <m:ctrlPr>
-                            <a:rPr lang="mr-IN" sz="5500" b="0" i="1" smtClean="0">
+                            <a:rPr lang="mr-IN" sz="3200" b="0" i="1" smtClean="0">
                               <a:latin typeface="Cambria Math" charset="0"/>
                               <a:ea typeface="Cambria Math" charset="0"/>
                               <a:cs typeface="Cambria Math" charset="0"/>
@@ -4308,21 +4635,57 @@
                           </m:ctrlPr>
                         </m:fPr>
                         <m:num>
-                          <m:r>
-                            <m:rPr>
-                              <m:sty m:val="p"/>
-                            </m:rPr>
-                            <a:rPr lang="en-US" sz="5500" b="0" i="0" smtClean="0">
-                              <a:latin typeface="Cambria Math" charset="0"/>
-                              <a:ea typeface="Cambria Math" charset="0"/>
-                              <a:cs typeface="Cambria Math" charset="0"/>
-                            </a:rPr>
-                            <m:t>r</m:t>
-                          </m:r>
+                          <m:f>
+                            <m:fPr>
+                              <m:ctrlPr>
+                                <a:rPr lang="mr-IN" sz="3200" b="0" i="1" smtClean="0">
+                                  <a:latin typeface="Cambria Math" charset="0"/>
+                                  <a:ea typeface="Cambria Math" charset="0"/>
+                                  <a:cs typeface="Cambria Math" charset="0"/>
+                                </a:rPr>
+                              </m:ctrlPr>
+                            </m:fPr>
+                            <m:num>
+                              <m:r>
+                                <a:rPr lang="en-US" sz="3200" b="0" i="1" smtClean="0">
+                                  <a:latin typeface="Cambria Math" charset="0"/>
+                                  <a:ea typeface="Cambria Math" charset="0"/>
+                                  <a:cs typeface="Cambria Math" charset="0"/>
+                                </a:rPr>
+                                <m:t>0.0</m:t>
+                              </m:r>
+                              <m:r>
+                                <a:rPr lang="en-US" sz="3200" b="0" i="1" smtClean="0">
+                                  <a:latin typeface="Cambria Math" charset="0"/>
+                                  <a:ea typeface="Cambria Math" charset="0"/>
+                                  <a:cs typeface="Cambria Math" charset="0"/>
+                                </a:rPr>
+                                <m:t>7</m:t>
+                              </m:r>
+                              <m:r>
+                                <a:rPr lang="en-US" sz="3200" b="0" i="1" smtClean="0">
+                                  <a:latin typeface="Cambria Math" charset="0"/>
+                                  <a:ea typeface="Cambria Math" charset="0"/>
+                                  <a:cs typeface="Cambria Math" charset="0"/>
+                                </a:rPr>
+                                <m:t>02</m:t>
+                              </m:r>
+                            </m:num>
+                            <m:den>
+                              <m:r>
+                                <a:rPr lang="en-US" sz="3200" b="0" i="1" smtClean="0">
+                                  <a:latin typeface="Cambria Math" charset="0"/>
+                                  <a:ea typeface="Cambria Math" charset="0"/>
+                                  <a:cs typeface="Cambria Math" charset="0"/>
+                                </a:rPr>
+                                <m:t>12</m:t>
+                              </m:r>
+                            </m:den>
+                          </m:f>
                           <m:d>
                             <m:dPr>
                               <m:ctrlPr>
-                                <a:rPr lang="en-US" sz="5500" b="0" i="1" smtClean="0">
+                                <a:rPr lang="en-US" sz="3200" b="0" i="1" smtClean="0">
                                   <a:latin typeface="Cambria Math" charset="0"/>
                                   <a:ea typeface="Cambria Math" charset="0"/>
                                   <a:cs typeface="Cambria Math" charset="0"/>
@@ -4331,36 +4694,56 @@
                             </m:dPr>
                             <m:e>
                               <m:r>
-                                <a:rPr lang="en-US" sz="5500" b="0" i="0" smtClean="0">
+                                <a:rPr lang="en-US" sz="3200" b="0" i="0" smtClean="0">
                                   <a:latin typeface="Cambria Math" charset="0"/>
                                   <a:ea typeface="Cambria Math" charset="0"/>
                                   <a:cs typeface="Cambria Math" charset="0"/>
                                 </a:rPr>
                                 <m:t>1+</m:t>
                               </m:r>
-                              <m:r>
-                                <m:rPr>
-                                  <m:sty m:val="p"/>
-                                </m:rPr>
-                                <a:rPr lang="en-US" sz="5500" b="0" i="0" smtClean="0">
-                                  <a:latin typeface="Cambria Math" charset="0"/>
-                                  <a:ea typeface="Cambria Math" charset="0"/>
-                                  <a:cs typeface="Cambria Math" charset="0"/>
-                                </a:rPr>
-                                <m:t>r</m:t>
-                              </m:r>
+                              <m:f>
+                                <m:fPr>
+                                  <m:ctrlPr>
+                                    <a:rPr lang="mr-IN" sz="3200" b="0" i="1" smtClean="0">
+                                      <a:latin typeface="Cambria Math" charset="0"/>
+                                      <a:ea typeface="Cambria Math" charset="0"/>
+                                      <a:cs typeface="Cambria Math" charset="0"/>
+                                    </a:rPr>
+                                  </m:ctrlPr>
+                                </m:fPr>
+                                <m:num>
+                                  <m:r>
+                                    <a:rPr lang="en-US" sz="3200" b="0" i="1" smtClean="0">
+                                      <a:latin typeface="Cambria Math" charset="0"/>
+                                      <a:ea typeface="Cambria Math" charset="0"/>
+                                      <a:cs typeface="Cambria Math" charset="0"/>
+                                    </a:rPr>
+                                    <m:t>0.0702</m:t>
+                                  </m:r>
+                                </m:num>
+                                <m:den>
+                                  <m:r>
+                                    <a:rPr lang="en-US" sz="3200" b="0" i="1" smtClean="0">
+                                      <a:latin typeface="Cambria Math" charset="0"/>
+                                      <a:ea typeface="Cambria Math" charset="0"/>
+                                      <a:cs typeface="Cambria Math" charset="0"/>
+                                    </a:rPr>
+                                    <m:t>12</m:t>
+                                  </m:r>
+                                </m:den>
+                              </m:f>
                             </m:e>
                           </m:d>
                           <m:r>
-                            <a:rPr lang="en-US" sz="5500" b="0" i="1" baseline="30000" smtClean="0">
+                            <a:rPr lang="en-US" sz="3200" b="0" i="1" baseline="30000" smtClean="0">
                               <a:latin typeface="Cambria Math" charset="0"/>
                               <a:ea typeface="Cambria Math" charset="0"/>
                               <a:cs typeface="Cambria Math" charset="0"/>
                             </a:rPr>
-                            <m:t>𝑛</m:t>
+                            <m:t>60</m:t>
                           </m:r>
                           <m:r>
-                            <a:rPr lang="en-US" sz="5500" b="0" i="1" smtClean="0">
+                            <a:rPr lang="en-US" sz="3200" b="0" i="1" smtClean="0">
                               <a:latin typeface="Cambria Math" charset="0"/>
                               <a:ea typeface="Cambria Math" charset="0"/>
                               <a:cs typeface="Cambria Math" charset="0"/>
@@ -4372,7 +4755,7 @@
                           <m:d>
                             <m:dPr>
                               <m:ctrlPr>
-                                <a:rPr lang="en-US" sz="5500" b="0" i="1" smtClean="0">
+                                <a:rPr lang="en-US" sz="3200" b="0" i="1" smtClean="0">
                                   <a:latin typeface="Cambria Math" charset="0"/>
                                   <a:ea typeface="Cambria Math" charset="0"/>
                                   <a:cs typeface="Cambria Math" charset="0"/>
@@ -4381,36 +4764,56 @@
                             </m:dPr>
                             <m:e>
                               <m:r>
-                                <a:rPr lang="en-US" sz="5500" b="0" i="0" smtClean="0">
+                                <a:rPr lang="en-US" sz="3200" b="0" i="0" smtClean="0">
                                   <a:latin typeface="Cambria Math" charset="0"/>
                                   <a:ea typeface="Cambria Math" charset="0"/>
                                   <a:cs typeface="Cambria Math" charset="0"/>
                                 </a:rPr>
                                 <m:t>1+</m:t>
                               </m:r>
-                              <m:r>
-                                <m:rPr>
-                                  <m:sty m:val="p"/>
-                                </m:rPr>
-                                <a:rPr lang="en-US" sz="5500" b="0" i="0" smtClean="0">
-                                  <a:latin typeface="Cambria Math" charset="0"/>
-                                  <a:ea typeface="Cambria Math" charset="0"/>
-                                  <a:cs typeface="Cambria Math" charset="0"/>
-                                </a:rPr>
-                                <m:t>r</m:t>
-                              </m:r>
+                              <m:f>
+                                <m:fPr>
+                                  <m:ctrlPr>
+                                    <a:rPr lang="mr-IN" sz="3200" b="0" i="1" smtClean="0">
+                                      <a:latin typeface="Cambria Math" charset="0"/>
+                                      <a:ea typeface="Cambria Math" charset="0"/>
+                                      <a:cs typeface="Cambria Math" charset="0"/>
+                                    </a:rPr>
+                                  </m:ctrlPr>
+                                </m:fPr>
+                                <m:num>
+                                  <m:r>
+                                    <a:rPr lang="en-US" sz="3200" b="0" i="1" smtClean="0">
+                                      <a:latin typeface="Cambria Math" charset="0"/>
+                                      <a:ea typeface="Cambria Math" charset="0"/>
+                                      <a:cs typeface="Cambria Math" charset="0"/>
+                                    </a:rPr>
+                                    <m:t>0.0702</m:t>
+                                  </m:r>
+                                </m:num>
+                                <m:den>
+                                  <m:r>
+                                    <a:rPr lang="en-US" sz="3200" b="0" i="1" smtClean="0">
+                                      <a:latin typeface="Cambria Math" charset="0"/>
+                                      <a:ea typeface="Cambria Math" charset="0"/>
+                                      <a:cs typeface="Cambria Math" charset="0"/>
+                                    </a:rPr>
+                                    <m:t>12</m:t>
+                                  </m:r>
+                                </m:den>
+                              </m:f>
                             </m:e>
                           </m:d>
                           <m:r>
-                            <a:rPr lang="en-US" sz="5500" b="0" i="1" baseline="30000" smtClean="0">
+                            <a:rPr lang="en-US" sz="3200" b="0" i="1" baseline="30000" smtClean="0">
                               <a:latin typeface="Cambria Math" charset="0"/>
                               <a:ea typeface="Cambria Math" charset="0"/>
                               <a:cs typeface="Cambria Math" charset="0"/>
                             </a:rPr>
-                            <m:t>𝑛</m:t>
+                            <m:t>60</m:t>
                           </m:r>
                           <m:r>
-                            <a:rPr lang="en-US" sz="5500" b="0" i="1" smtClean="0">
+                            <a:rPr lang="en-US" sz="3200" b="0" i="1" smtClean="0">
                               <a:latin typeface="Cambria Math" charset="0"/>
                               <a:ea typeface="Cambria Math" charset="0"/>
                               <a:cs typeface="Cambria Math" charset="0"/>
@@ -4420,531 +4823,89 @@
                         </m:den>
                       </m:f>
                     </m:oMath>
-                  </m:oMathPara>
-                </a14:m>
-                <a:endParaRPr lang="en-US" sz="5500" dirty="0">
-                  <a:latin typeface="Cambria Math" charset="0"/>
-                  <a:ea typeface="Cambria Math" charset="0"/>
-                  <a:cs typeface="Cambria Math" charset="0"/>
-                </a:endParaRPr>
-              </a:p>
-            </p:txBody>
-          </p:sp>
-        </mc:Choice>
-        <mc:Fallback>
-          <p:sp>
-            <p:nvSpPr>
-              <p:cNvPr id="6" name="TextBox 5"/>
-              <p:cNvSpPr txBox="1">
-                <a:spLocks noRot="1" noChangeAspect="1" noMove="1" noResize="1" noEditPoints="1" noAdjustHandles="1" noChangeArrowheads="1" noChangeShapeType="1" noTextEdit="1"/>
-              </p:cNvSpPr>
-              <p:nvPr/>
-            </p:nvSpPr>
-            <p:spPr>
-              <a:xfrm>
-                <a:off x="155200" y="995433"/>
-                <a:ext cx="5885009" cy="1854547"/>
-              </a:xfrm>
-              <a:prstGeom prst="rect">
-                <a:avLst/>
-              </a:prstGeom>
-              <a:blipFill rotWithShape="0">
-                <a:blip r:embed="rId3"/>
-                <a:stretch>
-                  <a:fillRect/>
-                </a:stretch>
-              </a:blipFill>
-            </p:spPr>
-            <p:txBody>
-              <a:bodyPr/>
-              <a:lstStyle/>
-              <a:p>
-                <a:r>
-                  <a:rPr lang="en-US">
-                    <a:noFill/>
-                  </a:rPr>
-                  <a:t> </a:t>
-                </a:r>
-              </a:p>
-            </p:txBody>
-          </p:sp>
-        </mc:Fallback>
-      </mc:AlternateContent>
-      <p:sp>
-        <p:nvSpPr>
-          <p:cNvPr id="7" name="TextBox 6"/>
-          <p:cNvSpPr txBox="1"/>
-          <p:nvPr/>
-        </p:nvSpPr>
-        <p:spPr>
-          <a:xfrm>
-            <a:off x="6645561" y="-74652"/>
-            <a:ext cx="4937760" cy="646331"/>
-          </a:xfrm>
-          <a:prstGeom prst="rect">
-            <a:avLst/>
-          </a:prstGeom>
-          <a:noFill/>
-        </p:spPr>
-        <p:txBody>
-          <a:bodyPr wrap="square" rtlCol="0">
-            <a:spAutoFit/>
-          </a:bodyPr>
-          <a:lstStyle/>
-          <a:p>
-            <a:r>
-              <a:rPr lang="en-US" sz="3600" b="1" dirty="0" smtClean="0"/>
-              <a:t>Python Calculation</a:t>
-            </a:r>
-            <a:endParaRPr lang="en-US" sz="3600" b="1" dirty="0"/>
-          </a:p>
-        </p:txBody>
-      </p:sp>
-      <p:sp>
-        <p:nvSpPr>
-          <p:cNvPr id="8" name="TextBox 7"/>
-          <p:cNvSpPr txBox="1"/>
-          <p:nvPr/>
-        </p:nvSpPr>
-        <p:spPr>
-          <a:xfrm>
-            <a:off x="-707739" y="3273734"/>
-            <a:ext cx="4937760" cy="646331"/>
-          </a:xfrm>
-          <a:prstGeom prst="rect">
-            <a:avLst/>
-          </a:prstGeom>
-          <a:noFill/>
-        </p:spPr>
-        <p:txBody>
-          <a:bodyPr wrap="square" rtlCol="0">
-            <a:spAutoFit/>
-          </a:bodyPr>
-          <a:lstStyle/>
-          <a:p>
-            <a:r>
-              <a:rPr lang="en-US" sz="3600" b="1" dirty="0" smtClean="0"/>
-              <a:t>Principal Calculation</a:t>
-            </a:r>
-            <a:endParaRPr lang="en-US" sz="3600" b="1" dirty="0"/>
-          </a:p>
-        </p:txBody>
-      </p:sp>
-      <p:sp>
-        <p:nvSpPr>
-          <p:cNvPr id="9" name="TextBox 8"/>
-          <p:cNvSpPr txBox="1"/>
-          <p:nvPr/>
-        </p:nvSpPr>
-        <p:spPr>
-          <a:xfrm>
-            <a:off x="-707739" y="-74652"/>
-            <a:ext cx="4937760" cy="646331"/>
-          </a:xfrm>
-          <a:prstGeom prst="rect">
-            <a:avLst/>
-          </a:prstGeom>
-          <a:noFill/>
-        </p:spPr>
-        <p:txBody>
-          <a:bodyPr wrap="square" rtlCol="0">
-            <a:spAutoFit/>
-          </a:bodyPr>
-          <a:lstStyle/>
-          <a:p>
-            <a:r>
-              <a:rPr lang="en-US" sz="3600" b="1" dirty="0" smtClean="0"/>
-              <a:t>EMI Formula</a:t>
-            </a:r>
-            <a:endParaRPr lang="en-US" sz="3600" b="1" dirty="0"/>
-          </a:p>
-        </p:txBody>
-      </p:sp>
-      <mc:AlternateContent xmlns:mc="http://schemas.openxmlformats.org/markup-compatibility/2006">
-        <mc:Choice xmlns:a14="http://schemas.microsoft.com/office/drawing/2010/main" Requires="a14">
-          <p:sp>
-            <p:nvSpPr>
-              <p:cNvPr id="10" name="TextBox 9"/>
-              <p:cNvSpPr txBox="1"/>
-              <p:nvPr/>
-            </p:nvSpPr>
-            <p:spPr>
-              <a:xfrm>
-                <a:off x="-6286500" y="4343820"/>
-                <a:ext cx="21164549" cy="3349507"/>
-              </a:xfrm>
-              <a:prstGeom prst="rect">
-                <a:avLst/>
-              </a:prstGeom>
-              <a:noFill/>
-            </p:spPr>
-            <p:txBody>
-              <a:bodyPr wrap="square" rtlCol="0">
-                <a:spAutoFit/>
-              </a:bodyPr>
-              <a:lstStyle/>
-              <a:p>
-                <a:pPr algn="ctr"/>
-                <a14:m>
-                  <m:oMath xmlns:m="http://schemas.openxmlformats.org/officeDocument/2006/math">
-                    <m:r>
-                      <m:rPr>
-                        <m:nor/>
-                      </m:rPr>
-                      <a:rPr lang="en-US" sz="4000" dirty="0" smtClean="0">
-                        <a:latin typeface="Cambria Math" charset="0"/>
-                        <a:ea typeface="Cambria Math" charset="0"/>
-                        <a:cs typeface="Cambria Math" charset="0"/>
-                      </a:rPr>
-                      <m:t>(</m:t>
-                    </m:r>
-                    <m:r>
-                      <m:rPr>
-                        <m:nor/>
-                      </m:rPr>
-                      <a:rPr lang="en-US" sz="4000" b="0" i="0" dirty="0" smtClean="0">
-                        <a:latin typeface="Cambria Math" charset="0"/>
-                        <a:ea typeface="Cambria Math" charset="0"/>
-                        <a:cs typeface="Cambria Math" charset="0"/>
-                      </a:rPr>
-                      <m:t>31115 + </m:t>
-                    </m:r>
-                    <m:r>
-                      <m:rPr>
-                        <m:nor/>
-                      </m:rPr>
-                      <a:rPr lang="en-US" sz="4000" dirty="0" smtClean="0">
-                        <a:latin typeface="Cambria Math" charset="0"/>
-                        <a:ea typeface="Cambria Math" charset="0"/>
-                        <a:cs typeface="Cambria Math" charset="0"/>
-                      </a:rPr>
-                      <m:t>(32615 * 0.0975 ) + (50 + 200 + 65 + 80) )</m:t>
-                    </m:r>
-                  </m:oMath>
-                </a14:m>
-                <a:r>
-                  <a:rPr lang="en-US" sz="4000" dirty="0" smtClean="0">
-                    <a:latin typeface="Cambria Math" charset="0"/>
-                    <a:ea typeface="Cambria Math" charset="0"/>
-                    <a:cs typeface="Cambria Math" charset="0"/>
-                  </a:rPr>
-                  <a:t> = </a:t>
-                </a:r>
-                <a:endParaRPr lang="en-US" sz="4000" dirty="0">
-                  <a:latin typeface="Cambria Math" charset="0"/>
-                  <a:ea typeface="Cambria Math" charset="0"/>
-                  <a:cs typeface="Cambria Math" charset="0"/>
-                </a:endParaRPr>
-              </a:p>
-              <a:p>
-                <a:pPr algn="ctr"/>
-                <a14:m>
-                  <m:oMathPara xmlns:m="http://schemas.openxmlformats.org/officeDocument/2006/math">
-                    <m:oMathParaPr>
-                      <m:jc m:val="centerGroup"/>
-                    </m:oMathParaPr>
-                    <m:oMath xmlns:m="http://schemas.openxmlformats.org/officeDocument/2006/math">
-                      <m:r>
-                        <a:rPr lang="en-US" sz="4000" b="0" i="1" smtClean="0">
-                          <a:latin typeface="Cambria Math" charset="0"/>
-                          <a:ea typeface="Cambria Math" charset="0"/>
-                          <a:cs typeface="Cambria Math" charset="0"/>
-                        </a:rPr>
-                        <m:t> </m:t>
-                      </m:r>
-                    </m:oMath>
-                  </m:oMathPara>
-                </a14:m>
-                <a:endParaRPr lang="en-US" sz="4000" b="0" i="1" dirty="0" smtClean="0">
-                  <a:latin typeface="Cambria Math" charset="0"/>
-                  <a:ea typeface="Cambria Math" charset="0"/>
-                  <a:cs typeface="Cambria Math" charset="0"/>
-                </a:endParaRPr>
-              </a:p>
-              <a:p>
-                <a:pPr algn="ctr"/>
-                <a:endParaRPr lang="en-US" sz="4000" b="0" i="1" smtClean="0">
-                  <a:latin typeface="Cambria Math" charset="0"/>
-                  <a:ea typeface="Cambria Math" charset="0"/>
-                  <a:cs typeface="Cambria Math" charset="0"/>
-                </a:endParaRPr>
-              </a:p>
-              <a:p>
-                <a:pPr algn="ctr"/>
-                <a14:m>
-                  <m:oMath xmlns:m="http://schemas.openxmlformats.org/officeDocument/2006/math">
-                    <m:r>
-                      <a:rPr lang="en-US" sz="4000" b="0" i="1" smtClean="0">
-                        <a:latin typeface="Cambria Math" charset="0"/>
-                        <a:ea typeface="Cambria Math" charset="0"/>
-                        <a:cs typeface="Cambria Math" charset="0"/>
-                      </a:rPr>
-                      <m:t>∗ </m:t>
-                    </m:r>
-                    <m:f>
-                      <m:fPr>
-                        <m:ctrlPr>
-                          <a:rPr lang="mr-IN" sz="4000" b="0" i="1" smtClean="0">
-                            <a:latin typeface="Cambria Math" charset="0"/>
-                            <a:ea typeface="Cambria Math" charset="0"/>
-                            <a:cs typeface="Cambria Math" charset="0"/>
-                          </a:rPr>
-                        </m:ctrlPr>
-                      </m:fPr>
-                      <m:num>
-                        <m:f>
-                          <m:fPr>
-                            <m:ctrlPr>
-                              <a:rPr lang="mr-IN" sz="4000" b="0" i="1" smtClean="0">
-                                <a:latin typeface="Cambria Math" charset="0"/>
-                                <a:ea typeface="Cambria Math" charset="0"/>
-                                <a:cs typeface="Cambria Math" charset="0"/>
-                              </a:rPr>
-                            </m:ctrlPr>
-                          </m:fPr>
-                          <m:num>
-                            <m:r>
-                              <a:rPr lang="en-US" sz="4000" b="0" i="1" smtClean="0">
-                                <a:latin typeface="Cambria Math" charset="0"/>
-                                <a:ea typeface="Cambria Math" charset="0"/>
-                                <a:cs typeface="Cambria Math" charset="0"/>
-                              </a:rPr>
-                              <m:t>0.0</m:t>
-                            </m:r>
-                            <m:r>
-                              <a:rPr lang="en-US" sz="4000" b="0" i="1" smtClean="0">
-                                <a:latin typeface="Cambria Math" charset="0"/>
-                                <a:ea typeface="Cambria Math" charset="0"/>
-                                <a:cs typeface="Cambria Math" charset="0"/>
-                              </a:rPr>
-                              <m:t>9</m:t>
-                            </m:r>
-                            <m:r>
-                              <a:rPr lang="en-US" sz="4000" b="0" i="1" smtClean="0">
-                                <a:latin typeface="Cambria Math" charset="0"/>
-                                <a:ea typeface="Cambria Math" charset="0"/>
-                                <a:cs typeface="Cambria Math" charset="0"/>
-                              </a:rPr>
-                              <m:t>02</m:t>
-                            </m:r>
-                          </m:num>
-                          <m:den>
-                            <m:r>
-                              <a:rPr lang="en-US" sz="4000" b="0" i="1" smtClean="0">
-                                <a:latin typeface="Cambria Math" charset="0"/>
-                                <a:ea typeface="Cambria Math" charset="0"/>
-                                <a:cs typeface="Cambria Math" charset="0"/>
-                              </a:rPr>
-                              <m:t>12</m:t>
-                            </m:r>
-                          </m:den>
-                        </m:f>
-                        <m:d>
-                          <m:dPr>
-                            <m:ctrlPr>
-                              <a:rPr lang="en-US" sz="4000" b="0" i="1" smtClean="0">
-                                <a:latin typeface="Cambria Math" charset="0"/>
-                                <a:ea typeface="Cambria Math" charset="0"/>
-                                <a:cs typeface="Cambria Math" charset="0"/>
-                              </a:rPr>
-                            </m:ctrlPr>
-                          </m:dPr>
-                          <m:e>
-                            <m:r>
-                              <a:rPr lang="en-US" sz="4000" b="0" i="0" smtClean="0">
-                                <a:latin typeface="Cambria Math" charset="0"/>
-                                <a:ea typeface="Cambria Math" charset="0"/>
-                                <a:cs typeface="Cambria Math" charset="0"/>
-                              </a:rPr>
-                              <m:t>1+</m:t>
-                            </m:r>
-                            <m:f>
-                              <m:fPr>
-                                <m:ctrlPr>
-                                  <a:rPr lang="mr-IN" sz="4000" b="0" i="1" smtClean="0">
-                                    <a:latin typeface="Cambria Math" charset="0"/>
-                                    <a:ea typeface="Cambria Math" charset="0"/>
-                                    <a:cs typeface="Cambria Math" charset="0"/>
-                                  </a:rPr>
-                                </m:ctrlPr>
-                              </m:fPr>
-                              <m:num>
-                                <m:r>
-                                  <a:rPr lang="en-US" sz="4000" b="0" i="1" smtClean="0">
-                                    <a:latin typeface="Cambria Math" charset="0"/>
-                                    <a:ea typeface="Cambria Math" charset="0"/>
-                                    <a:cs typeface="Cambria Math" charset="0"/>
-                                  </a:rPr>
-                                  <m:t>0.0702</m:t>
-                                </m:r>
-                              </m:num>
-                              <m:den>
-                                <m:r>
-                                  <a:rPr lang="en-US" sz="4000" b="0" i="1" smtClean="0">
-                                    <a:latin typeface="Cambria Math" charset="0"/>
-                                    <a:ea typeface="Cambria Math" charset="0"/>
-                                    <a:cs typeface="Cambria Math" charset="0"/>
-                                  </a:rPr>
-                                  <m:t>12</m:t>
-                                </m:r>
-                              </m:den>
-                            </m:f>
-                          </m:e>
-                        </m:d>
-                        <m:r>
-                          <a:rPr lang="en-US" sz="4000" b="0" i="1" baseline="30000" smtClean="0">
-                            <a:latin typeface="Cambria Math" charset="0"/>
-                            <a:ea typeface="Cambria Math" charset="0"/>
-                            <a:cs typeface="Cambria Math" charset="0"/>
-                          </a:rPr>
-                          <m:t>60</m:t>
-                        </m:r>
-                        <m:r>
-                          <a:rPr lang="en-US" sz="4000" b="0" i="1" smtClean="0">
-                            <a:latin typeface="Cambria Math" charset="0"/>
-                            <a:ea typeface="Cambria Math" charset="0"/>
-                            <a:cs typeface="Cambria Math" charset="0"/>
-                          </a:rPr>
-                          <m:t> </m:t>
-                        </m:r>
-                      </m:num>
-                      <m:den>
-                        <m:d>
-                          <m:dPr>
-                            <m:ctrlPr>
-                              <a:rPr lang="en-US" sz="4000" b="0" i="1" smtClean="0">
-                                <a:latin typeface="Cambria Math" charset="0"/>
-                                <a:ea typeface="Cambria Math" charset="0"/>
-                                <a:cs typeface="Cambria Math" charset="0"/>
-                              </a:rPr>
-                            </m:ctrlPr>
-                          </m:dPr>
-                          <m:e>
-                            <m:r>
-                              <a:rPr lang="en-US" sz="4000" b="0" i="0" smtClean="0">
-                                <a:latin typeface="Cambria Math" charset="0"/>
-                                <a:ea typeface="Cambria Math" charset="0"/>
-                                <a:cs typeface="Cambria Math" charset="0"/>
-                              </a:rPr>
-                              <m:t>1+</m:t>
-                            </m:r>
-                            <m:f>
-                              <m:fPr>
-                                <m:ctrlPr>
-                                  <a:rPr lang="mr-IN" sz="4000" b="0" i="1" smtClean="0">
-                                    <a:latin typeface="Cambria Math" charset="0"/>
-                                    <a:ea typeface="Cambria Math" charset="0"/>
-                                    <a:cs typeface="Cambria Math" charset="0"/>
-                                  </a:rPr>
-                                </m:ctrlPr>
-                              </m:fPr>
-                              <m:num>
-                                <m:r>
-                                  <a:rPr lang="en-US" sz="4000" b="0" i="1" smtClean="0">
-                                    <a:latin typeface="Cambria Math" charset="0"/>
-                                    <a:ea typeface="Cambria Math" charset="0"/>
-                                    <a:cs typeface="Cambria Math" charset="0"/>
-                                  </a:rPr>
-                                  <m:t>0.0702</m:t>
-                                </m:r>
-                              </m:num>
-                              <m:den>
-                                <m:r>
-                                  <a:rPr lang="en-US" sz="4000" b="0" i="1" smtClean="0">
-                                    <a:latin typeface="Cambria Math" charset="0"/>
-                                    <a:ea typeface="Cambria Math" charset="0"/>
-                                    <a:cs typeface="Cambria Math" charset="0"/>
-                                  </a:rPr>
-                                  <m:t>12</m:t>
-                                </m:r>
-                              </m:den>
-                            </m:f>
-                          </m:e>
-                        </m:d>
-                        <m:r>
-                          <a:rPr lang="en-US" sz="4000" b="0" i="1" baseline="30000" smtClean="0">
-                            <a:latin typeface="Cambria Math" charset="0"/>
-                            <a:ea typeface="Cambria Math" charset="0"/>
-                            <a:cs typeface="Cambria Math" charset="0"/>
-                          </a:rPr>
-                          <m:t>60</m:t>
-                        </m:r>
-                        <m:r>
-                          <a:rPr lang="en-US" sz="4000" b="0" i="1" smtClean="0">
-                            <a:latin typeface="Cambria Math" charset="0"/>
-                            <a:ea typeface="Cambria Math" charset="0"/>
-                            <a:cs typeface="Cambria Math" charset="0"/>
-                          </a:rPr>
-                          <m:t>−1</m:t>
-                        </m:r>
-                      </m:den>
-                    </m:f>
-                  </m:oMath>
-                </a14:m>
-                <a:r>
-                  <a:rPr lang="en-US" sz="4000" dirty="0" smtClean="0">
-                    <a:latin typeface="Cambria Math" charset="0"/>
-                    <a:ea typeface="Cambria Math" charset="0"/>
-                    <a:cs typeface="Cambria Math" charset="0"/>
-                  </a:rPr>
-                  <a:t> = $</a:t>
-                </a:r>
-                <a:r>
-                  <a:rPr lang="en-US" sz="4000" dirty="0" smtClean="0">
-                    <a:latin typeface="Cambria Math" charset="0"/>
-                    <a:ea typeface="Cambria Math" charset="0"/>
-                    <a:cs typeface="Cambria Math" charset="0"/>
-                  </a:rPr>
-                  <a:t>687.64</a:t>
-                </a:r>
-                <a:endParaRPr lang="en-US" sz="4000" dirty="0" smtClean="0">
-                  <a:latin typeface="Cambria Math" charset="0"/>
-                  <a:ea typeface="Cambria Math" charset="0"/>
-                  <a:cs typeface="Cambria Math" charset="0"/>
-                </a:endParaRPr>
-              </a:p>
-            </p:txBody>
-          </p:sp>
-        </mc:Choice>
-        <mc:Fallback>
-          <p:sp>
-            <p:nvSpPr>
-              <p:cNvPr id="10" name="TextBox 9"/>
-              <p:cNvSpPr txBox="1">
-                <a:spLocks noRot="1" noChangeAspect="1" noMove="1" noResize="1" noEditPoints="1" noAdjustHandles="1" noChangeArrowheads="1" noChangeShapeType="1" noTextEdit="1"/>
-              </p:cNvSpPr>
-              <p:nvPr/>
-            </p:nvSpPr>
-            <p:spPr>
-              <a:xfrm>
-                <a:off x="-6286500" y="4343820"/>
-                <a:ext cx="21164549" cy="3349507"/>
-              </a:xfrm>
-              <a:prstGeom prst="rect">
-                <a:avLst/>
-              </a:prstGeom>
-              <a:blipFill rotWithShape="0">
-                <a:blip r:embed="rId4"/>
-                <a:stretch>
-                  <a:fillRect t="-3279"/>
-                </a:stretch>
-              </a:blipFill>
-            </p:spPr>
-            <p:txBody>
-              <a:bodyPr/>
-              <a:lstStyle/>
-              <a:p>
-                <a:r>
-                  <a:rPr lang="en-US">
-                    <a:noFill/>
-                  </a:rPr>
-                  <a:t> </a:t>
-                </a:r>
-              </a:p>
-            </p:txBody>
-          </p:sp>
-        </mc:Fallback>
-      </mc:AlternateContent>
+                  </a14:m>
+                  <a:r>
+                    <a:rPr lang="en-US" sz="3200" dirty="0" smtClean="0">
+                      <a:latin typeface="Cambria Math" charset="0"/>
+                      <a:ea typeface="Cambria Math" charset="0"/>
+                      <a:cs typeface="Cambria Math" charset="0"/>
+                    </a:rPr>
+                    <a:t> = $687.23</a:t>
+                  </a:r>
+                </a:p>
+              </p:txBody>
+            </p:sp>
+          </mc:Choice>
+          <mc:Fallback>
+            <p:sp>
+              <p:nvSpPr>
+                <p:cNvPr id="10" name="TextBox 9"/>
+                <p:cNvSpPr txBox="1">
+                  <a:spLocks noRot="1" noChangeAspect="1" noMove="1" noResize="1" noEditPoints="1" noAdjustHandles="1" noChangeArrowheads="1" noChangeShapeType="1" noTextEdit="1"/>
+                </p:cNvSpPr>
+                <p:nvPr/>
+              </p:nvSpPr>
+              <p:spPr>
+                <a:xfrm>
+                  <a:off x="-707739" y="4343819"/>
+                  <a:ext cx="14035082" cy="1220719"/>
+                </a:xfrm>
+                <a:prstGeom prst="rect">
+                  <a:avLst/>
+                </a:prstGeom>
+                <a:blipFill rotWithShape="0">
+                  <a:blip r:embed="rId3"/>
+                  <a:stretch>
+                    <a:fillRect/>
+                  </a:stretch>
+                </a:blipFill>
+              </p:spPr>
+              <p:txBody>
+                <a:bodyPr/>
+                <a:lstStyle/>
+                <a:p>
+                  <a:r>
+                    <a:rPr lang="en-US">
+                      <a:noFill/>
+                    </a:rPr>
+                    <a:t> </a:t>
+                  </a:r>
+                </a:p>
+              </p:txBody>
+            </p:sp>
+          </mc:Fallback>
+        </mc:AlternateContent>
+        <p:pic>
+          <p:nvPicPr>
+            <p:cNvPr id="3" name="Picture 2"/>
+            <p:cNvPicPr>
+              <a:picLocks noChangeAspect="1"/>
+            </p:cNvPicPr>
+            <p:nvPr/>
+          </p:nvPicPr>
+          <p:blipFill>
+            <a:blip r:embed="rId4">
+              <a:extLst>
+                <a:ext uri="{28A0092B-C50C-407E-A947-70E740481C1C}">
+                  <a14:useLocalDpi xmlns:a14="http://schemas.microsoft.com/office/drawing/2010/main" val="0"/>
+                </a:ext>
+              </a:extLst>
+            </a:blip>
+            <a:stretch>
+              <a:fillRect/>
+            </a:stretch>
+          </p:blipFill>
+          <p:spPr>
+            <a:xfrm>
+              <a:off x="7301004" y="768278"/>
+              <a:ext cx="6026339" cy="2505456"/>
+            </a:xfrm>
+            <a:prstGeom prst="rect">
+              <a:avLst/>
+            </a:prstGeom>
+          </p:spPr>
+        </p:pic>
+      </p:grpSp>
     </p:spTree>
     <p:extLst>
       <p:ext uri="{BB962C8B-B14F-4D97-AF65-F5344CB8AC3E}">

</xml_diff>

<commit_message>
Updated car loan images
</commit_message>
<xml_diff>
--- a/Finance/loans.pptx
+++ b/Finance/loans.pptx
@@ -9,6 +9,8 @@
     <p:sldId id="257" r:id="rId3"/>
     <p:sldId id="258" r:id="rId4"/>
     <p:sldId id="259" r:id="rId5"/>
+    <p:sldId id="261" r:id="rId6"/>
+    <p:sldId id="262" r:id="rId7"/>
   </p:sldIdLst>
   <p:sldSz cx="12192000" cy="6858000"/>
   <p:notesSz cx="6858000" cy="9144000"/>
@@ -246,7 +248,7 @@
           <a:p>
             <a:fld id="{855B1FBD-4CDE-074D-957F-E13CC52E1F54}" type="datetimeFigureOut">
               <a:rPr lang="en-US" smtClean="0"/>
-              <a:t>11/30/18</a:t>
+              <a:t>12/4/18</a:t>
             </a:fld>
             <a:endParaRPr lang="en-US"/>
           </a:p>
@@ -416,7 +418,7 @@
           <a:p>
             <a:fld id="{855B1FBD-4CDE-074D-957F-E13CC52E1F54}" type="datetimeFigureOut">
               <a:rPr lang="en-US" smtClean="0"/>
-              <a:t>11/30/18</a:t>
+              <a:t>12/4/18</a:t>
             </a:fld>
             <a:endParaRPr lang="en-US"/>
           </a:p>
@@ -596,7 +598,7 @@
           <a:p>
             <a:fld id="{855B1FBD-4CDE-074D-957F-E13CC52E1F54}" type="datetimeFigureOut">
               <a:rPr lang="en-US" smtClean="0"/>
-              <a:t>11/30/18</a:t>
+              <a:t>12/4/18</a:t>
             </a:fld>
             <a:endParaRPr lang="en-US"/>
           </a:p>
@@ -766,7 +768,7 @@
           <a:p>
             <a:fld id="{855B1FBD-4CDE-074D-957F-E13CC52E1F54}" type="datetimeFigureOut">
               <a:rPr lang="en-US" smtClean="0"/>
-              <a:t>11/30/18</a:t>
+              <a:t>12/4/18</a:t>
             </a:fld>
             <a:endParaRPr lang="en-US"/>
           </a:p>
@@ -1012,7 +1014,7 @@
           <a:p>
             <a:fld id="{855B1FBD-4CDE-074D-957F-E13CC52E1F54}" type="datetimeFigureOut">
               <a:rPr lang="en-US" smtClean="0"/>
-              <a:t>11/30/18</a:t>
+              <a:t>12/4/18</a:t>
             </a:fld>
             <a:endParaRPr lang="en-US"/>
           </a:p>
@@ -1244,7 +1246,7 @@
           <a:p>
             <a:fld id="{855B1FBD-4CDE-074D-957F-E13CC52E1F54}" type="datetimeFigureOut">
               <a:rPr lang="en-US" smtClean="0"/>
-              <a:t>11/30/18</a:t>
+              <a:t>12/4/18</a:t>
             </a:fld>
             <a:endParaRPr lang="en-US"/>
           </a:p>
@@ -1611,7 +1613,7 @@
           <a:p>
             <a:fld id="{855B1FBD-4CDE-074D-957F-E13CC52E1F54}" type="datetimeFigureOut">
               <a:rPr lang="en-US" smtClean="0"/>
-              <a:t>11/30/18</a:t>
+              <a:t>12/4/18</a:t>
             </a:fld>
             <a:endParaRPr lang="en-US"/>
           </a:p>
@@ -1729,7 +1731,7 @@
           <a:p>
             <a:fld id="{855B1FBD-4CDE-074D-957F-E13CC52E1F54}" type="datetimeFigureOut">
               <a:rPr lang="en-US" smtClean="0"/>
-              <a:t>11/30/18</a:t>
+              <a:t>12/4/18</a:t>
             </a:fld>
             <a:endParaRPr lang="en-US"/>
           </a:p>
@@ -1824,7 +1826,7 @@
           <a:p>
             <a:fld id="{855B1FBD-4CDE-074D-957F-E13CC52E1F54}" type="datetimeFigureOut">
               <a:rPr lang="en-US" smtClean="0"/>
-              <a:t>11/30/18</a:t>
+              <a:t>12/4/18</a:t>
             </a:fld>
             <a:endParaRPr lang="en-US"/>
           </a:p>
@@ -2101,7 +2103,7 @@
           <a:p>
             <a:fld id="{855B1FBD-4CDE-074D-957F-E13CC52E1F54}" type="datetimeFigureOut">
               <a:rPr lang="en-US" smtClean="0"/>
-              <a:t>11/30/18</a:t>
+              <a:t>12/4/18</a:t>
             </a:fld>
             <a:endParaRPr lang="en-US"/>
           </a:p>
@@ -2354,7 +2356,7 @@
           <a:p>
             <a:fld id="{855B1FBD-4CDE-074D-957F-E13CC52E1F54}" type="datetimeFigureOut">
               <a:rPr lang="en-US" smtClean="0"/>
-              <a:t>11/30/18</a:t>
+              <a:t>12/4/18</a:t>
             </a:fld>
             <a:endParaRPr lang="en-US"/>
           </a:p>
@@ -2567,7 +2569,7 @@
           <a:p>
             <a:fld id="{855B1FBD-4CDE-074D-957F-E13CC52E1F54}" type="datetimeFigureOut">
               <a:rPr lang="en-US" smtClean="0"/>
-              <a:t>11/30/18</a:t>
+              <a:t>12/4/18</a:t>
             </a:fld>
             <a:endParaRPr lang="en-US"/>
           </a:p>
@@ -4544,8 +4546,8 @@
             </a:p>
           </p:txBody>
         </p:sp>
-        <mc:AlternateContent xmlns:mc="http://schemas.openxmlformats.org/markup-compatibility/2006">
-          <mc:Choice xmlns:a14="http://schemas.microsoft.com/office/drawing/2010/main" Requires="a14">
+        <mc:AlternateContent xmlns:mc="http://schemas.openxmlformats.org/markup-compatibility/2006" xmlns:a14="http://schemas.microsoft.com/office/drawing/2010/main">
+          <mc:Choice Requires="a14">
             <p:sp>
               <p:nvSpPr>
                 <p:cNvPr id="10" name="TextBox 9"/>
@@ -4652,23 +4654,7 @@
                                   <a:ea typeface="Cambria Math" charset="0"/>
                                   <a:cs typeface="Cambria Math" charset="0"/>
                                 </a:rPr>
-                                <m:t>0.0</m:t>
-                              </m:r>
-                              <m:r>
-                                <a:rPr lang="en-US" sz="3200" b="0" i="1" smtClean="0">
-                                  <a:latin typeface="Cambria Math" charset="0"/>
-                                  <a:ea typeface="Cambria Math" charset="0"/>
-                                  <a:cs typeface="Cambria Math" charset="0"/>
-                                </a:rPr>
-                                <m:t>7</m:t>
-                              </m:r>
-                              <m:r>
-                                <a:rPr lang="en-US" sz="3200" b="0" i="1" smtClean="0">
-                                  <a:latin typeface="Cambria Math" charset="0"/>
-                                  <a:ea typeface="Cambria Math" charset="0"/>
-                                  <a:cs typeface="Cambria Math" charset="0"/>
-                                </a:rPr>
-                                <m:t>02</m:t>
+                                <m:t>0.0702</m:t>
                               </m:r>
                             </m:num>
                             <m:den>
@@ -4836,7 +4822,7 @@
               </p:txBody>
             </p:sp>
           </mc:Choice>
-          <mc:Fallback>
+          <mc:Fallback xmlns="">
             <p:sp>
               <p:nvSpPr>
                 <p:cNvPr id="10" name="TextBox 9"/>
@@ -4910,6 +4896,829 @@
     <p:extLst>
       <p:ext uri="{BB962C8B-B14F-4D97-AF65-F5344CB8AC3E}">
         <p14:creationId xmlns:p14="http://schemas.microsoft.com/office/powerpoint/2010/main" val="1273491676"/>
+      </p:ext>
+    </p:extLst>
+  </p:cSld>
+  <p:clrMapOvr>
+    <a:masterClrMapping/>
+  </p:clrMapOvr>
+</p:sld>
+</file>
+
+<file path=ppt/slides/slide5.xml><?xml version="1.0" encoding="utf-8"?>
+<p:sld xmlns:a="http://schemas.openxmlformats.org/drawingml/2006/main" xmlns:r="http://schemas.openxmlformats.org/officeDocument/2006/relationships" xmlns:p="http://schemas.openxmlformats.org/presentationml/2006/main">
+  <p:cSld>
+    <p:spTree>
+      <p:nvGrpSpPr>
+        <p:cNvPr id="1" name=""/>
+        <p:cNvGrpSpPr/>
+        <p:nvPr/>
+      </p:nvGrpSpPr>
+      <p:grpSpPr>
+        <a:xfrm>
+          <a:off x="0" y="0"/>
+          <a:ext cx="0" cy="0"/>
+          <a:chOff x="0" y="0"/>
+          <a:chExt cx="0" cy="0"/>
+        </a:xfrm>
+      </p:grpSpPr>
+      <p:grpSp>
+        <p:nvGrpSpPr>
+          <p:cNvPr id="2" name="Group 1"/>
+          <p:cNvGrpSpPr/>
+          <p:nvPr/>
+        </p:nvGrpSpPr>
+        <p:grpSpPr>
+          <a:xfrm>
+            <a:off x="-707739" y="-74652"/>
+            <a:ext cx="14035082" cy="5598859"/>
+            <a:chOff x="-707739" y="-74652"/>
+            <a:chExt cx="14035082" cy="5598859"/>
+          </a:xfrm>
+        </p:grpSpPr>
+        <p:pic>
+          <p:nvPicPr>
+            <p:cNvPr id="5" name="Picture 4"/>
+            <p:cNvPicPr>
+              <a:picLocks noChangeAspect="1"/>
+            </p:cNvPicPr>
+            <p:nvPr/>
+          </p:nvPicPr>
+          <p:blipFill>
+            <a:blip r:embed="rId2">
+              <a:extLst>
+                <a:ext uri="{28A0092B-C50C-407E-A947-70E740481C1C}">
+                  <a14:useLocalDpi xmlns:a14="http://schemas.microsoft.com/office/drawing/2010/main" val="0"/>
+                </a:ext>
+              </a:extLst>
+            </a:blip>
+            <a:stretch>
+              <a:fillRect/>
+            </a:stretch>
+          </p:blipFill>
+          <p:spPr>
+            <a:xfrm>
+              <a:off x="6645561" y="995433"/>
+              <a:ext cx="5884056" cy="2397954"/>
+            </a:xfrm>
+            <a:prstGeom prst="rect">
+              <a:avLst/>
+            </a:prstGeom>
+          </p:spPr>
+        </p:pic>
+        <mc:AlternateContent xmlns:mc="http://schemas.openxmlformats.org/markup-compatibility/2006" xmlns:a14="http://schemas.microsoft.com/office/drawing/2010/main">
+          <mc:Choice Requires="a14">
+            <p:sp>
+              <p:nvSpPr>
+                <p:cNvPr id="6" name="TextBox 5"/>
+                <p:cNvSpPr txBox="1"/>
+                <p:nvPr/>
+              </p:nvSpPr>
+              <p:spPr>
+                <a:xfrm>
+                  <a:off x="155200" y="995433"/>
+                  <a:ext cx="5885009" cy="938719"/>
+                </a:xfrm>
+                <a:prstGeom prst="rect">
+                  <a:avLst/>
+                </a:prstGeom>
+                <a:noFill/>
+              </p:spPr>
+              <p:txBody>
+                <a:bodyPr wrap="square" rtlCol="0">
+                  <a:spAutoFit/>
+                </a:bodyPr>
+                <a:lstStyle/>
+                <a:p>
+                  <a:pPr/>
+                  <a14:m>
+                    <m:oMathPara xmlns:m="http://schemas.openxmlformats.org/officeDocument/2006/math">
+                      <m:oMathParaPr>
+                        <m:jc m:val="centerGroup"/>
+                      </m:oMathParaPr>
+                      <m:oMath xmlns:m="http://schemas.openxmlformats.org/officeDocument/2006/math">
+                        <m:r>
+                          <m:rPr>
+                            <m:sty m:val="p"/>
+                          </m:rPr>
+                          <a:rPr lang="en-US" sz="5500" smtClean="0">
+                            <a:latin typeface="Cambria Math" charset="0"/>
+                            <a:ea typeface="Cambria Math" charset="0"/>
+                            <a:cs typeface="Cambria Math" charset="0"/>
+                          </a:rPr>
+                          <m:t>r</m:t>
+                        </m:r>
+                        <m:r>
+                          <a:rPr lang="en-US" sz="5500" b="0" i="1" smtClean="0">
+                            <a:latin typeface="Cambria Math" charset="0"/>
+                            <a:ea typeface="Cambria Math" charset="0"/>
+                            <a:cs typeface="Cambria Math" charset="0"/>
+                          </a:rPr>
+                          <m:t> ∗</m:t>
+                        </m:r>
+                        <m:r>
+                          <m:rPr>
+                            <m:sty m:val="p"/>
+                          </m:rPr>
+                          <a:rPr lang="en-US" sz="5500" b="0" i="0" smtClean="0">
+                            <a:latin typeface="Cambria Math" charset="0"/>
+                            <a:ea typeface="Cambria Math" charset="0"/>
+                            <a:cs typeface="Cambria Math" charset="0"/>
+                          </a:rPr>
+                          <m:t>P</m:t>
+                        </m:r>
+                      </m:oMath>
+                    </m:oMathPara>
+                  </a14:m>
+                  <a:endParaRPr lang="en-US" sz="5500" dirty="0">
+                    <a:latin typeface="Cambria Math" charset="0"/>
+                    <a:ea typeface="Cambria Math" charset="0"/>
+                    <a:cs typeface="Cambria Math" charset="0"/>
+                  </a:endParaRPr>
+                </a:p>
+              </p:txBody>
+            </p:sp>
+          </mc:Choice>
+          <mc:Fallback xmlns="">
+            <p:sp>
+              <p:nvSpPr>
+                <p:cNvPr id="6" name="TextBox 5"/>
+                <p:cNvSpPr txBox="1">
+                  <a:spLocks noRot="1" noChangeAspect="1" noMove="1" noResize="1" noEditPoints="1" noAdjustHandles="1" noChangeArrowheads="1" noChangeShapeType="1" noTextEdit="1"/>
+                </p:cNvSpPr>
+                <p:nvPr/>
+              </p:nvSpPr>
+              <p:spPr>
+                <a:xfrm>
+                  <a:off x="155200" y="995433"/>
+                  <a:ext cx="5885009" cy="938719"/>
+                </a:xfrm>
+                <a:prstGeom prst="rect">
+                  <a:avLst/>
+                </a:prstGeom>
+                <a:blipFill rotWithShape="0">
+                  <a:blip r:embed="rId3"/>
+                  <a:stretch>
+                    <a:fillRect/>
+                  </a:stretch>
+                </a:blipFill>
+              </p:spPr>
+              <p:txBody>
+                <a:bodyPr/>
+                <a:lstStyle/>
+                <a:p>
+                  <a:r>
+                    <a:rPr lang="en-US">
+                      <a:noFill/>
+                    </a:rPr>
+                    <a:t> </a:t>
+                  </a:r>
+                </a:p>
+              </p:txBody>
+            </p:sp>
+          </mc:Fallback>
+        </mc:AlternateContent>
+        <p:sp>
+          <p:nvSpPr>
+            <p:cNvPr id="7" name="TextBox 6"/>
+            <p:cNvSpPr txBox="1"/>
+            <p:nvPr/>
+          </p:nvSpPr>
+          <p:spPr>
+            <a:xfrm>
+              <a:off x="6645561" y="-74652"/>
+              <a:ext cx="4937760" cy="646331"/>
+            </a:xfrm>
+            <a:prstGeom prst="rect">
+              <a:avLst/>
+            </a:prstGeom>
+            <a:noFill/>
+          </p:spPr>
+          <p:txBody>
+            <a:bodyPr wrap="square" rtlCol="0">
+              <a:spAutoFit/>
+            </a:bodyPr>
+            <a:lstStyle/>
+            <a:p>
+              <a:r>
+                <a:rPr lang="en-US" sz="3600" b="1" dirty="0" smtClean="0"/>
+                <a:t>Python Calculation</a:t>
+              </a:r>
+              <a:endParaRPr lang="en-US" sz="3600" b="1" dirty="0"/>
+            </a:p>
+          </p:txBody>
+        </p:sp>
+        <p:sp>
+          <p:nvSpPr>
+            <p:cNvPr id="8" name="TextBox 7"/>
+            <p:cNvSpPr txBox="1"/>
+            <p:nvPr/>
+          </p:nvSpPr>
+          <p:spPr>
+            <a:xfrm>
+              <a:off x="-707739" y="3273734"/>
+              <a:ext cx="4937760" cy="646331"/>
+            </a:xfrm>
+            <a:prstGeom prst="rect">
+              <a:avLst/>
+            </a:prstGeom>
+            <a:noFill/>
+          </p:spPr>
+          <p:txBody>
+            <a:bodyPr wrap="square" rtlCol="0">
+              <a:spAutoFit/>
+            </a:bodyPr>
+            <a:lstStyle/>
+            <a:p>
+              <a:r>
+                <a:rPr lang="en-US" sz="3600" b="1" dirty="0" smtClean="0"/>
+                <a:t>Calculation</a:t>
+              </a:r>
+              <a:endParaRPr lang="en-US" sz="3600" b="1" dirty="0"/>
+            </a:p>
+          </p:txBody>
+        </p:sp>
+        <p:sp>
+          <p:nvSpPr>
+            <p:cNvPr id="9" name="TextBox 8"/>
+            <p:cNvSpPr txBox="1"/>
+            <p:nvPr/>
+          </p:nvSpPr>
+          <p:spPr>
+            <a:xfrm>
+              <a:off x="-707739" y="-74652"/>
+              <a:ext cx="6217920" cy="646331"/>
+            </a:xfrm>
+            <a:prstGeom prst="rect">
+              <a:avLst/>
+            </a:prstGeom>
+            <a:noFill/>
+          </p:spPr>
+          <p:txBody>
+            <a:bodyPr wrap="square" rtlCol="0">
+              <a:spAutoFit/>
+            </a:bodyPr>
+            <a:lstStyle/>
+            <a:p>
+              <a:r>
+                <a:rPr lang="en-US" sz="3600" b="1" dirty="0" smtClean="0"/>
+                <a:t>Interest Paid (One Month)</a:t>
+              </a:r>
+              <a:endParaRPr lang="en-US" sz="3600" b="1" dirty="0"/>
+            </a:p>
+          </p:txBody>
+        </p:sp>
+        <mc:AlternateContent xmlns:mc="http://schemas.openxmlformats.org/markup-compatibility/2006" xmlns:a14="http://schemas.microsoft.com/office/drawing/2010/main">
+          <mc:Choice Requires="a14">
+            <p:sp>
+              <p:nvSpPr>
+                <p:cNvPr id="10" name="TextBox 9"/>
+                <p:cNvSpPr txBox="1"/>
+                <p:nvPr/>
+              </p:nvSpPr>
+              <p:spPr>
+                <a:xfrm>
+                  <a:off x="-707739" y="4343819"/>
+                  <a:ext cx="14035082" cy="1180388"/>
+                </a:xfrm>
+                <a:prstGeom prst="rect">
+                  <a:avLst/>
+                </a:prstGeom>
+                <a:noFill/>
+              </p:spPr>
+              <p:txBody>
+                <a:bodyPr wrap="square" rtlCol="0">
+                  <a:spAutoFit/>
+                </a:bodyPr>
+                <a:lstStyle/>
+                <a:p>
+                  <a:pPr algn="ctr"/>
+                  <a14:m>
+                    <m:oMath xmlns:m="http://schemas.openxmlformats.org/officeDocument/2006/math">
+                      <m:f>
+                        <m:fPr>
+                          <m:ctrlPr>
+                            <a:rPr lang="mr-IN" sz="4900" i="1" smtClean="0">
+                              <a:latin typeface="Cambria Math" charset="0"/>
+                              <a:ea typeface="Cambria Math" charset="0"/>
+                              <a:cs typeface="Cambria Math" charset="0"/>
+                            </a:rPr>
+                          </m:ctrlPr>
+                        </m:fPr>
+                        <m:num>
+                          <m:r>
+                            <a:rPr lang="en-US" sz="4900" i="1">
+                              <a:latin typeface="Cambria Math" charset="0"/>
+                              <a:ea typeface="Cambria Math" charset="0"/>
+                              <a:cs typeface="Cambria Math" charset="0"/>
+                            </a:rPr>
+                            <m:t>0.0702</m:t>
+                          </m:r>
+                        </m:num>
+                        <m:den>
+                          <m:r>
+                            <a:rPr lang="en-US" sz="4900" i="1">
+                              <a:latin typeface="Cambria Math" charset="0"/>
+                              <a:ea typeface="Cambria Math" charset="0"/>
+                              <a:cs typeface="Cambria Math" charset="0"/>
+                            </a:rPr>
+                            <m:t>12</m:t>
+                          </m:r>
+                        </m:den>
+                      </m:f>
+                      <m:r>
+                        <a:rPr lang="en-US" sz="4900" b="0" i="1" smtClean="0">
+                          <a:latin typeface="Cambria Math" charset="0"/>
+                          <a:ea typeface="Cambria Math" charset="0"/>
+                          <a:cs typeface="Cambria Math" charset="0"/>
+                        </a:rPr>
+                        <m:t>∗34689.96</m:t>
+                      </m:r>
+                    </m:oMath>
+                  </a14:m>
+                  <a:r>
+                    <a:rPr lang="en-US" sz="4900" dirty="0" smtClean="0">
+                      <a:latin typeface="Cambria Math" charset="0"/>
+                      <a:ea typeface="Cambria Math" charset="0"/>
+                      <a:cs typeface="Cambria Math" charset="0"/>
+                    </a:rPr>
+                    <a:t>= $202.94</a:t>
+                  </a:r>
+                </a:p>
+              </p:txBody>
+            </p:sp>
+          </mc:Choice>
+          <mc:Fallback xmlns="">
+            <p:sp>
+              <p:nvSpPr>
+                <p:cNvPr id="10" name="TextBox 9"/>
+                <p:cNvSpPr txBox="1">
+                  <a:spLocks noRot="1" noChangeAspect="1" noMove="1" noResize="1" noEditPoints="1" noAdjustHandles="1" noChangeArrowheads="1" noChangeShapeType="1" noTextEdit="1"/>
+                </p:cNvSpPr>
+                <p:nvPr/>
+              </p:nvSpPr>
+              <p:spPr>
+                <a:xfrm>
+                  <a:off x="-707739" y="4343819"/>
+                  <a:ext cx="14035082" cy="1180388"/>
+                </a:xfrm>
+                <a:prstGeom prst="rect">
+                  <a:avLst/>
+                </a:prstGeom>
+                <a:blipFill rotWithShape="0">
+                  <a:blip r:embed="rId4"/>
+                  <a:stretch>
+                    <a:fillRect t="-518" b="-10881"/>
+                  </a:stretch>
+                </a:blipFill>
+              </p:spPr>
+              <p:txBody>
+                <a:bodyPr/>
+                <a:lstStyle/>
+                <a:p>
+                  <a:r>
+                    <a:rPr lang="en-US">
+                      <a:noFill/>
+                    </a:rPr>
+                    <a:t> </a:t>
+                  </a:r>
+                </a:p>
+              </p:txBody>
+            </p:sp>
+          </mc:Fallback>
+        </mc:AlternateContent>
+      </p:grpSp>
+    </p:spTree>
+    <p:extLst>
+      <p:ext uri="{BB962C8B-B14F-4D97-AF65-F5344CB8AC3E}">
+        <p14:creationId xmlns:p14="http://schemas.microsoft.com/office/powerpoint/2010/main" val="1317930759"/>
+      </p:ext>
+    </p:extLst>
+  </p:cSld>
+  <p:clrMapOvr>
+    <a:masterClrMapping/>
+  </p:clrMapOvr>
+</p:sld>
+</file>
+
+<file path=ppt/slides/slide6.xml><?xml version="1.0" encoding="utf-8"?>
+<p:sld xmlns:a="http://schemas.openxmlformats.org/drawingml/2006/main" xmlns:r="http://schemas.openxmlformats.org/officeDocument/2006/relationships" xmlns:p="http://schemas.openxmlformats.org/presentationml/2006/main">
+  <p:cSld>
+    <p:spTree>
+      <p:nvGrpSpPr>
+        <p:cNvPr id="1" name=""/>
+        <p:cNvGrpSpPr/>
+        <p:nvPr/>
+      </p:nvGrpSpPr>
+      <p:grpSpPr>
+        <a:xfrm>
+          <a:off x="0" y="0"/>
+          <a:ext cx="0" cy="0"/>
+          <a:chOff x="0" y="0"/>
+          <a:chExt cx="0" cy="0"/>
+        </a:xfrm>
+      </p:grpSpPr>
+      <p:grpSp>
+        <p:nvGrpSpPr>
+          <p:cNvPr id="4" name="Group 3"/>
+          <p:cNvGrpSpPr/>
+          <p:nvPr/>
+        </p:nvGrpSpPr>
+        <p:grpSpPr>
+          <a:xfrm>
+            <a:off x="-707739" y="-74652"/>
+            <a:ext cx="14035082" cy="5264857"/>
+            <a:chOff x="-707739" y="-74652"/>
+            <a:chExt cx="14035082" cy="5264857"/>
+          </a:xfrm>
+        </p:grpSpPr>
+        <mc:AlternateContent xmlns:mc="http://schemas.openxmlformats.org/markup-compatibility/2006" xmlns:a14="http://schemas.microsoft.com/office/drawing/2010/main">
+          <mc:Choice Requires="a14">
+            <p:sp>
+              <p:nvSpPr>
+                <p:cNvPr id="6" name="TextBox 5"/>
+                <p:cNvSpPr txBox="1"/>
+                <p:nvPr/>
+              </p:nvSpPr>
+              <p:spPr>
+                <a:xfrm>
+                  <a:off x="155200" y="995433"/>
+                  <a:ext cx="5885009" cy="707886"/>
+                </a:xfrm>
+                <a:prstGeom prst="rect">
+                  <a:avLst/>
+                </a:prstGeom>
+                <a:noFill/>
+              </p:spPr>
+              <p:txBody>
+                <a:bodyPr wrap="square" rtlCol="0">
+                  <a:spAutoFit/>
+                </a:bodyPr>
+                <a:lstStyle/>
+                <a:p>
+                  <a:pPr/>
+                  <a14:m>
+                    <m:oMathPara xmlns:m="http://schemas.openxmlformats.org/officeDocument/2006/math">
+                      <m:oMathParaPr>
+                        <m:jc m:val="centerGroup"/>
+                      </m:oMathParaPr>
+                      <m:oMath xmlns:m="http://schemas.openxmlformats.org/officeDocument/2006/math">
+                        <m:r>
+                          <m:rPr>
+                            <m:sty m:val="p"/>
+                          </m:rPr>
+                          <a:rPr lang="en-US" sz="4000" b="0" i="0" smtClean="0">
+                            <a:latin typeface="Cambria Math" charset="0"/>
+                            <a:ea typeface="Cambria Math" charset="0"/>
+                            <a:cs typeface="Cambria Math" charset="0"/>
+                          </a:rPr>
+                          <m:t>P</m:t>
+                        </m:r>
+                        <m:r>
+                          <a:rPr lang="en-US" sz="4000" b="0" i="0" smtClean="0">
+                            <a:latin typeface="Cambria Math" charset="0"/>
+                            <a:ea typeface="Cambria Math" charset="0"/>
+                            <a:cs typeface="Cambria Math" charset="0"/>
+                          </a:rPr>
+                          <m:t>−(</m:t>
+                        </m:r>
+                        <m:r>
+                          <m:rPr>
+                            <m:sty m:val="p"/>
+                          </m:rPr>
+                          <a:rPr lang="en-US" sz="4000" b="0" i="0" smtClean="0">
+                            <a:latin typeface="Cambria Math" charset="0"/>
+                            <a:ea typeface="Cambria Math" charset="0"/>
+                            <a:cs typeface="Cambria Math" charset="0"/>
+                          </a:rPr>
+                          <m:t>EMI</m:t>
+                        </m:r>
+                        <m:r>
+                          <a:rPr lang="en-US" sz="4000" b="0" i="0" smtClean="0">
+                            <a:latin typeface="Cambria Math" charset="0"/>
+                            <a:ea typeface="Cambria Math" charset="0"/>
+                            <a:cs typeface="Cambria Math" charset="0"/>
+                          </a:rPr>
+                          <m:t> −</m:t>
+                        </m:r>
+                        <m:r>
+                          <m:rPr>
+                            <m:sty m:val="p"/>
+                          </m:rPr>
+                          <a:rPr lang="en-US" sz="4000" b="0" i="0" smtClean="0">
+                            <a:latin typeface="Cambria Math" charset="0"/>
+                            <a:ea typeface="Cambria Math" charset="0"/>
+                            <a:cs typeface="Cambria Math" charset="0"/>
+                          </a:rPr>
+                          <m:t>interest</m:t>
+                        </m:r>
+                        <m:r>
+                          <a:rPr lang="en-US" sz="4000" b="0" i="0" smtClean="0">
+                            <a:latin typeface="Cambria Math" charset="0"/>
+                            <a:ea typeface="Cambria Math" charset="0"/>
+                            <a:cs typeface="Cambria Math" charset="0"/>
+                          </a:rPr>
+                          <m:t> </m:t>
+                        </m:r>
+                        <m:r>
+                          <m:rPr>
+                            <m:sty m:val="p"/>
+                          </m:rPr>
+                          <a:rPr lang="en-US" sz="4000" b="0" i="0" smtClean="0">
+                            <a:latin typeface="Cambria Math" charset="0"/>
+                            <a:ea typeface="Cambria Math" charset="0"/>
+                            <a:cs typeface="Cambria Math" charset="0"/>
+                          </a:rPr>
+                          <m:t>paid</m:t>
+                        </m:r>
+                        <m:r>
+                          <a:rPr lang="en-US" sz="4000" b="0" i="0" smtClean="0">
+                            <a:latin typeface="Cambria Math" charset="0"/>
+                            <a:ea typeface="Cambria Math" charset="0"/>
+                            <a:cs typeface="Cambria Math" charset="0"/>
+                          </a:rPr>
+                          <m:t>)</m:t>
+                        </m:r>
+                      </m:oMath>
+                    </m:oMathPara>
+                  </a14:m>
+                  <a:endParaRPr lang="en-US" sz="4000" dirty="0">
+                    <a:latin typeface="Cambria Math" charset="0"/>
+                    <a:ea typeface="Cambria Math" charset="0"/>
+                    <a:cs typeface="Cambria Math" charset="0"/>
+                  </a:endParaRPr>
+                </a:p>
+              </p:txBody>
+            </p:sp>
+          </mc:Choice>
+          <mc:Fallback xmlns="">
+            <p:sp>
+              <p:nvSpPr>
+                <p:cNvPr id="6" name="TextBox 5"/>
+                <p:cNvSpPr txBox="1">
+                  <a:spLocks noRot="1" noChangeAspect="1" noMove="1" noResize="1" noEditPoints="1" noAdjustHandles="1" noChangeArrowheads="1" noChangeShapeType="1" noTextEdit="1"/>
+                </p:cNvSpPr>
+                <p:nvPr/>
+              </p:nvSpPr>
+              <p:spPr>
+                <a:xfrm>
+                  <a:off x="155200" y="995433"/>
+                  <a:ext cx="5885009" cy="707886"/>
+                </a:xfrm>
+                <a:prstGeom prst="rect">
+                  <a:avLst/>
+                </a:prstGeom>
+                <a:blipFill rotWithShape="0">
+                  <a:blip r:embed="rId2"/>
+                  <a:stretch>
+                    <a:fillRect/>
+                  </a:stretch>
+                </a:blipFill>
+              </p:spPr>
+              <p:txBody>
+                <a:bodyPr/>
+                <a:lstStyle/>
+                <a:p>
+                  <a:r>
+                    <a:rPr lang="en-US">
+                      <a:noFill/>
+                    </a:rPr>
+                    <a:t> </a:t>
+                  </a:r>
+                </a:p>
+              </p:txBody>
+            </p:sp>
+          </mc:Fallback>
+        </mc:AlternateContent>
+        <p:sp>
+          <p:nvSpPr>
+            <p:cNvPr id="7" name="TextBox 6"/>
+            <p:cNvSpPr txBox="1"/>
+            <p:nvPr/>
+          </p:nvSpPr>
+          <p:spPr>
+            <a:xfrm>
+              <a:off x="6645561" y="-74652"/>
+              <a:ext cx="4937760" cy="646331"/>
+            </a:xfrm>
+            <a:prstGeom prst="rect">
+              <a:avLst/>
+            </a:prstGeom>
+            <a:noFill/>
+          </p:spPr>
+          <p:txBody>
+            <a:bodyPr wrap="square" rtlCol="0">
+              <a:spAutoFit/>
+            </a:bodyPr>
+            <a:lstStyle/>
+            <a:p>
+              <a:r>
+                <a:rPr lang="en-US" sz="3600" b="1" dirty="0" smtClean="0"/>
+                <a:t>Python Calculation</a:t>
+              </a:r>
+              <a:endParaRPr lang="en-US" sz="3600" b="1" dirty="0"/>
+            </a:p>
+          </p:txBody>
+        </p:sp>
+        <p:sp>
+          <p:nvSpPr>
+            <p:cNvPr id="8" name="TextBox 7"/>
+            <p:cNvSpPr txBox="1"/>
+            <p:nvPr/>
+          </p:nvSpPr>
+          <p:spPr>
+            <a:xfrm>
+              <a:off x="-707739" y="3273734"/>
+              <a:ext cx="4937760" cy="646331"/>
+            </a:xfrm>
+            <a:prstGeom prst="rect">
+              <a:avLst/>
+            </a:prstGeom>
+            <a:noFill/>
+          </p:spPr>
+          <p:txBody>
+            <a:bodyPr wrap="square" rtlCol="0">
+              <a:spAutoFit/>
+            </a:bodyPr>
+            <a:lstStyle/>
+            <a:p>
+              <a:r>
+                <a:rPr lang="en-US" sz="3600" b="1" dirty="0" smtClean="0"/>
+                <a:t>Calculation</a:t>
+              </a:r>
+              <a:endParaRPr lang="en-US" sz="3600" b="1" dirty="0"/>
+            </a:p>
+          </p:txBody>
+        </p:sp>
+        <p:sp>
+          <p:nvSpPr>
+            <p:cNvPr id="9" name="TextBox 8"/>
+            <p:cNvSpPr txBox="1"/>
+            <p:nvPr/>
+          </p:nvSpPr>
+          <p:spPr>
+            <a:xfrm>
+              <a:off x="-707739" y="-74652"/>
+              <a:ext cx="6217920" cy="646331"/>
+            </a:xfrm>
+            <a:prstGeom prst="rect">
+              <a:avLst/>
+            </a:prstGeom>
+            <a:noFill/>
+          </p:spPr>
+          <p:txBody>
+            <a:bodyPr wrap="square" rtlCol="0">
+              <a:spAutoFit/>
+            </a:bodyPr>
+            <a:lstStyle/>
+            <a:p>
+              <a:r>
+                <a:rPr lang="en-US" sz="3600" b="1" dirty="0" smtClean="0"/>
+                <a:t>Calculate New Principal</a:t>
+              </a:r>
+              <a:endParaRPr lang="en-US" sz="3600" b="1" dirty="0"/>
+            </a:p>
+          </p:txBody>
+        </p:sp>
+        <mc:AlternateContent xmlns:mc="http://schemas.openxmlformats.org/markup-compatibility/2006" xmlns:a14="http://schemas.microsoft.com/office/drawing/2010/main">
+          <mc:Choice Requires="a14">
+            <p:sp>
+              <p:nvSpPr>
+                <p:cNvPr id="10" name="TextBox 9"/>
+                <p:cNvSpPr txBox="1"/>
+                <p:nvPr/>
+              </p:nvSpPr>
+              <p:spPr>
+                <a:xfrm>
+                  <a:off x="-707739" y="4343819"/>
+                  <a:ext cx="14035082" cy="846386"/>
+                </a:xfrm>
+                <a:prstGeom prst="rect">
+                  <a:avLst/>
+                </a:prstGeom>
+                <a:noFill/>
+              </p:spPr>
+              <p:txBody>
+                <a:bodyPr wrap="square" rtlCol="0">
+                  <a:spAutoFit/>
+                </a:bodyPr>
+                <a:lstStyle/>
+                <a:p>
+                  <a:pPr algn="ctr"/>
+                  <a14:m>
+                    <m:oMath xmlns:m="http://schemas.openxmlformats.org/officeDocument/2006/math">
+                      <m:r>
+                        <a:rPr lang="en-US" sz="4900" b="0" i="1" smtClean="0">
+                          <a:latin typeface="Cambria Math" charset="0"/>
+                          <a:ea typeface="Cambria Math" charset="0"/>
+                          <a:cs typeface="Cambria Math" charset="0"/>
+                        </a:rPr>
+                        <m:t>34689.96</m:t>
+                      </m:r>
+                    </m:oMath>
+                  </a14:m>
+                  <a:r>
+                    <a:rPr lang="en-US" sz="4900" dirty="0" smtClean="0">
+                      <a:latin typeface="Cambria Math" charset="0"/>
+                      <a:ea typeface="Cambria Math" charset="0"/>
+                      <a:cs typeface="Cambria Math" charset="0"/>
+                    </a:rPr>
+                    <a:t> </a:t>
+                  </a:r>
+                  <a:r>
+                    <a:rPr lang="mr-IN" sz="4900" dirty="0" smtClean="0">
+                      <a:latin typeface="Cambria Math" charset="0"/>
+                      <a:ea typeface="Cambria Math" charset="0"/>
+                      <a:cs typeface="Cambria Math" charset="0"/>
+                    </a:rPr>
+                    <a:t>–</a:t>
+                  </a:r>
+                  <a:r>
+                    <a:rPr lang="en-US" sz="4900" dirty="0" smtClean="0">
+                      <a:latin typeface="Cambria Math" charset="0"/>
+                      <a:ea typeface="Cambria Math" charset="0"/>
+                      <a:cs typeface="Cambria Math" charset="0"/>
+                    </a:rPr>
+                    <a:t> (687.23 - $202.94) = 34205.67</a:t>
+                  </a:r>
+                </a:p>
+              </p:txBody>
+            </p:sp>
+          </mc:Choice>
+          <mc:Fallback xmlns="">
+            <p:sp>
+              <p:nvSpPr>
+                <p:cNvPr id="10" name="TextBox 9"/>
+                <p:cNvSpPr txBox="1">
+                  <a:spLocks noRot="1" noChangeAspect="1" noMove="1" noResize="1" noEditPoints="1" noAdjustHandles="1" noChangeArrowheads="1" noChangeShapeType="1" noTextEdit="1"/>
+                </p:cNvSpPr>
+                <p:nvPr/>
+              </p:nvSpPr>
+              <p:spPr>
+                <a:xfrm>
+                  <a:off x="-707739" y="4343819"/>
+                  <a:ext cx="14035082" cy="846386"/>
+                </a:xfrm>
+                <a:prstGeom prst="rect">
+                  <a:avLst/>
+                </a:prstGeom>
+                <a:blipFill rotWithShape="0">
+                  <a:blip r:embed="rId3"/>
+                  <a:stretch>
+                    <a:fillRect t="-17391" b="-38406"/>
+                  </a:stretch>
+                </a:blipFill>
+              </p:spPr>
+              <p:txBody>
+                <a:bodyPr/>
+                <a:lstStyle/>
+                <a:p>
+                  <a:r>
+                    <a:rPr lang="en-US">
+                      <a:noFill/>
+                    </a:rPr>
+                    <a:t> </a:t>
+                  </a:r>
+                </a:p>
+              </p:txBody>
+            </p:sp>
+          </mc:Fallback>
+        </mc:AlternateContent>
+        <p:pic>
+          <p:nvPicPr>
+            <p:cNvPr id="3" name="Picture 2"/>
+            <p:cNvPicPr>
+              <a:picLocks noChangeAspect="1"/>
+            </p:cNvPicPr>
+            <p:nvPr/>
+          </p:nvPicPr>
+          <p:blipFill>
+            <a:blip r:embed="rId4">
+              <a:extLst>
+                <a:ext uri="{28A0092B-C50C-407E-A947-70E740481C1C}">
+                  <a14:useLocalDpi xmlns:a14="http://schemas.microsoft.com/office/drawing/2010/main" val="0"/>
+                </a:ext>
+              </a:extLst>
+            </a:blip>
+            <a:stretch>
+              <a:fillRect/>
+            </a:stretch>
+          </p:blipFill>
+          <p:spPr>
+            <a:xfrm>
+              <a:off x="6645561" y="995433"/>
+              <a:ext cx="5879592" cy="1295910"/>
+            </a:xfrm>
+            <a:prstGeom prst="rect">
+              <a:avLst/>
+            </a:prstGeom>
+          </p:spPr>
+        </p:pic>
+      </p:grpSp>
+    </p:spTree>
+    <p:extLst>
+      <p:ext uri="{BB962C8B-B14F-4D97-AF65-F5344CB8AC3E}">
+        <p14:creationId xmlns:p14="http://schemas.microsoft.com/office/powerpoint/2010/main" val="604376286"/>
       </p:ext>
     </p:extLst>
   </p:cSld>

</xml_diff>

<commit_message>
Updated car loan notebook for tutorial
</commit_message>
<xml_diff>
--- a/Finance/loans.pptx
+++ b/Finance/loans.pptx
@@ -11,6 +11,7 @@
     <p:sldId id="259" r:id="rId5"/>
     <p:sldId id="261" r:id="rId6"/>
     <p:sldId id="262" r:id="rId7"/>
+    <p:sldId id="263" r:id="rId8"/>
   </p:sldIdLst>
   <p:sldSz cx="12192000" cy="6858000"/>
   <p:notesSz cx="6858000" cy="9144000"/>
@@ -248,7 +249,7 @@
           <a:p>
             <a:fld id="{855B1FBD-4CDE-074D-957F-E13CC52E1F54}" type="datetimeFigureOut">
               <a:rPr lang="en-US" smtClean="0"/>
-              <a:t>12/4/18</a:t>
+              <a:t>12/6/18</a:t>
             </a:fld>
             <a:endParaRPr lang="en-US"/>
           </a:p>
@@ -418,7 +419,7 @@
           <a:p>
             <a:fld id="{855B1FBD-4CDE-074D-957F-E13CC52E1F54}" type="datetimeFigureOut">
               <a:rPr lang="en-US" smtClean="0"/>
-              <a:t>12/4/18</a:t>
+              <a:t>12/6/18</a:t>
             </a:fld>
             <a:endParaRPr lang="en-US"/>
           </a:p>
@@ -598,7 +599,7 @@
           <a:p>
             <a:fld id="{855B1FBD-4CDE-074D-957F-E13CC52E1F54}" type="datetimeFigureOut">
               <a:rPr lang="en-US" smtClean="0"/>
-              <a:t>12/4/18</a:t>
+              <a:t>12/6/18</a:t>
             </a:fld>
             <a:endParaRPr lang="en-US"/>
           </a:p>
@@ -768,7 +769,7 @@
           <a:p>
             <a:fld id="{855B1FBD-4CDE-074D-957F-E13CC52E1F54}" type="datetimeFigureOut">
               <a:rPr lang="en-US" smtClean="0"/>
-              <a:t>12/4/18</a:t>
+              <a:t>12/6/18</a:t>
             </a:fld>
             <a:endParaRPr lang="en-US"/>
           </a:p>
@@ -1014,7 +1015,7 @@
           <a:p>
             <a:fld id="{855B1FBD-4CDE-074D-957F-E13CC52E1F54}" type="datetimeFigureOut">
               <a:rPr lang="en-US" smtClean="0"/>
-              <a:t>12/4/18</a:t>
+              <a:t>12/6/18</a:t>
             </a:fld>
             <a:endParaRPr lang="en-US"/>
           </a:p>
@@ -1246,7 +1247,7 @@
           <a:p>
             <a:fld id="{855B1FBD-4CDE-074D-957F-E13CC52E1F54}" type="datetimeFigureOut">
               <a:rPr lang="en-US" smtClean="0"/>
-              <a:t>12/4/18</a:t>
+              <a:t>12/6/18</a:t>
             </a:fld>
             <a:endParaRPr lang="en-US"/>
           </a:p>
@@ -1613,7 +1614,7 @@
           <a:p>
             <a:fld id="{855B1FBD-4CDE-074D-957F-E13CC52E1F54}" type="datetimeFigureOut">
               <a:rPr lang="en-US" smtClean="0"/>
-              <a:t>12/4/18</a:t>
+              <a:t>12/6/18</a:t>
             </a:fld>
             <a:endParaRPr lang="en-US"/>
           </a:p>
@@ -1731,7 +1732,7 @@
           <a:p>
             <a:fld id="{855B1FBD-4CDE-074D-957F-E13CC52E1F54}" type="datetimeFigureOut">
               <a:rPr lang="en-US" smtClean="0"/>
-              <a:t>12/4/18</a:t>
+              <a:t>12/6/18</a:t>
             </a:fld>
             <a:endParaRPr lang="en-US"/>
           </a:p>
@@ -1826,7 +1827,7 @@
           <a:p>
             <a:fld id="{855B1FBD-4CDE-074D-957F-E13CC52E1F54}" type="datetimeFigureOut">
               <a:rPr lang="en-US" smtClean="0"/>
-              <a:t>12/4/18</a:t>
+              <a:t>12/6/18</a:t>
             </a:fld>
             <a:endParaRPr lang="en-US"/>
           </a:p>
@@ -2103,7 +2104,7 @@
           <a:p>
             <a:fld id="{855B1FBD-4CDE-074D-957F-E13CC52E1F54}" type="datetimeFigureOut">
               <a:rPr lang="en-US" smtClean="0"/>
-              <a:t>12/4/18</a:t>
+              <a:t>12/6/18</a:t>
             </a:fld>
             <a:endParaRPr lang="en-US"/>
           </a:p>
@@ -2356,7 +2357,7 @@
           <a:p>
             <a:fld id="{855B1FBD-4CDE-074D-957F-E13CC52E1F54}" type="datetimeFigureOut">
               <a:rPr lang="en-US" smtClean="0"/>
-              <a:t>12/4/18</a:t>
+              <a:t>12/6/18</a:t>
             </a:fld>
             <a:endParaRPr lang="en-US"/>
           </a:p>
@@ -2569,7 +2570,7 @@
           <a:p>
             <a:fld id="{855B1FBD-4CDE-074D-957F-E13CC52E1F54}" type="datetimeFigureOut">
               <a:rPr lang="en-US" smtClean="0"/>
-              <a:t>12/4/18</a:t>
+              <a:t>12/6/18</a:t>
             </a:fld>
             <a:endParaRPr lang="en-US"/>
           </a:p>
@@ -5728,6 +5729,1035 @@
 </p:sld>
 </file>
 
+<file path=ppt/slides/slide7.xml><?xml version="1.0" encoding="utf-8"?>
+<p:sld xmlns:a="http://schemas.openxmlformats.org/drawingml/2006/main" xmlns:r="http://schemas.openxmlformats.org/officeDocument/2006/relationships" xmlns:p="http://schemas.openxmlformats.org/presentationml/2006/main">
+  <p:cSld>
+    <p:spTree>
+      <p:nvGrpSpPr>
+        <p:cNvPr id="1" name=""/>
+        <p:cNvGrpSpPr/>
+        <p:nvPr/>
+      </p:nvGrpSpPr>
+      <p:grpSpPr>
+        <a:xfrm>
+          <a:off x="0" y="0"/>
+          <a:ext cx="0" cy="0"/>
+          <a:chOff x="0" y="0"/>
+          <a:chExt cx="0" cy="0"/>
+        </a:xfrm>
+      </p:grpSpPr>
+      <p:grpSp>
+        <p:nvGrpSpPr>
+          <p:cNvPr id="16" name="Group 15"/>
+          <p:cNvGrpSpPr/>
+          <p:nvPr/>
+        </p:nvGrpSpPr>
+        <p:grpSpPr>
+          <a:xfrm>
+            <a:off x="-707739" y="-43453"/>
+            <a:ext cx="14469151" cy="6455756"/>
+            <a:chOff x="-707739" y="-43453"/>
+            <a:chExt cx="14469151" cy="6455756"/>
+          </a:xfrm>
+        </p:grpSpPr>
+        <p:sp>
+          <p:nvSpPr>
+            <p:cNvPr id="7" name="TextBox 6"/>
+            <p:cNvSpPr txBox="1"/>
+            <p:nvPr/>
+          </p:nvSpPr>
+          <p:spPr>
+            <a:xfrm>
+              <a:off x="-707739" y="3959534"/>
+              <a:ext cx="5577840" cy="738664"/>
+            </a:xfrm>
+            <a:prstGeom prst="rect">
+              <a:avLst/>
+            </a:prstGeom>
+            <a:noFill/>
+          </p:spPr>
+          <p:txBody>
+            <a:bodyPr wrap="square" rtlCol="0">
+              <a:spAutoFit/>
+            </a:bodyPr>
+            <a:lstStyle/>
+            <a:p>
+              <a:r>
+                <a:rPr lang="en-US" sz="4200" b="1" dirty="0" smtClean="0"/>
+                <a:t>Calculation (7.02%)</a:t>
+              </a:r>
+              <a:endParaRPr lang="en-US" sz="4200" b="1" dirty="0"/>
+            </a:p>
+          </p:txBody>
+        </p:sp>
+        <p:sp>
+          <p:nvSpPr>
+            <p:cNvPr id="8" name="TextBox 7"/>
+            <p:cNvSpPr txBox="1"/>
+            <p:nvPr/>
+          </p:nvSpPr>
+          <p:spPr>
+            <a:xfrm>
+              <a:off x="-707739" y="-43453"/>
+              <a:ext cx="4937760" cy="738664"/>
+            </a:xfrm>
+            <a:prstGeom prst="rect">
+              <a:avLst/>
+            </a:prstGeom>
+            <a:noFill/>
+          </p:spPr>
+          <p:txBody>
+            <a:bodyPr wrap="square" rtlCol="0">
+              <a:spAutoFit/>
+            </a:bodyPr>
+            <a:lstStyle/>
+            <a:p>
+              <a:r>
+                <a:rPr lang="en-US" sz="4200" b="1" dirty="0" smtClean="0"/>
+                <a:t>EMI Formula</a:t>
+              </a:r>
+              <a:endParaRPr lang="en-US" sz="4200" b="1" dirty="0"/>
+            </a:p>
+          </p:txBody>
+        </p:sp>
+        <mc:AlternateContent xmlns:mc="http://schemas.openxmlformats.org/markup-compatibility/2006">
+          <mc:Choice xmlns:a14="http://schemas.microsoft.com/office/drawing/2010/main" Requires="a14">
+            <p:sp>
+              <p:nvSpPr>
+                <p:cNvPr id="9" name="TextBox 8"/>
+                <p:cNvSpPr txBox="1"/>
+                <p:nvPr/>
+              </p:nvSpPr>
+              <p:spPr>
+                <a:xfrm>
+                  <a:off x="-707739" y="5191584"/>
+                  <a:ext cx="7315200" cy="1220719"/>
+                </a:xfrm>
+                <a:prstGeom prst="rect">
+                  <a:avLst/>
+                </a:prstGeom>
+                <a:noFill/>
+              </p:spPr>
+              <p:txBody>
+                <a:bodyPr wrap="square" rtlCol="0">
+                  <a:spAutoFit/>
+                </a:bodyPr>
+                <a:lstStyle/>
+                <a:p>
+                  <a:pPr algn="ctr"/>
+                  <a:r>
+                    <a:rPr lang="en-US" sz="3200" b="0" dirty="0" smtClean="0">
+                      <a:ea typeface="Cambria Math" charset="0"/>
+                      <a:cs typeface="Cambria Math" charset="0"/>
+                    </a:rPr>
+                    <a:t>  34689.96</a:t>
+                  </a:r>
+                  <a14:m>
+                    <m:oMath xmlns:m="http://schemas.openxmlformats.org/officeDocument/2006/math">
+                      <m:r>
+                        <a:rPr lang="en-US" sz="3200" b="0" i="1" smtClean="0">
+                          <a:latin typeface="Cambria Math" charset="0"/>
+                          <a:ea typeface="Cambria Math" charset="0"/>
+                          <a:cs typeface="Cambria Math" charset="0"/>
+                        </a:rPr>
+                        <m:t>∗</m:t>
+                      </m:r>
+                      <m:f>
+                        <m:fPr>
+                          <m:ctrlPr>
+                            <a:rPr lang="mr-IN" sz="3200" b="0" i="1" smtClean="0">
+                              <a:latin typeface="Cambria Math" charset="0"/>
+                              <a:ea typeface="Cambria Math" charset="0"/>
+                              <a:cs typeface="Cambria Math" charset="0"/>
+                            </a:rPr>
+                          </m:ctrlPr>
+                        </m:fPr>
+                        <m:num>
+                          <m:f>
+                            <m:fPr>
+                              <m:ctrlPr>
+                                <a:rPr lang="mr-IN" sz="3200" b="0" i="1" smtClean="0">
+                                  <a:latin typeface="Cambria Math" charset="0"/>
+                                  <a:ea typeface="Cambria Math" charset="0"/>
+                                  <a:cs typeface="Cambria Math" charset="0"/>
+                                </a:rPr>
+                              </m:ctrlPr>
+                            </m:fPr>
+                            <m:num>
+                              <m:r>
+                                <a:rPr lang="en-US" sz="3200" b="0" i="1" smtClean="0">
+                                  <a:latin typeface="Cambria Math" charset="0"/>
+                                  <a:ea typeface="Cambria Math" charset="0"/>
+                                  <a:cs typeface="Cambria Math" charset="0"/>
+                                </a:rPr>
+                                <m:t>0.0702</m:t>
+                              </m:r>
+                            </m:num>
+                            <m:den>
+                              <m:r>
+                                <a:rPr lang="en-US" sz="3200" b="0" i="1" smtClean="0">
+                                  <a:latin typeface="Cambria Math" charset="0"/>
+                                  <a:ea typeface="Cambria Math" charset="0"/>
+                                  <a:cs typeface="Cambria Math" charset="0"/>
+                                </a:rPr>
+                                <m:t>12</m:t>
+                              </m:r>
+                            </m:den>
+                          </m:f>
+                          <m:d>
+                            <m:dPr>
+                              <m:ctrlPr>
+                                <a:rPr lang="en-US" sz="3200" b="0" i="1" smtClean="0">
+                                  <a:latin typeface="Cambria Math" charset="0"/>
+                                  <a:ea typeface="Cambria Math" charset="0"/>
+                                  <a:cs typeface="Cambria Math" charset="0"/>
+                                </a:rPr>
+                              </m:ctrlPr>
+                            </m:dPr>
+                            <m:e>
+                              <m:r>
+                                <a:rPr lang="en-US" sz="3200" b="0" i="0" smtClean="0">
+                                  <a:latin typeface="Cambria Math" charset="0"/>
+                                  <a:ea typeface="Cambria Math" charset="0"/>
+                                  <a:cs typeface="Cambria Math" charset="0"/>
+                                </a:rPr>
+                                <m:t>1+</m:t>
+                              </m:r>
+                              <m:f>
+                                <m:fPr>
+                                  <m:ctrlPr>
+                                    <a:rPr lang="mr-IN" sz="3200" b="0" i="1" smtClean="0">
+                                      <a:latin typeface="Cambria Math" charset="0"/>
+                                      <a:ea typeface="Cambria Math" charset="0"/>
+                                      <a:cs typeface="Cambria Math" charset="0"/>
+                                    </a:rPr>
+                                  </m:ctrlPr>
+                                </m:fPr>
+                                <m:num>
+                                  <m:r>
+                                    <a:rPr lang="en-US" sz="3200" b="0" i="1" smtClean="0">
+                                      <a:latin typeface="Cambria Math" charset="0"/>
+                                      <a:ea typeface="Cambria Math" charset="0"/>
+                                      <a:cs typeface="Cambria Math" charset="0"/>
+                                    </a:rPr>
+                                    <m:t>0.0702</m:t>
+                                  </m:r>
+                                </m:num>
+                                <m:den>
+                                  <m:r>
+                                    <a:rPr lang="en-US" sz="3200" b="0" i="1" smtClean="0">
+                                      <a:latin typeface="Cambria Math" charset="0"/>
+                                      <a:ea typeface="Cambria Math" charset="0"/>
+                                      <a:cs typeface="Cambria Math" charset="0"/>
+                                    </a:rPr>
+                                    <m:t>12</m:t>
+                                  </m:r>
+                                </m:den>
+                              </m:f>
+                            </m:e>
+                          </m:d>
+                          <m:r>
+                            <a:rPr lang="en-US" sz="3200" b="0" i="1" baseline="30000" smtClean="0">
+                              <a:latin typeface="Cambria Math" charset="0"/>
+                              <a:ea typeface="Cambria Math" charset="0"/>
+                              <a:cs typeface="Cambria Math" charset="0"/>
+                            </a:rPr>
+                            <m:t>60</m:t>
+                          </m:r>
+                          <m:r>
+                            <a:rPr lang="en-US" sz="3200" b="0" i="1" smtClean="0">
+                              <a:latin typeface="Cambria Math" charset="0"/>
+                              <a:ea typeface="Cambria Math" charset="0"/>
+                              <a:cs typeface="Cambria Math" charset="0"/>
+                            </a:rPr>
+                            <m:t> </m:t>
+                          </m:r>
+                        </m:num>
+                        <m:den>
+                          <m:d>
+                            <m:dPr>
+                              <m:ctrlPr>
+                                <a:rPr lang="en-US" sz="3200" b="0" i="1" smtClean="0">
+                                  <a:latin typeface="Cambria Math" charset="0"/>
+                                  <a:ea typeface="Cambria Math" charset="0"/>
+                                  <a:cs typeface="Cambria Math" charset="0"/>
+                                </a:rPr>
+                              </m:ctrlPr>
+                            </m:dPr>
+                            <m:e>
+                              <m:r>
+                                <a:rPr lang="en-US" sz="3200" b="0" i="0" smtClean="0">
+                                  <a:latin typeface="Cambria Math" charset="0"/>
+                                  <a:ea typeface="Cambria Math" charset="0"/>
+                                  <a:cs typeface="Cambria Math" charset="0"/>
+                                </a:rPr>
+                                <m:t>1+</m:t>
+                              </m:r>
+                              <m:f>
+                                <m:fPr>
+                                  <m:ctrlPr>
+                                    <a:rPr lang="mr-IN" sz="3200" b="0" i="1" smtClean="0">
+                                      <a:latin typeface="Cambria Math" charset="0"/>
+                                      <a:ea typeface="Cambria Math" charset="0"/>
+                                      <a:cs typeface="Cambria Math" charset="0"/>
+                                    </a:rPr>
+                                  </m:ctrlPr>
+                                </m:fPr>
+                                <m:num>
+                                  <m:r>
+                                    <a:rPr lang="en-US" sz="3200" b="0" i="1" smtClean="0">
+                                      <a:latin typeface="Cambria Math" charset="0"/>
+                                      <a:ea typeface="Cambria Math" charset="0"/>
+                                      <a:cs typeface="Cambria Math" charset="0"/>
+                                    </a:rPr>
+                                    <m:t>0.0702</m:t>
+                                  </m:r>
+                                </m:num>
+                                <m:den>
+                                  <m:r>
+                                    <a:rPr lang="en-US" sz="3200" b="0" i="1" smtClean="0">
+                                      <a:latin typeface="Cambria Math" charset="0"/>
+                                      <a:ea typeface="Cambria Math" charset="0"/>
+                                      <a:cs typeface="Cambria Math" charset="0"/>
+                                    </a:rPr>
+                                    <m:t>12</m:t>
+                                  </m:r>
+                                </m:den>
+                              </m:f>
+                            </m:e>
+                          </m:d>
+                          <m:r>
+                            <a:rPr lang="en-US" sz="3200" b="0" i="1" baseline="30000" smtClean="0">
+                              <a:latin typeface="Cambria Math" charset="0"/>
+                              <a:ea typeface="Cambria Math" charset="0"/>
+                              <a:cs typeface="Cambria Math" charset="0"/>
+                            </a:rPr>
+                            <m:t>60</m:t>
+                          </m:r>
+                          <m:r>
+                            <a:rPr lang="en-US" sz="3200" b="0" i="1" smtClean="0">
+                              <a:latin typeface="Cambria Math" charset="0"/>
+                              <a:ea typeface="Cambria Math" charset="0"/>
+                              <a:cs typeface="Cambria Math" charset="0"/>
+                            </a:rPr>
+                            <m:t>−1</m:t>
+                          </m:r>
+                        </m:den>
+                      </m:f>
+                    </m:oMath>
+                  </a14:m>
+                  <a:r>
+                    <a:rPr lang="en-US" sz="3200" dirty="0" smtClean="0">
+                      <a:latin typeface="Cambria Math" charset="0"/>
+                      <a:ea typeface="Cambria Math" charset="0"/>
+                      <a:cs typeface="Cambria Math" charset="0"/>
+                    </a:rPr>
+                    <a:t>=$</a:t>
+                  </a:r>
+                  <a:r>
+                    <a:rPr lang="en-US" sz="3200" dirty="0" smtClean="0">
+                      <a:latin typeface="Cambria Math" charset="0"/>
+                      <a:ea typeface="Cambria Math" charset="0"/>
+                      <a:cs typeface="Cambria Math" charset="0"/>
+                    </a:rPr>
+                    <a:t>687.23</a:t>
+                  </a:r>
+                </a:p>
+              </p:txBody>
+            </p:sp>
+          </mc:Choice>
+          <mc:Fallback>
+            <p:sp>
+              <p:nvSpPr>
+                <p:cNvPr id="9" name="TextBox 8"/>
+                <p:cNvSpPr txBox="1">
+                  <a:spLocks noRot="1" noChangeAspect="1" noMove="1" noResize="1" noEditPoints="1" noAdjustHandles="1" noChangeArrowheads="1" noChangeShapeType="1" noTextEdit="1"/>
+                </p:cNvSpPr>
+                <p:nvPr/>
+              </p:nvSpPr>
+              <p:spPr>
+                <a:xfrm>
+                  <a:off x="-707739" y="5191584"/>
+                  <a:ext cx="7315200" cy="1220719"/>
+                </a:xfrm>
+                <a:prstGeom prst="rect">
+                  <a:avLst/>
+                </a:prstGeom>
+                <a:blipFill rotWithShape="0">
+                  <a:blip r:embed="rId2"/>
+                  <a:stretch>
+                    <a:fillRect/>
+                  </a:stretch>
+                </a:blipFill>
+              </p:spPr>
+              <p:txBody>
+                <a:bodyPr/>
+                <a:lstStyle/>
+                <a:p>
+                  <a:r>
+                    <a:rPr lang="en-US">
+                      <a:noFill/>
+                    </a:rPr>
+                    <a:t> </a:t>
+                  </a:r>
+                </a:p>
+              </p:txBody>
+            </p:sp>
+          </mc:Fallback>
+        </mc:AlternateContent>
+        <p:sp>
+          <p:nvSpPr>
+            <p:cNvPr id="11" name="TextBox 10"/>
+            <p:cNvSpPr txBox="1"/>
+            <p:nvPr/>
+          </p:nvSpPr>
+          <p:spPr>
+            <a:xfrm>
+              <a:off x="6446212" y="3959532"/>
+              <a:ext cx="5577840" cy="738664"/>
+            </a:xfrm>
+            <a:prstGeom prst="rect">
+              <a:avLst/>
+            </a:prstGeom>
+            <a:noFill/>
+          </p:spPr>
+          <p:txBody>
+            <a:bodyPr wrap="square" rtlCol="0">
+              <a:spAutoFit/>
+            </a:bodyPr>
+            <a:lstStyle/>
+            <a:p>
+              <a:r>
+                <a:rPr lang="en-US" sz="4200" b="1" dirty="0"/>
+                <a:t>Calculation </a:t>
+              </a:r>
+              <a:r>
+                <a:rPr lang="en-US" sz="4200" b="1" dirty="0" smtClean="0"/>
+                <a:t>(3.59%)</a:t>
+              </a:r>
+              <a:endParaRPr lang="en-US" sz="4200" b="1" dirty="0"/>
+            </a:p>
+          </p:txBody>
+        </p:sp>
+        <mc:AlternateContent xmlns:mc="http://schemas.openxmlformats.org/markup-compatibility/2006">
+          <mc:Choice xmlns:a14="http://schemas.microsoft.com/office/drawing/2010/main" Requires="a14">
+            <p:sp>
+              <p:nvSpPr>
+                <p:cNvPr id="12" name="TextBox 11"/>
+                <p:cNvSpPr txBox="1"/>
+                <p:nvPr/>
+              </p:nvSpPr>
+              <p:spPr>
+                <a:xfrm>
+                  <a:off x="6446212" y="5191582"/>
+                  <a:ext cx="7315200" cy="1220719"/>
+                </a:xfrm>
+                <a:prstGeom prst="rect">
+                  <a:avLst/>
+                </a:prstGeom>
+                <a:noFill/>
+              </p:spPr>
+              <p:txBody>
+                <a:bodyPr wrap="square" rtlCol="0">
+                  <a:spAutoFit/>
+                </a:bodyPr>
+                <a:lstStyle/>
+                <a:p>
+                  <a:pPr algn="ctr"/>
+                  <a:r>
+                    <a:rPr lang="en-US" sz="3200" b="0" dirty="0" smtClean="0">
+                      <a:ea typeface="Cambria Math" charset="0"/>
+                      <a:cs typeface="Cambria Math" charset="0"/>
+                    </a:rPr>
+                    <a:t>  34689.96</a:t>
+                  </a:r>
+                  <a14:m>
+                    <m:oMath xmlns:m="http://schemas.openxmlformats.org/officeDocument/2006/math">
+                      <m:r>
+                        <a:rPr lang="en-US" sz="3200" b="0" i="1" smtClean="0">
+                          <a:latin typeface="Cambria Math" charset="0"/>
+                          <a:ea typeface="Cambria Math" charset="0"/>
+                          <a:cs typeface="Cambria Math" charset="0"/>
+                        </a:rPr>
+                        <m:t>∗</m:t>
+                      </m:r>
+                      <m:f>
+                        <m:fPr>
+                          <m:ctrlPr>
+                            <a:rPr lang="mr-IN" sz="3200" b="0" i="1" smtClean="0">
+                              <a:latin typeface="Cambria Math" charset="0"/>
+                              <a:ea typeface="Cambria Math" charset="0"/>
+                              <a:cs typeface="Cambria Math" charset="0"/>
+                            </a:rPr>
+                          </m:ctrlPr>
+                        </m:fPr>
+                        <m:num>
+                          <m:f>
+                            <m:fPr>
+                              <m:ctrlPr>
+                                <a:rPr lang="mr-IN" sz="3200" b="0" i="1" smtClean="0">
+                                  <a:latin typeface="Cambria Math" charset="0"/>
+                                  <a:ea typeface="Cambria Math" charset="0"/>
+                                  <a:cs typeface="Cambria Math" charset="0"/>
+                                </a:rPr>
+                              </m:ctrlPr>
+                            </m:fPr>
+                            <m:num>
+                              <m:r>
+                                <a:rPr lang="en-US" sz="3200" b="0" i="1" smtClean="0">
+                                  <a:latin typeface="Cambria Math" charset="0"/>
+                                  <a:ea typeface="Cambria Math" charset="0"/>
+                                  <a:cs typeface="Cambria Math" charset="0"/>
+                                </a:rPr>
+                                <m:t>0.0359</m:t>
+                              </m:r>
+                            </m:num>
+                            <m:den>
+                              <m:r>
+                                <a:rPr lang="en-US" sz="3200" b="0" i="1" smtClean="0">
+                                  <a:latin typeface="Cambria Math" charset="0"/>
+                                  <a:ea typeface="Cambria Math" charset="0"/>
+                                  <a:cs typeface="Cambria Math" charset="0"/>
+                                </a:rPr>
+                                <m:t>12</m:t>
+                              </m:r>
+                            </m:den>
+                          </m:f>
+                          <m:d>
+                            <m:dPr>
+                              <m:ctrlPr>
+                                <a:rPr lang="en-US" sz="3200" b="0" i="1" smtClean="0">
+                                  <a:latin typeface="Cambria Math" charset="0"/>
+                                  <a:ea typeface="Cambria Math" charset="0"/>
+                                  <a:cs typeface="Cambria Math" charset="0"/>
+                                </a:rPr>
+                              </m:ctrlPr>
+                            </m:dPr>
+                            <m:e>
+                              <m:r>
+                                <a:rPr lang="en-US" sz="3200" b="0" i="0" smtClean="0">
+                                  <a:latin typeface="Cambria Math" charset="0"/>
+                                  <a:ea typeface="Cambria Math" charset="0"/>
+                                  <a:cs typeface="Cambria Math" charset="0"/>
+                                </a:rPr>
+                                <m:t>1+</m:t>
+                              </m:r>
+                              <m:f>
+                                <m:fPr>
+                                  <m:ctrlPr>
+                                    <a:rPr lang="mr-IN" sz="3200" b="0" i="1" smtClean="0">
+                                      <a:latin typeface="Cambria Math" charset="0"/>
+                                      <a:ea typeface="Cambria Math" charset="0"/>
+                                      <a:cs typeface="Cambria Math" charset="0"/>
+                                    </a:rPr>
+                                  </m:ctrlPr>
+                                </m:fPr>
+                                <m:num>
+                                  <m:r>
+                                    <a:rPr lang="en-US" sz="3200" b="0" i="1" smtClean="0">
+                                      <a:latin typeface="Cambria Math" charset="0"/>
+                                      <a:ea typeface="Cambria Math" charset="0"/>
+                                      <a:cs typeface="Cambria Math" charset="0"/>
+                                    </a:rPr>
+                                    <m:t>0.0359</m:t>
+                                  </m:r>
+                                </m:num>
+                                <m:den>
+                                  <m:r>
+                                    <a:rPr lang="en-US" sz="3200" b="0" i="1" smtClean="0">
+                                      <a:latin typeface="Cambria Math" charset="0"/>
+                                      <a:ea typeface="Cambria Math" charset="0"/>
+                                      <a:cs typeface="Cambria Math" charset="0"/>
+                                    </a:rPr>
+                                    <m:t>12</m:t>
+                                  </m:r>
+                                </m:den>
+                              </m:f>
+                            </m:e>
+                          </m:d>
+                          <m:r>
+                            <a:rPr lang="en-US" sz="3200" b="0" i="1" baseline="30000" smtClean="0">
+                              <a:latin typeface="Cambria Math" charset="0"/>
+                              <a:ea typeface="Cambria Math" charset="0"/>
+                              <a:cs typeface="Cambria Math" charset="0"/>
+                            </a:rPr>
+                            <m:t>60</m:t>
+                          </m:r>
+                          <m:r>
+                            <a:rPr lang="en-US" sz="3200" b="0" i="1" smtClean="0">
+                              <a:latin typeface="Cambria Math" charset="0"/>
+                              <a:ea typeface="Cambria Math" charset="0"/>
+                              <a:cs typeface="Cambria Math" charset="0"/>
+                            </a:rPr>
+                            <m:t> </m:t>
+                          </m:r>
+                        </m:num>
+                        <m:den>
+                          <m:d>
+                            <m:dPr>
+                              <m:ctrlPr>
+                                <a:rPr lang="en-US" sz="3200" b="0" i="1" smtClean="0">
+                                  <a:latin typeface="Cambria Math" charset="0"/>
+                                  <a:ea typeface="Cambria Math" charset="0"/>
+                                  <a:cs typeface="Cambria Math" charset="0"/>
+                                </a:rPr>
+                              </m:ctrlPr>
+                            </m:dPr>
+                            <m:e>
+                              <m:r>
+                                <a:rPr lang="en-US" sz="3200" b="0" i="0" smtClean="0">
+                                  <a:latin typeface="Cambria Math" charset="0"/>
+                                  <a:ea typeface="Cambria Math" charset="0"/>
+                                  <a:cs typeface="Cambria Math" charset="0"/>
+                                </a:rPr>
+                                <m:t>1+</m:t>
+                              </m:r>
+                              <m:f>
+                                <m:fPr>
+                                  <m:ctrlPr>
+                                    <a:rPr lang="mr-IN" sz="3200" b="0" i="1" smtClean="0">
+                                      <a:latin typeface="Cambria Math" charset="0"/>
+                                      <a:ea typeface="Cambria Math" charset="0"/>
+                                      <a:cs typeface="Cambria Math" charset="0"/>
+                                    </a:rPr>
+                                  </m:ctrlPr>
+                                </m:fPr>
+                                <m:num>
+                                  <m:r>
+                                    <a:rPr lang="en-US" sz="3200" b="0" i="1" smtClean="0">
+                                      <a:latin typeface="Cambria Math" charset="0"/>
+                                      <a:ea typeface="Cambria Math" charset="0"/>
+                                      <a:cs typeface="Cambria Math" charset="0"/>
+                                    </a:rPr>
+                                    <m:t>0.0359</m:t>
+                                  </m:r>
+                                </m:num>
+                                <m:den>
+                                  <m:r>
+                                    <a:rPr lang="en-US" sz="3200" b="0" i="1" smtClean="0">
+                                      <a:latin typeface="Cambria Math" charset="0"/>
+                                      <a:ea typeface="Cambria Math" charset="0"/>
+                                      <a:cs typeface="Cambria Math" charset="0"/>
+                                    </a:rPr>
+                                    <m:t>12</m:t>
+                                  </m:r>
+                                </m:den>
+                              </m:f>
+                            </m:e>
+                          </m:d>
+                          <m:r>
+                            <a:rPr lang="en-US" sz="3200" b="0" i="1" baseline="30000" smtClean="0">
+                              <a:latin typeface="Cambria Math" charset="0"/>
+                              <a:ea typeface="Cambria Math" charset="0"/>
+                              <a:cs typeface="Cambria Math" charset="0"/>
+                            </a:rPr>
+                            <m:t>60</m:t>
+                          </m:r>
+                          <m:r>
+                            <a:rPr lang="en-US" sz="3200" b="0" i="1" smtClean="0">
+                              <a:latin typeface="Cambria Math" charset="0"/>
+                              <a:ea typeface="Cambria Math" charset="0"/>
+                              <a:cs typeface="Cambria Math" charset="0"/>
+                            </a:rPr>
+                            <m:t>−1</m:t>
+                          </m:r>
+                        </m:den>
+                      </m:f>
+                    </m:oMath>
+                  </a14:m>
+                  <a:r>
+                    <a:rPr lang="en-US" sz="3200" dirty="0" smtClean="0">
+                      <a:latin typeface="Cambria Math" charset="0"/>
+                      <a:ea typeface="Cambria Math" charset="0"/>
+                      <a:cs typeface="Cambria Math" charset="0"/>
+                    </a:rPr>
+                    <a:t>=$632.47</a:t>
+                  </a:r>
+                </a:p>
+              </p:txBody>
+            </p:sp>
+          </mc:Choice>
+          <mc:Fallback>
+            <p:sp>
+              <p:nvSpPr>
+                <p:cNvPr id="12" name="TextBox 11"/>
+                <p:cNvSpPr txBox="1">
+                  <a:spLocks noRot="1" noChangeAspect="1" noMove="1" noResize="1" noEditPoints="1" noAdjustHandles="1" noChangeArrowheads="1" noChangeShapeType="1" noTextEdit="1"/>
+                </p:cNvSpPr>
+                <p:nvPr/>
+              </p:nvSpPr>
+              <p:spPr>
+                <a:xfrm>
+                  <a:off x="6446212" y="5191582"/>
+                  <a:ext cx="7315200" cy="1220719"/>
+                </a:xfrm>
+                <a:prstGeom prst="rect">
+                  <a:avLst/>
+                </a:prstGeom>
+                <a:blipFill rotWithShape="0">
+                  <a:blip r:embed="rId3"/>
+                  <a:stretch>
+                    <a:fillRect/>
+                  </a:stretch>
+                </a:blipFill>
+              </p:spPr>
+              <p:txBody>
+                <a:bodyPr/>
+                <a:lstStyle/>
+                <a:p>
+                  <a:r>
+                    <a:rPr lang="en-US">
+                      <a:noFill/>
+                    </a:rPr>
+                    <a:t> </a:t>
+                  </a:r>
+                </a:p>
+              </p:txBody>
+            </p:sp>
+          </mc:Fallback>
+        </mc:AlternateContent>
+        <mc:AlternateContent xmlns:mc="http://schemas.openxmlformats.org/markup-compatibility/2006">
+          <mc:Choice xmlns:a14="http://schemas.microsoft.com/office/drawing/2010/main" Requires="a14">
+            <p:sp>
+              <p:nvSpPr>
+                <p:cNvPr id="13" name="TextBox 12"/>
+                <p:cNvSpPr txBox="1"/>
+                <p:nvPr/>
+              </p:nvSpPr>
+              <p:spPr>
+                <a:xfrm>
+                  <a:off x="-707739" y="1392115"/>
+                  <a:ext cx="4991725" cy="1374030"/>
+                </a:xfrm>
+                <a:prstGeom prst="rect">
+                  <a:avLst/>
+                </a:prstGeom>
+                <a:noFill/>
+              </p:spPr>
+              <p:txBody>
+                <a:bodyPr wrap="square" rtlCol="0">
+                  <a:spAutoFit/>
+                </a:bodyPr>
+                <a:lstStyle/>
+                <a:p>
+                  <a:pPr/>
+                  <a14:m>
+                    <m:oMathPara xmlns:m="http://schemas.openxmlformats.org/officeDocument/2006/math">
+                      <m:oMathParaPr>
+                        <m:jc m:val="centerGroup"/>
+                      </m:oMathParaPr>
+                      <m:oMath xmlns:m="http://schemas.openxmlformats.org/officeDocument/2006/math">
+                        <m:r>
+                          <m:rPr>
+                            <m:sty m:val="p"/>
+                          </m:rPr>
+                          <a:rPr lang="en-US" sz="4000" b="0" i="0" smtClean="0">
+                            <a:latin typeface="Cambria Math" charset="0"/>
+                            <a:ea typeface="Cambria Math" charset="0"/>
+                            <a:cs typeface="Cambria Math" charset="0"/>
+                          </a:rPr>
+                          <m:t>P</m:t>
+                        </m:r>
+                        <m:r>
+                          <a:rPr lang="en-US" sz="4000" b="0" i="1" smtClean="0">
+                            <a:latin typeface="Cambria Math" charset="0"/>
+                            <a:ea typeface="Cambria Math" charset="0"/>
+                            <a:cs typeface="Cambria Math" charset="0"/>
+                          </a:rPr>
+                          <m:t> ∗ </m:t>
+                        </m:r>
+                        <m:f>
+                          <m:fPr>
+                            <m:ctrlPr>
+                              <a:rPr lang="mr-IN" sz="4000" b="0" i="1" smtClean="0">
+                                <a:latin typeface="Cambria Math" charset="0"/>
+                                <a:ea typeface="Cambria Math" charset="0"/>
+                                <a:cs typeface="Cambria Math" charset="0"/>
+                              </a:rPr>
+                            </m:ctrlPr>
+                          </m:fPr>
+                          <m:num>
+                            <m:r>
+                              <m:rPr>
+                                <m:sty m:val="p"/>
+                              </m:rPr>
+                              <a:rPr lang="en-US" sz="4000" b="0" i="0" smtClean="0">
+                                <a:latin typeface="Cambria Math" charset="0"/>
+                                <a:ea typeface="Cambria Math" charset="0"/>
+                                <a:cs typeface="Cambria Math" charset="0"/>
+                              </a:rPr>
+                              <m:t>r</m:t>
+                            </m:r>
+                            <m:d>
+                              <m:dPr>
+                                <m:ctrlPr>
+                                  <a:rPr lang="en-US" sz="4000" b="0" i="1" smtClean="0">
+                                    <a:latin typeface="Cambria Math" charset="0"/>
+                                    <a:ea typeface="Cambria Math" charset="0"/>
+                                    <a:cs typeface="Cambria Math" charset="0"/>
+                                  </a:rPr>
+                                </m:ctrlPr>
+                              </m:dPr>
+                              <m:e>
+                                <m:r>
+                                  <a:rPr lang="en-US" sz="4000" b="0" i="0" smtClean="0">
+                                    <a:latin typeface="Cambria Math" charset="0"/>
+                                    <a:ea typeface="Cambria Math" charset="0"/>
+                                    <a:cs typeface="Cambria Math" charset="0"/>
+                                  </a:rPr>
+                                  <m:t>1+</m:t>
+                                </m:r>
+                                <m:r>
+                                  <m:rPr>
+                                    <m:sty m:val="p"/>
+                                  </m:rPr>
+                                  <a:rPr lang="en-US" sz="4000" b="0" i="0" smtClean="0">
+                                    <a:latin typeface="Cambria Math" charset="0"/>
+                                    <a:ea typeface="Cambria Math" charset="0"/>
+                                    <a:cs typeface="Cambria Math" charset="0"/>
+                                  </a:rPr>
+                                  <m:t>r</m:t>
+                                </m:r>
+                              </m:e>
+                            </m:d>
+                            <m:r>
+                              <a:rPr lang="en-US" sz="4000" b="0" i="1" baseline="30000" smtClean="0">
+                                <a:latin typeface="Cambria Math" charset="0"/>
+                                <a:ea typeface="Cambria Math" charset="0"/>
+                                <a:cs typeface="Cambria Math" charset="0"/>
+                              </a:rPr>
+                              <m:t>𝑛</m:t>
+                            </m:r>
+                            <m:r>
+                              <a:rPr lang="en-US" sz="4000" b="0" i="1" smtClean="0">
+                                <a:latin typeface="Cambria Math" charset="0"/>
+                                <a:ea typeface="Cambria Math" charset="0"/>
+                                <a:cs typeface="Cambria Math" charset="0"/>
+                              </a:rPr>
+                              <m:t> </m:t>
+                            </m:r>
+                          </m:num>
+                          <m:den>
+                            <m:d>
+                              <m:dPr>
+                                <m:ctrlPr>
+                                  <a:rPr lang="en-US" sz="4000" b="0" i="1" smtClean="0">
+                                    <a:latin typeface="Cambria Math" charset="0"/>
+                                    <a:ea typeface="Cambria Math" charset="0"/>
+                                    <a:cs typeface="Cambria Math" charset="0"/>
+                                  </a:rPr>
+                                </m:ctrlPr>
+                              </m:dPr>
+                              <m:e>
+                                <m:r>
+                                  <a:rPr lang="en-US" sz="4000" b="0" i="0" smtClean="0">
+                                    <a:latin typeface="Cambria Math" charset="0"/>
+                                    <a:ea typeface="Cambria Math" charset="0"/>
+                                    <a:cs typeface="Cambria Math" charset="0"/>
+                                  </a:rPr>
+                                  <m:t>1+</m:t>
+                                </m:r>
+                                <m:r>
+                                  <m:rPr>
+                                    <m:sty m:val="p"/>
+                                  </m:rPr>
+                                  <a:rPr lang="en-US" sz="4000" b="0" i="0" smtClean="0">
+                                    <a:latin typeface="Cambria Math" charset="0"/>
+                                    <a:ea typeface="Cambria Math" charset="0"/>
+                                    <a:cs typeface="Cambria Math" charset="0"/>
+                                  </a:rPr>
+                                  <m:t>r</m:t>
+                                </m:r>
+                              </m:e>
+                            </m:d>
+                            <m:r>
+                              <a:rPr lang="en-US" sz="4000" b="0" i="1" baseline="30000" smtClean="0">
+                                <a:latin typeface="Cambria Math" charset="0"/>
+                                <a:ea typeface="Cambria Math" charset="0"/>
+                                <a:cs typeface="Cambria Math" charset="0"/>
+                              </a:rPr>
+                              <m:t>𝑛</m:t>
+                            </m:r>
+                            <m:r>
+                              <a:rPr lang="en-US" sz="4000" b="0" i="1" smtClean="0">
+                                <a:latin typeface="Cambria Math" charset="0"/>
+                                <a:ea typeface="Cambria Math" charset="0"/>
+                                <a:cs typeface="Cambria Math" charset="0"/>
+                              </a:rPr>
+                              <m:t>−1</m:t>
+                            </m:r>
+                          </m:den>
+                        </m:f>
+                      </m:oMath>
+                    </m:oMathPara>
+                  </a14:m>
+                  <a:endParaRPr lang="en-US" sz="4000" dirty="0">
+                    <a:latin typeface="Cambria Math" charset="0"/>
+                    <a:ea typeface="Cambria Math" charset="0"/>
+                    <a:cs typeface="Cambria Math" charset="0"/>
+                  </a:endParaRPr>
+                </a:p>
+              </p:txBody>
+            </p:sp>
+          </mc:Choice>
+          <mc:Fallback>
+            <p:sp>
+              <p:nvSpPr>
+                <p:cNvPr id="13" name="TextBox 12"/>
+                <p:cNvSpPr txBox="1">
+                  <a:spLocks noRot="1" noChangeAspect="1" noMove="1" noResize="1" noEditPoints="1" noAdjustHandles="1" noChangeArrowheads="1" noChangeShapeType="1" noTextEdit="1"/>
+                </p:cNvSpPr>
+                <p:nvPr/>
+              </p:nvSpPr>
+              <p:spPr>
+                <a:xfrm>
+                  <a:off x="-707739" y="1392115"/>
+                  <a:ext cx="4991725" cy="1374030"/>
+                </a:xfrm>
+                <a:prstGeom prst="rect">
+                  <a:avLst/>
+                </a:prstGeom>
+                <a:blipFill rotWithShape="0">
+                  <a:blip r:embed="rId4"/>
+                  <a:stretch>
+                    <a:fillRect/>
+                  </a:stretch>
+                </a:blipFill>
+              </p:spPr>
+              <p:txBody>
+                <a:bodyPr/>
+                <a:lstStyle/>
+                <a:p>
+                  <a:r>
+                    <a:rPr lang="en-US">
+                      <a:noFill/>
+                    </a:rPr>
+                    <a:t> </a:t>
+                  </a:r>
+                </a:p>
+              </p:txBody>
+            </p:sp>
+          </mc:Fallback>
+        </mc:AlternateContent>
+        <mc:AlternateContent xmlns:mc="http://schemas.openxmlformats.org/markup-compatibility/2006">
+          <mc:Choice xmlns:a14="http://schemas.microsoft.com/office/drawing/2010/main" Requires="a14">
+            <p:sp>
+              <p:nvSpPr>
+                <p:cNvPr id="14" name="Rectangle 13"/>
+                <p:cNvSpPr/>
+                <p:nvPr/>
+              </p:nvSpPr>
+              <p:spPr>
+                <a:xfrm>
+                  <a:off x="4389000" y="1109634"/>
+                  <a:ext cx="9052184" cy="1938992"/>
+                </a:xfrm>
+                <a:prstGeom prst="rect">
+                  <a:avLst/>
+                </a:prstGeom>
+              </p:spPr>
+              <p:txBody>
+                <a:bodyPr wrap="square">
+                  <a:spAutoFit/>
+                </a:bodyPr>
+                <a:lstStyle/>
+                <a:p>
+                  <a:r>
+                    <a:rPr lang="en-US" sz="4000" dirty="0" smtClean="0">
+                      <a:solidFill>
+                        <a:prstClr val="black"/>
+                      </a:solidFill>
+                    </a:rPr>
+                    <a:t>P = principal (amount borrowed)</a:t>
+                  </a:r>
+                </a:p>
+                <a:p>
+                  <a14:m>
+                    <m:oMath xmlns:m="http://schemas.openxmlformats.org/officeDocument/2006/math">
+                      <m:r>
+                        <m:rPr>
+                          <m:sty m:val="p"/>
+                        </m:rPr>
+                        <a:rPr lang="en-US" sz="4000" b="0" i="0" smtClean="0">
+                          <a:latin typeface="Cambria Math" charset="0"/>
+                        </a:rPr>
+                        <m:t>r</m:t>
+                      </m:r>
+                      <m:r>
+                        <a:rPr lang="en-US" sz="4000" b="0" i="0" smtClean="0">
+                          <a:latin typeface="Cambria Math" charset="0"/>
+                        </a:rPr>
+                        <m:t> </m:t>
+                      </m:r>
+                    </m:oMath>
+                  </a14:m>
+                  <a:r>
+                    <a:rPr lang="en-US" sz="4000" dirty="0" smtClean="0"/>
+                    <a:t>= interest rate / 12</a:t>
+                  </a:r>
+                </a:p>
+                <a:p>
+                  <a:r>
+                    <a:rPr lang="en-US" sz="4000" dirty="0" smtClean="0"/>
+                    <a:t>n = term (number of payments)</a:t>
+                  </a:r>
+                </a:p>
+              </p:txBody>
+            </p:sp>
+          </mc:Choice>
+          <mc:Fallback>
+            <p:sp>
+              <p:nvSpPr>
+                <p:cNvPr id="14" name="Rectangle 13"/>
+                <p:cNvSpPr>
+                  <a:spLocks noRot="1" noChangeAspect="1" noMove="1" noResize="1" noEditPoints="1" noAdjustHandles="1" noChangeArrowheads="1" noChangeShapeType="1" noTextEdit="1"/>
+                </p:cNvSpPr>
+                <p:nvPr/>
+              </p:nvSpPr>
+              <p:spPr>
+                <a:xfrm>
+                  <a:off x="4389000" y="1109634"/>
+                  <a:ext cx="9052184" cy="1938992"/>
+                </a:xfrm>
+                <a:prstGeom prst="rect">
+                  <a:avLst/>
+                </a:prstGeom>
+                <a:blipFill rotWithShape="0">
+                  <a:blip r:embed="rId5"/>
+                  <a:stretch>
+                    <a:fillRect l="-2424" t="-5660" b="-12579"/>
+                  </a:stretch>
+                </a:blipFill>
+              </p:spPr>
+              <p:txBody>
+                <a:bodyPr/>
+                <a:lstStyle/>
+                <a:p>
+                  <a:r>
+                    <a:rPr lang="en-US">
+                      <a:noFill/>
+                    </a:rPr>
+                    <a:t> </a:t>
+                  </a:r>
+                </a:p>
+              </p:txBody>
+            </p:sp>
+          </mc:Fallback>
+        </mc:AlternateContent>
+      </p:grpSp>
+    </p:spTree>
+    <p:extLst>
+      <p:ext uri="{BB962C8B-B14F-4D97-AF65-F5344CB8AC3E}">
+        <p14:creationId xmlns:p14="http://schemas.microsoft.com/office/powerpoint/2010/main" val="387896884"/>
+      </p:ext>
+    </p:extLst>
+  </p:cSld>
+  <p:clrMapOvr>
+    <a:masterClrMapping/>
+  </p:clrMapOvr>
+</p:sld>
+</file>
+
 <file path=ppt/theme/theme1.xml><?xml version="1.0" encoding="utf-8"?>
 <a:theme xmlns:a="http://schemas.openxmlformats.org/drawingml/2006/main" name="Office Theme">
   <a:themeElements>

</xml_diff>

<commit_message>
Updated graphs for car loan
</commit_message>
<xml_diff>
--- a/Finance/loans.pptx
+++ b/Finance/loans.pptx
@@ -249,7 +249,7 @@
           <a:p>
             <a:fld id="{855B1FBD-4CDE-074D-957F-E13CC52E1F54}" type="datetimeFigureOut">
               <a:rPr lang="en-US" smtClean="0"/>
-              <a:t>12/6/18</a:t>
+              <a:t>12/7/18</a:t>
             </a:fld>
             <a:endParaRPr lang="en-US"/>
           </a:p>
@@ -419,7 +419,7 @@
           <a:p>
             <a:fld id="{855B1FBD-4CDE-074D-957F-E13CC52E1F54}" type="datetimeFigureOut">
               <a:rPr lang="en-US" smtClean="0"/>
-              <a:t>12/6/18</a:t>
+              <a:t>12/7/18</a:t>
             </a:fld>
             <a:endParaRPr lang="en-US"/>
           </a:p>
@@ -599,7 +599,7 @@
           <a:p>
             <a:fld id="{855B1FBD-4CDE-074D-957F-E13CC52E1F54}" type="datetimeFigureOut">
               <a:rPr lang="en-US" smtClean="0"/>
-              <a:t>12/6/18</a:t>
+              <a:t>12/7/18</a:t>
             </a:fld>
             <a:endParaRPr lang="en-US"/>
           </a:p>
@@ -769,7 +769,7 @@
           <a:p>
             <a:fld id="{855B1FBD-4CDE-074D-957F-E13CC52E1F54}" type="datetimeFigureOut">
               <a:rPr lang="en-US" smtClean="0"/>
-              <a:t>12/6/18</a:t>
+              <a:t>12/7/18</a:t>
             </a:fld>
             <a:endParaRPr lang="en-US"/>
           </a:p>
@@ -1015,7 +1015,7 @@
           <a:p>
             <a:fld id="{855B1FBD-4CDE-074D-957F-E13CC52E1F54}" type="datetimeFigureOut">
               <a:rPr lang="en-US" smtClean="0"/>
-              <a:t>12/6/18</a:t>
+              <a:t>12/7/18</a:t>
             </a:fld>
             <a:endParaRPr lang="en-US"/>
           </a:p>
@@ -1247,7 +1247,7 @@
           <a:p>
             <a:fld id="{855B1FBD-4CDE-074D-957F-E13CC52E1F54}" type="datetimeFigureOut">
               <a:rPr lang="en-US" smtClean="0"/>
-              <a:t>12/6/18</a:t>
+              <a:t>12/7/18</a:t>
             </a:fld>
             <a:endParaRPr lang="en-US"/>
           </a:p>
@@ -1614,7 +1614,7 @@
           <a:p>
             <a:fld id="{855B1FBD-4CDE-074D-957F-E13CC52E1F54}" type="datetimeFigureOut">
               <a:rPr lang="en-US" smtClean="0"/>
-              <a:t>12/6/18</a:t>
+              <a:t>12/7/18</a:t>
             </a:fld>
             <a:endParaRPr lang="en-US"/>
           </a:p>
@@ -1732,7 +1732,7 @@
           <a:p>
             <a:fld id="{855B1FBD-4CDE-074D-957F-E13CC52E1F54}" type="datetimeFigureOut">
               <a:rPr lang="en-US" smtClean="0"/>
-              <a:t>12/6/18</a:t>
+              <a:t>12/7/18</a:t>
             </a:fld>
             <a:endParaRPr lang="en-US"/>
           </a:p>
@@ -1827,7 +1827,7 @@
           <a:p>
             <a:fld id="{855B1FBD-4CDE-074D-957F-E13CC52E1F54}" type="datetimeFigureOut">
               <a:rPr lang="en-US" smtClean="0"/>
-              <a:t>12/6/18</a:t>
+              <a:t>12/7/18</a:t>
             </a:fld>
             <a:endParaRPr lang="en-US"/>
           </a:p>
@@ -2104,7 +2104,7 @@
           <a:p>
             <a:fld id="{855B1FBD-4CDE-074D-957F-E13CC52E1F54}" type="datetimeFigureOut">
               <a:rPr lang="en-US" smtClean="0"/>
-              <a:t>12/6/18</a:t>
+              <a:t>12/7/18</a:t>
             </a:fld>
             <a:endParaRPr lang="en-US"/>
           </a:p>
@@ -2357,7 +2357,7 @@
           <a:p>
             <a:fld id="{855B1FBD-4CDE-074D-957F-E13CC52E1F54}" type="datetimeFigureOut">
               <a:rPr lang="en-US" smtClean="0"/>
-              <a:t>12/6/18</a:t>
+              <a:t>12/7/18</a:t>
             </a:fld>
             <a:endParaRPr lang="en-US"/>
           </a:p>
@@ -2570,7 +2570,7 @@
           <a:p>
             <a:fld id="{855B1FBD-4CDE-074D-957F-E13CC52E1F54}" type="datetimeFigureOut">
               <a:rPr lang="en-US" smtClean="0"/>
-              <a:t>12/6/18</a:t>
+              <a:t>12/7/18</a:t>
             </a:fld>
             <a:endParaRPr lang="en-US"/>
           </a:p>
@@ -3546,408 +3546,50 @@
           <a:chExt cx="0" cy="0"/>
         </a:xfrm>
       </p:grpSpPr>
-      <p:grpSp>
-        <p:nvGrpSpPr>
-          <p:cNvPr id="3" name="Group 2"/>
-          <p:cNvGrpSpPr/>
-          <p:nvPr/>
-        </p:nvGrpSpPr>
-        <p:grpSpPr>
-          <a:xfrm>
-            <a:off x="-707739" y="-74652"/>
-            <a:ext cx="12575889" cy="6238457"/>
-            <a:chOff x="-707739" y="-74652"/>
-            <a:chExt cx="12575889" cy="6238457"/>
-          </a:xfrm>
-        </p:grpSpPr>
-        <p:pic>
-          <p:nvPicPr>
-            <p:cNvPr id="2" name="Picture 1"/>
-            <p:cNvPicPr>
-              <a:picLocks noChangeAspect="1"/>
-            </p:cNvPicPr>
-            <p:nvPr/>
-          </p:nvPicPr>
-          <p:blipFill>
-            <a:blip r:embed="rId2">
-              <a:extLst>
-                <a:ext uri="{28A0092B-C50C-407E-A947-70E740481C1C}">
-                  <a14:useLocalDpi xmlns:a14="http://schemas.microsoft.com/office/drawing/2010/main" val="0"/>
-                </a:ext>
-              </a:extLst>
-            </a:blip>
-            <a:stretch>
-              <a:fillRect/>
-            </a:stretch>
-          </p:blipFill>
-          <p:spPr>
-            <a:xfrm>
-              <a:off x="8275680" y="769265"/>
-              <a:ext cx="3307641" cy="2505456"/>
-            </a:xfrm>
-            <a:prstGeom prst="rect">
-              <a:avLst/>
-            </a:prstGeom>
-          </p:spPr>
-        </p:pic>
-        <mc:AlternateContent xmlns:mc="http://schemas.openxmlformats.org/markup-compatibility/2006" xmlns:a14="http://schemas.microsoft.com/office/drawing/2010/main">
-          <mc:Choice Requires="a14">
-            <p:sp>
-              <p:nvSpPr>
-                <p:cNvPr id="10" name="TextBox 9"/>
-                <p:cNvSpPr txBox="1"/>
-                <p:nvPr/>
-              </p:nvSpPr>
-              <p:spPr>
-                <a:xfrm>
-                  <a:off x="155200" y="995433"/>
-                  <a:ext cx="5885009" cy="1854547"/>
-                </a:xfrm>
-                <a:prstGeom prst="rect">
-                  <a:avLst/>
-                </a:prstGeom>
-                <a:noFill/>
-              </p:spPr>
-              <p:txBody>
-                <a:bodyPr wrap="square" rtlCol="0">
-                  <a:spAutoFit/>
-                </a:bodyPr>
-                <a:lstStyle/>
-                <a:p>
-                  <a:pPr/>
-                  <a14:m>
-                    <m:oMathPara xmlns:m="http://schemas.openxmlformats.org/officeDocument/2006/math">
-                      <m:oMathParaPr>
-                        <m:jc m:val="centerGroup"/>
-                      </m:oMathParaPr>
-                      <m:oMath xmlns:m="http://schemas.openxmlformats.org/officeDocument/2006/math">
-                        <m:r>
-                          <m:rPr>
-                            <m:sty m:val="p"/>
-                          </m:rPr>
-                          <a:rPr lang="en-US" sz="5500" b="0" i="0" smtClean="0">
-                            <a:latin typeface="Cambria Math" charset="0"/>
-                            <a:ea typeface="Cambria Math" charset="0"/>
-                            <a:cs typeface="Cambria Math" charset="0"/>
-                          </a:rPr>
-                          <m:t>P</m:t>
-                        </m:r>
-                        <m:r>
-                          <a:rPr lang="en-US" sz="5500" b="0" i="1" smtClean="0">
-                            <a:latin typeface="Cambria Math" charset="0"/>
-                            <a:ea typeface="Cambria Math" charset="0"/>
-                            <a:cs typeface="Cambria Math" charset="0"/>
-                          </a:rPr>
-                          <m:t> ∗ </m:t>
-                        </m:r>
-                        <m:f>
-                          <m:fPr>
-                            <m:ctrlPr>
-                              <a:rPr lang="mr-IN" sz="5500" b="0" i="1" smtClean="0">
-                                <a:latin typeface="Cambria Math" charset="0"/>
-                                <a:ea typeface="Cambria Math" charset="0"/>
-                                <a:cs typeface="Cambria Math" charset="0"/>
-                              </a:rPr>
-                            </m:ctrlPr>
-                          </m:fPr>
-                          <m:num>
-                            <m:r>
-                              <m:rPr>
-                                <m:sty m:val="p"/>
-                              </m:rPr>
-                              <a:rPr lang="en-US" sz="5500" b="0" i="0" smtClean="0">
-                                <a:latin typeface="Cambria Math" charset="0"/>
-                                <a:ea typeface="Cambria Math" charset="0"/>
-                                <a:cs typeface="Cambria Math" charset="0"/>
-                              </a:rPr>
-                              <m:t>r</m:t>
-                            </m:r>
-                            <m:d>
-                              <m:dPr>
-                                <m:ctrlPr>
-                                  <a:rPr lang="en-US" sz="5500" b="0" i="1" smtClean="0">
-                                    <a:latin typeface="Cambria Math" charset="0"/>
-                                    <a:ea typeface="Cambria Math" charset="0"/>
-                                    <a:cs typeface="Cambria Math" charset="0"/>
-                                  </a:rPr>
-                                </m:ctrlPr>
-                              </m:dPr>
-                              <m:e>
-                                <m:r>
-                                  <a:rPr lang="en-US" sz="5500" b="0" i="0" smtClean="0">
-                                    <a:latin typeface="Cambria Math" charset="0"/>
-                                    <a:ea typeface="Cambria Math" charset="0"/>
-                                    <a:cs typeface="Cambria Math" charset="0"/>
-                                  </a:rPr>
-                                  <m:t>1+</m:t>
-                                </m:r>
-                                <m:r>
-                                  <m:rPr>
-                                    <m:sty m:val="p"/>
-                                  </m:rPr>
-                                  <a:rPr lang="en-US" sz="5500" b="0" i="0" smtClean="0">
-                                    <a:latin typeface="Cambria Math" charset="0"/>
-                                    <a:ea typeface="Cambria Math" charset="0"/>
-                                    <a:cs typeface="Cambria Math" charset="0"/>
-                                  </a:rPr>
-                                  <m:t>r</m:t>
-                                </m:r>
-                              </m:e>
-                            </m:d>
-                            <m:r>
-                              <a:rPr lang="en-US" sz="5500" b="0" i="1" baseline="30000" smtClean="0">
-                                <a:latin typeface="Cambria Math" charset="0"/>
-                                <a:ea typeface="Cambria Math" charset="0"/>
-                                <a:cs typeface="Cambria Math" charset="0"/>
-                              </a:rPr>
-                              <m:t>𝑛</m:t>
-                            </m:r>
-                            <m:r>
-                              <a:rPr lang="en-US" sz="5500" b="0" i="1" smtClean="0">
-                                <a:latin typeface="Cambria Math" charset="0"/>
-                                <a:ea typeface="Cambria Math" charset="0"/>
-                                <a:cs typeface="Cambria Math" charset="0"/>
-                              </a:rPr>
-                              <m:t> </m:t>
-                            </m:r>
-                          </m:num>
-                          <m:den>
-                            <m:d>
-                              <m:dPr>
-                                <m:ctrlPr>
-                                  <a:rPr lang="en-US" sz="5500" b="0" i="1" smtClean="0">
-                                    <a:latin typeface="Cambria Math" charset="0"/>
-                                    <a:ea typeface="Cambria Math" charset="0"/>
-                                    <a:cs typeface="Cambria Math" charset="0"/>
-                                  </a:rPr>
-                                </m:ctrlPr>
-                              </m:dPr>
-                              <m:e>
-                                <m:r>
-                                  <a:rPr lang="en-US" sz="5500" b="0" i="0" smtClean="0">
-                                    <a:latin typeface="Cambria Math" charset="0"/>
-                                    <a:ea typeface="Cambria Math" charset="0"/>
-                                    <a:cs typeface="Cambria Math" charset="0"/>
-                                  </a:rPr>
-                                  <m:t>1+</m:t>
-                                </m:r>
-                                <m:r>
-                                  <m:rPr>
-                                    <m:sty m:val="p"/>
-                                  </m:rPr>
-                                  <a:rPr lang="en-US" sz="5500" b="0" i="0" smtClean="0">
-                                    <a:latin typeface="Cambria Math" charset="0"/>
-                                    <a:ea typeface="Cambria Math" charset="0"/>
-                                    <a:cs typeface="Cambria Math" charset="0"/>
-                                  </a:rPr>
-                                  <m:t>r</m:t>
-                                </m:r>
-                              </m:e>
-                            </m:d>
-                            <m:r>
-                              <a:rPr lang="en-US" sz="5500" b="0" i="1" baseline="30000" smtClean="0">
-                                <a:latin typeface="Cambria Math" charset="0"/>
-                                <a:ea typeface="Cambria Math" charset="0"/>
-                                <a:cs typeface="Cambria Math" charset="0"/>
-                              </a:rPr>
-                              <m:t>𝑛</m:t>
-                            </m:r>
-                            <m:r>
-                              <a:rPr lang="en-US" sz="5500" b="0" i="1" smtClean="0">
-                                <a:latin typeface="Cambria Math" charset="0"/>
-                                <a:ea typeface="Cambria Math" charset="0"/>
-                                <a:cs typeface="Cambria Math" charset="0"/>
-                              </a:rPr>
-                              <m:t>−1</m:t>
-                            </m:r>
-                          </m:den>
-                        </m:f>
-                      </m:oMath>
-                    </m:oMathPara>
-                  </a14:m>
-                  <a:endParaRPr lang="en-US" sz="5500" dirty="0">
-                    <a:latin typeface="Cambria Math" charset="0"/>
-                    <a:ea typeface="Cambria Math" charset="0"/>
-                    <a:cs typeface="Cambria Math" charset="0"/>
-                  </a:endParaRPr>
-                </a:p>
-              </p:txBody>
-            </p:sp>
-          </mc:Choice>
-          <mc:Fallback xmlns="">
-            <p:sp>
-              <p:nvSpPr>
-                <p:cNvPr id="10" name="TextBox 9"/>
-                <p:cNvSpPr txBox="1">
-                  <a:spLocks noRot="1" noChangeAspect="1" noMove="1" noResize="1" noEditPoints="1" noAdjustHandles="1" noChangeArrowheads="1" noChangeShapeType="1" noTextEdit="1"/>
-                </p:cNvSpPr>
-                <p:nvPr/>
-              </p:nvSpPr>
-              <p:spPr>
-                <a:xfrm>
-                  <a:off x="155200" y="995433"/>
-                  <a:ext cx="5885009" cy="1854547"/>
-                </a:xfrm>
-                <a:prstGeom prst="rect">
-                  <a:avLst/>
-                </a:prstGeom>
-                <a:blipFill rotWithShape="0">
-                  <a:blip r:embed="rId3"/>
-                  <a:stretch>
-                    <a:fillRect/>
-                  </a:stretch>
-                </a:blipFill>
-              </p:spPr>
-              <p:txBody>
-                <a:bodyPr/>
-                <a:lstStyle/>
-                <a:p>
-                  <a:r>
-                    <a:rPr lang="en-US">
-                      <a:noFill/>
-                    </a:rPr>
-                    <a:t> </a:t>
-                  </a:r>
-                </a:p>
-              </p:txBody>
-            </p:sp>
-          </mc:Fallback>
-        </mc:AlternateContent>
-        <p:sp>
-          <p:nvSpPr>
-            <p:cNvPr id="5" name="TextBox 4"/>
-            <p:cNvSpPr txBox="1"/>
-            <p:nvPr/>
-          </p:nvSpPr>
-          <p:spPr>
-            <a:xfrm>
-              <a:off x="6645561" y="-74652"/>
-              <a:ext cx="4937760" cy="646331"/>
-            </a:xfrm>
-            <a:prstGeom prst="rect">
-              <a:avLst/>
-            </a:prstGeom>
-            <a:noFill/>
-          </p:spPr>
-          <p:txBody>
-            <a:bodyPr wrap="square" rtlCol="0">
-              <a:spAutoFit/>
-            </a:bodyPr>
-            <a:lstStyle/>
-            <a:p>
-              <a:r>
-                <a:rPr lang="en-US" sz="3600" b="1" dirty="0" smtClean="0"/>
-                <a:t>Python Calculation</a:t>
-              </a:r>
-              <a:endParaRPr lang="en-US" sz="3600" b="1" dirty="0"/>
-            </a:p>
-          </p:txBody>
-        </p:sp>
-        <p:sp>
-          <p:nvSpPr>
-            <p:cNvPr id="6" name="TextBox 5"/>
-            <p:cNvSpPr txBox="1"/>
-            <p:nvPr/>
-          </p:nvSpPr>
-          <p:spPr>
-            <a:xfrm>
-              <a:off x="-707739" y="3273734"/>
-              <a:ext cx="4937760" cy="646331"/>
-            </a:xfrm>
-            <a:prstGeom prst="rect">
-              <a:avLst/>
-            </a:prstGeom>
-            <a:noFill/>
-          </p:spPr>
-          <p:txBody>
-            <a:bodyPr wrap="square" rtlCol="0">
-              <a:spAutoFit/>
-            </a:bodyPr>
-            <a:lstStyle/>
-            <a:p>
-              <a:r>
-                <a:rPr lang="en-US" sz="3600" b="1" dirty="0" smtClean="0"/>
-                <a:t>Calculation</a:t>
-              </a:r>
-              <a:endParaRPr lang="en-US" sz="3600" b="1" dirty="0"/>
-            </a:p>
-          </p:txBody>
-        </p:sp>
-        <p:sp>
-          <p:nvSpPr>
-            <p:cNvPr id="12" name="TextBox 11"/>
-            <p:cNvSpPr txBox="1"/>
-            <p:nvPr/>
-          </p:nvSpPr>
-          <p:spPr>
-            <a:xfrm>
-              <a:off x="-707739" y="-74652"/>
-              <a:ext cx="4937760" cy="646331"/>
-            </a:xfrm>
-            <a:prstGeom prst="rect">
-              <a:avLst/>
-            </a:prstGeom>
-            <a:noFill/>
-          </p:spPr>
-          <p:txBody>
-            <a:bodyPr wrap="square" rtlCol="0">
-              <a:spAutoFit/>
-            </a:bodyPr>
-            <a:lstStyle/>
-            <a:p>
-              <a:r>
-                <a:rPr lang="en-US" sz="3600" b="1" dirty="0" smtClean="0"/>
-                <a:t>EMI Formula</a:t>
-              </a:r>
-              <a:endParaRPr lang="en-US" sz="3600" b="1" dirty="0"/>
-            </a:p>
-          </p:txBody>
-        </p:sp>
-        <mc:AlternateContent xmlns:mc="http://schemas.openxmlformats.org/markup-compatibility/2006" xmlns:a14="http://schemas.microsoft.com/office/drawing/2010/main">
-          <mc:Choice Requires="a14">
-            <p:sp>
-              <p:nvSpPr>
-                <p:cNvPr id="9" name="TextBox 8"/>
-                <p:cNvSpPr txBox="1"/>
-                <p:nvPr/>
-              </p:nvSpPr>
-              <p:spPr>
-                <a:xfrm>
-                  <a:off x="-498189" y="4343820"/>
-                  <a:ext cx="12366339" cy="1819985"/>
-                </a:xfrm>
-                <a:prstGeom prst="rect">
-                  <a:avLst/>
-                </a:prstGeom>
-                <a:noFill/>
-              </p:spPr>
-              <p:txBody>
-                <a:bodyPr wrap="square" rtlCol="0">
-                  <a:spAutoFit/>
-                </a:bodyPr>
-                <a:lstStyle/>
-                <a:p>
-                  <a:pPr algn="ctr"/>
-                  <a14:m>
+      <mc:AlternateContent xmlns:mc="http://schemas.openxmlformats.org/markup-compatibility/2006">
+        <mc:Choice xmlns:a14="http://schemas.microsoft.com/office/drawing/2010/main" Requires="a14">
+          <p:sp>
+            <p:nvSpPr>
+              <p:cNvPr id="10" name="TextBox 9"/>
+              <p:cNvSpPr txBox="1"/>
+              <p:nvPr/>
+            </p:nvSpPr>
+            <p:spPr>
+              <a:xfrm>
+                <a:off x="155200" y="995433"/>
+                <a:ext cx="5885009" cy="1854547"/>
+              </a:xfrm>
+              <a:prstGeom prst="rect">
+                <a:avLst/>
+              </a:prstGeom>
+              <a:noFill/>
+            </p:spPr>
+            <p:txBody>
+              <a:bodyPr wrap="square" rtlCol="0">
+                <a:spAutoFit/>
+              </a:bodyPr>
+              <a:lstStyle/>
+              <a:p>
+                <a:pPr/>
+                <a14:m>
+                  <m:oMathPara xmlns:m="http://schemas.openxmlformats.org/officeDocument/2006/math">
+                    <m:oMathParaPr>
+                      <m:jc m:val="centerGroup"/>
+                    </m:oMathParaPr>
                     <m:oMath xmlns:m="http://schemas.openxmlformats.org/officeDocument/2006/math">
                       <m:r>
-                        <a:rPr lang="en-US" sz="4900" smtClean="0">
+                        <m:rPr>
+                          <m:sty m:val="p"/>
+                        </m:rPr>
+                        <a:rPr lang="en-US" sz="5500" b="0" i="0" smtClean="0">
                           <a:latin typeface="Cambria Math" charset="0"/>
                           <a:ea typeface="Cambria Math" charset="0"/>
                           <a:cs typeface="Cambria Math" charset="0"/>
                         </a:rPr>
-                        <m:t>(</m:t>
+                        <m:t>P</m:t>
                       </m:r>
                       <m:r>
-                        <a:rPr lang="en-US" sz="4900" b="0" i="0" smtClean="0">
-                          <a:latin typeface="Cambria Math" charset="0"/>
-                          <a:ea typeface="Cambria Math" charset="0"/>
-                          <a:cs typeface="Cambria Math" charset="0"/>
-                        </a:rPr>
-                        <m:t>31115 ∗1.075)</m:t>
-                      </m:r>
-                      <m:r>
-                        <a:rPr lang="en-US" sz="4900" b="0" i="1" smtClean="0">
+                        <a:rPr lang="en-US" sz="5500" b="0" i="1" smtClean="0">
                           <a:latin typeface="Cambria Math" charset="0"/>
                           <a:ea typeface="Cambria Math" charset="0"/>
                           <a:cs typeface="Cambria Math" charset="0"/>
@@ -3957,7 +3599,7 @@
                       <m:f>
                         <m:fPr>
                           <m:ctrlPr>
-                            <a:rPr lang="mr-IN" sz="4900" b="0" i="1" smtClean="0">
+                            <a:rPr lang="mr-IN" sz="5500" b="0" i="1" smtClean="0">
                               <a:latin typeface="Cambria Math" charset="0"/>
                               <a:ea typeface="Cambria Math" charset="0"/>
                               <a:cs typeface="Cambria Math" charset="0"/>
@@ -3965,41 +3607,21 @@
                           </m:ctrlPr>
                         </m:fPr>
                         <m:num>
-                          <m:f>
-                            <m:fPr>
-                              <m:ctrlPr>
-                                <a:rPr lang="mr-IN" sz="4900" b="0" i="1" smtClean="0">
-                                  <a:latin typeface="Cambria Math" charset="0"/>
-                                  <a:ea typeface="Cambria Math" charset="0"/>
-                                  <a:cs typeface="Cambria Math" charset="0"/>
-                                </a:rPr>
-                              </m:ctrlPr>
-                            </m:fPr>
-                            <m:num>
-                              <m:r>
-                                <a:rPr lang="en-US" sz="4900" b="0" i="1" smtClean="0">
-                                  <a:latin typeface="Cambria Math" charset="0"/>
-                                  <a:ea typeface="Cambria Math" charset="0"/>
-                                  <a:cs typeface="Cambria Math" charset="0"/>
-                                </a:rPr>
-                                <m:t>0.0702</m:t>
-                              </m:r>
-                            </m:num>
-                            <m:den>
-                              <m:r>
-                                <a:rPr lang="en-US" sz="4900" b="0" i="1" smtClean="0">
-                                  <a:latin typeface="Cambria Math" charset="0"/>
-                                  <a:ea typeface="Cambria Math" charset="0"/>
-                                  <a:cs typeface="Cambria Math" charset="0"/>
-                                </a:rPr>
-                                <m:t>12</m:t>
-                              </m:r>
-                            </m:den>
-                          </m:f>
+                          <m:r>
+                            <m:rPr>
+                              <m:sty m:val="p"/>
+                            </m:rPr>
+                            <a:rPr lang="en-US" sz="5500" b="0" i="0" smtClean="0">
+                              <a:latin typeface="Cambria Math" charset="0"/>
+                              <a:ea typeface="Cambria Math" charset="0"/>
+                              <a:cs typeface="Cambria Math" charset="0"/>
+                            </a:rPr>
+                            <m:t>r</m:t>
+                          </m:r>
                           <m:d>
                             <m:dPr>
                               <m:ctrlPr>
-                                <a:rPr lang="en-US" sz="4900" b="0" i="1" smtClean="0">
+                                <a:rPr lang="en-US" sz="5500" b="0" i="1" smtClean="0">
                                   <a:latin typeface="Cambria Math" charset="0"/>
                                   <a:ea typeface="Cambria Math" charset="0"/>
                                   <a:cs typeface="Cambria Math" charset="0"/>
@@ -4008,56 +3630,36 @@
                             </m:dPr>
                             <m:e>
                               <m:r>
-                                <a:rPr lang="en-US" sz="4900" b="0" i="0" smtClean="0">
+                                <a:rPr lang="en-US" sz="5500" b="0" i="0" smtClean="0">
                                   <a:latin typeface="Cambria Math" charset="0"/>
                                   <a:ea typeface="Cambria Math" charset="0"/>
                                   <a:cs typeface="Cambria Math" charset="0"/>
                                 </a:rPr>
                                 <m:t>1+</m:t>
                               </m:r>
-                              <m:f>
-                                <m:fPr>
-                                  <m:ctrlPr>
-                                    <a:rPr lang="mr-IN" sz="4900" b="0" i="1" smtClean="0">
-                                      <a:latin typeface="Cambria Math" charset="0"/>
-                                      <a:ea typeface="Cambria Math" charset="0"/>
-                                      <a:cs typeface="Cambria Math" charset="0"/>
-                                    </a:rPr>
-                                  </m:ctrlPr>
-                                </m:fPr>
-                                <m:num>
-                                  <m:r>
-                                    <a:rPr lang="en-US" sz="4900" b="0" i="1" smtClean="0">
-                                      <a:latin typeface="Cambria Math" charset="0"/>
-                                      <a:ea typeface="Cambria Math" charset="0"/>
-                                      <a:cs typeface="Cambria Math" charset="0"/>
-                                    </a:rPr>
-                                    <m:t>0.0702</m:t>
-                                  </m:r>
-                                </m:num>
-                                <m:den>
-                                  <m:r>
-                                    <a:rPr lang="en-US" sz="4900" b="0" i="1" smtClean="0">
-                                      <a:latin typeface="Cambria Math" charset="0"/>
-                                      <a:ea typeface="Cambria Math" charset="0"/>
-                                      <a:cs typeface="Cambria Math" charset="0"/>
-                                    </a:rPr>
-                                    <m:t>12</m:t>
-                                  </m:r>
-                                </m:den>
-                              </m:f>
+                              <m:r>
+                                <m:rPr>
+                                  <m:sty m:val="p"/>
+                                </m:rPr>
+                                <a:rPr lang="en-US" sz="5500" b="0" i="0" smtClean="0">
+                                  <a:latin typeface="Cambria Math" charset="0"/>
+                                  <a:ea typeface="Cambria Math" charset="0"/>
+                                  <a:cs typeface="Cambria Math" charset="0"/>
+                                </a:rPr>
+                                <m:t>r</m:t>
+                              </m:r>
                             </m:e>
                           </m:d>
                           <m:r>
-                            <a:rPr lang="en-US" sz="4900" b="0" i="1" baseline="30000" smtClean="0">
+                            <a:rPr lang="en-US" sz="5500" b="0" i="1" baseline="30000" smtClean="0">
                               <a:latin typeface="Cambria Math" charset="0"/>
                               <a:ea typeface="Cambria Math" charset="0"/>
                               <a:cs typeface="Cambria Math" charset="0"/>
                             </a:rPr>
-                            <m:t>60</m:t>
+                            <m:t>𝑛</m:t>
                           </m:r>
                           <m:r>
-                            <a:rPr lang="en-US" sz="4900" b="0" i="1" smtClean="0">
+                            <a:rPr lang="en-US" sz="5500" b="0" i="1" smtClean="0">
                               <a:latin typeface="Cambria Math" charset="0"/>
                               <a:ea typeface="Cambria Math" charset="0"/>
                               <a:cs typeface="Cambria Math" charset="0"/>
@@ -4069,7 +3671,7 @@
                           <m:d>
                             <m:dPr>
                               <m:ctrlPr>
-                                <a:rPr lang="en-US" sz="4900" b="0" i="1" smtClean="0">
+                                <a:rPr lang="en-US" sz="5500" b="0" i="1" smtClean="0">
                                   <a:latin typeface="Cambria Math" charset="0"/>
                                   <a:ea typeface="Cambria Math" charset="0"/>
                                   <a:cs typeface="Cambria Math" charset="0"/>
@@ -4078,56 +3680,36 @@
                             </m:dPr>
                             <m:e>
                               <m:r>
-                                <a:rPr lang="en-US" sz="4900" b="0" i="0" smtClean="0">
+                                <a:rPr lang="en-US" sz="5500" b="0" i="0" smtClean="0">
                                   <a:latin typeface="Cambria Math" charset="0"/>
                                   <a:ea typeface="Cambria Math" charset="0"/>
                                   <a:cs typeface="Cambria Math" charset="0"/>
                                 </a:rPr>
                                 <m:t>1+</m:t>
                               </m:r>
-                              <m:f>
-                                <m:fPr>
-                                  <m:ctrlPr>
-                                    <a:rPr lang="mr-IN" sz="4900" b="0" i="1" smtClean="0">
-                                      <a:latin typeface="Cambria Math" charset="0"/>
-                                      <a:ea typeface="Cambria Math" charset="0"/>
-                                      <a:cs typeface="Cambria Math" charset="0"/>
-                                    </a:rPr>
-                                  </m:ctrlPr>
-                                </m:fPr>
-                                <m:num>
-                                  <m:r>
-                                    <a:rPr lang="en-US" sz="4900" b="0" i="1" smtClean="0">
-                                      <a:latin typeface="Cambria Math" charset="0"/>
-                                      <a:ea typeface="Cambria Math" charset="0"/>
-                                      <a:cs typeface="Cambria Math" charset="0"/>
-                                    </a:rPr>
-                                    <m:t>0.0702</m:t>
-                                  </m:r>
-                                </m:num>
-                                <m:den>
-                                  <m:r>
-                                    <a:rPr lang="en-US" sz="4900" b="0" i="1" smtClean="0">
-                                      <a:latin typeface="Cambria Math" charset="0"/>
-                                      <a:ea typeface="Cambria Math" charset="0"/>
-                                      <a:cs typeface="Cambria Math" charset="0"/>
-                                    </a:rPr>
-                                    <m:t>12</m:t>
-                                  </m:r>
-                                </m:den>
-                              </m:f>
+                              <m:r>
+                                <m:rPr>
+                                  <m:sty m:val="p"/>
+                                </m:rPr>
+                                <a:rPr lang="en-US" sz="5500" b="0" i="0" smtClean="0">
+                                  <a:latin typeface="Cambria Math" charset="0"/>
+                                  <a:ea typeface="Cambria Math" charset="0"/>
+                                  <a:cs typeface="Cambria Math" charset="0"/>
+                                </a:rPr>
+                                <m:t>r</m:t>
+                              </m:r>
                             </m:e>
                           </m:d>
                           <m:r>
-                            <a:rPr lang="en-US" sz="4900" b="0" i="1" baseline="30000" smtClean="0">
+                            <a:rPr lang="en-US" sz="5500" b="0" i="1" baseline="30000" smtClean="0">
                               <a:latin typeface="Cambria Math" charset="0"/>
                               <a:ea typeface="Cambria Math" charset="0"/>
                               <a:cs typeface="Cambria Math" charset="0"/>
                             </a:rPr>
-                            <m:t>60</m:t>
+                            <m:t>𝑛</m:t>
                           </m:r>
                           <m:r>
-                            <a:rPr lang="en-US" sz="4900" b="0" i="1" smtClean="0">
+                            <a:rPr lang="en-US" sz="5500" b="0" i="1" smtClean="0">
                               <a:latin typeface="Cambria Math" charset="0"/>
                               <a:ea typeface="Cambria Math" charset="0"/>
                               <a:cs typeface="Cambria Math" charset="0"/>
@@ -4137,59 +3719,462 @@
                         </m:den>
                       </m:f>
                     </m:oMath>
-                  </a14:m>
-                  <a:r>
-                    <a:rPr lang="en-US" sz="4900" dirty="0" smtClean="0">
-                      <a:latin typeface="Cambria Math" charset="0"/>
-                      <a:ea typeface="Cambria Math" charset="0"/>
-                      <a:cs typeface="Cambria Math" charset="0"/>
-                    </a:rPr>
-                    <a:t> = $662.64</a:t>
-                  </a:r>
-                </a:p>
-              </p:txBody>
-            </p:sp>
-          </mc:Choice>
-          <mc:Fallback xmlns="">
-            <p:sp>
-              <p:nvSpPr>
-                <p:cNvPr id="9" name="TextBox 8"/>
-                <p:cNvSpPr txBox="1">
-                  <a:spLocks noRot="1" noChangeAspect="1" noMove="1" noResize="1" noEditPoints="1" noAdjustHandles="1" noChangeArrowheads="1" noChangeShapeType="1" noTextEdit="1"/>
-                </p:cNvSpPr>
-                <p:nvPr/>
-              </p:nvSpPr>
-              <p:spPr>
-                <a:xfrm>
-                  <a:off x="-498189" y="4343820"/>
-                  <a:ext cx="12366339" cy="1819985"/>
-                </a:xfrm>
-                <a:prstGeom prst="rect">
-                  <a:avLst/>
-                </a:prstGeom>
-                <a:blipFill rotWithShape="0">
-                  <a:blip r:embed="rId4"/>
-                  <a:stretch>
-                    <a:fillRect r="-1774"/>
-                  </a:stretch>
-                </a:blipFill>
-              </p:spPr>
-              <p:txBody>
-                <a:bodyPr/>
-                <a:lstStyle/>
-                <a:p>
-                  <a:r>
-                    <a:rPr lang="en-US">
-                      <a:noFill/>
-                    </a:rPr>
-                    <a:t> </a:t>
-                  </a:r>
-                </a:p>
-              </p:txBody>
-            </p:sp>
-          </mc:Fallback>
-        </mc:AlternateContent>
-      </p:grpSp>
+                  </m:oMathPara>
+                </a14:m>
+                <a:endParaRPr lang="en-US" sz="5500" dirty="0">
+                  <a:latin typeface="Cambria Math" charset="0"/>
+                  <a:ea typeface="Cambria Math" charset="0"/>
+                  <a:cs typeface="Cambria Math" charset="0"/>
+                </a:endParaRPr>
+              </a:p>
+            </p:txBody>
+          </p:sp>
+        </mc:Choice>
+        <mc:Fallback>
+          <p:sp>
+            <p:nvSpPr>
+              <p:cNvPr id="10" name="TextBox 9"/>
+              <p:cNvSpPr txBox="1">
+                <a:spLocks noRot="1" noChangeAspect="1" noMove="1" noResize="1" noEditPoints="1" noAdjustHandles="1" noChangeArrowheads="1" noChangeShapeType="1" noTextEdit="1"/>
+              </p:cNvSpPr>
+              <p:nvPr/>
+            </p:nvSpPr>
+            <p:spPr>
+              <a:xfrm>
+                <a:off x="155200" y="995433"/>
+                <a:ext cx="5885009" cy="1854547"/>
+              </a:xfrm>
+              <a:prstGeom prst="rect">
+                <a:avLst/>
+              </a:prstGeom>
+              <a:blipFill rotWithShape="0">
+                <a:blip r:embed="rId2"/>
+                <a:stretch>
+                  <a:fillRect/>
+                </a:stretch>
+              </a:blipFill>
+            </p:spPr>
+            <p:txBody>
+              <a:bodyPr/>
+              <a:lstStyle/>
+              <a:p>
+                <a:r>
+                  <a:rPr lang="en-US">
+                    <a:noFill/>
+                  </a:rPr>
+                  <a:t> </a:t>
+                </a:r>
+              </a:p>
+            </p:txBody>
+          </p:sp>
+        </mc:Fallback>
+      </mc:AlternateContent>
+      <p:sp>
+        <p:nvSpPr>
+          <p:cNvPr id="5" name="TextBox 4"/>
+          <p:cNvSpPr txBox="1"/>
+          <p:nvPr/>
+        </p:nvSpPr>
+        <p:spPr>
+          <a:xfrm>
+            <a:off x="6645561" y="-74652"/>
+            <a:ext cx="4937760" cy="646331"/>
+          </a:xfrm>
+          <a:prstGeom prst="rect">
+            <a:avLst/>
+          </a:prstGeom>
+          <a:noFill/>
+        </p:spPr>
+        <p:txBody>
+          <a:bodyPr wrap="square" rtlCol="0">
+            <a:spAutoFit/>
+          </a:bodyPr>
+          <a:lstStyle/>
+          <a:p>
+            <a:r>
+              <a:rPr lang="en-US" sz="3600" b="1" dirty="0" smtClean="0"/>
+              <a:t>Python Calculation</a:t>
+            </a:r>
+            <a:endParaRPr lang="en-US" sz="3600" b="1" dirty="0"/>
+          </a:p>
+        </p:txBody>
+      </p:sp>
+      <p:sp>
+        <p:nvSpPr>
+          <p:cNvPr id="6" name="TextBox 5"/>
+          <p:cNvSpPr txBox="1"/>
+          <p:nvPr/>
+        </p:nvSpPr>
+        <p:spPr>
+          <a:xfrm>
+            <a:off x="-707739" y="3273734"/>
+            <a:ext cx="4937760" cy="646331"/>
+          </a:xfrm>
+          <a:prstGeom prst="rect">
+            <a:avLst/>
+          </a:prstGeom>
+          <a:noFill/>
+        </p:spPr>
+        <p:txBody>
+          <a:bodyPr wrap="square" rtlCol="0">
+            <a:spAutoFit/>
+          </a:bodyPr>
+          <a:lstStyle/>
+          <a:p>
+            <a:r>
+              <a:rPr lang="en-US" sz="3600" b="1" dirty="0" smtClean="0"/>
+              <a:t>Calculation</a:t>
+            </a:r>
+            <a:endParaRPr lang="en-US" sz="3600" b="1" dirty="0"/>
+          </a:p>
+        </p:txBody>
+      </p:sp>
+      <p:sp>
+        <p:nvSpPr>
+          <p:cNvPr id="12" name="TextBox 11"/>
+          <p:cNvSpPr txBox="1"/>
+          <p:nvPr/>
+        </p:nvSpPr>
+        <p:spPr>
+          <a:xfrm>
+            <a:off x="-707739" y="-74652"/>
+            <a:ext cx="4937760" cy="646331"/>
+          </a:xfrm>
+          <a:prstGeom prst="rect">
+            <a:avLst/>
+          </a:prstGeom>
+          <a:noFill/>
+        </p:spPr>
+        <p:txBody>
+          <a:bodyPr wrap="square" rtlCol="0">
+            <a:spAutoFit/>
+          </a:bodyPr>
+          <a:lstStyle/>
+          <a:p>
+            <a:r>
+              <a:rPr lang="en-US" sz="3600" b="1" dirty="0" smtClean="0"/>
+              <a:t>EMI Formula</a:t>
+            </a:r>
+            <a:endParaRPr lang="en-US" sz="3600" b="1" dirty="0"/>
+          </a:p>
+        </p:txBody>
+      </p:sp>
+      <mc:AlternateContent xmlns:mc="http://schemas.openxmlformats.org/markup-compatibility/2006">
+        <mc:Choice xmlns:a14="http://schemas.microsoft.com/office/drawing/2010/main" Requires="a14">
+          <p:sp>
+            <p:nvSpPr>
+              <p:cNvPr id="9" name="TextBox 8"/>
+              <p:cNvSpPr txBox="1"/>
+              <p:nvPr/>
+            </p:nvSpPr>
+            <p:spPr>
+              <a:xfrm>
+                <a:off x="-498189" y="4343820"/>
+                <a:ext cx="12366339" cy="1819985"/>
+              </a:xfrm>
+              <a:prstGeom prst="rect">
+                <a:avLst/>
+              </a:prstGeom>
+              <a:noFill/>
+            </p:spPr>
+            <p:txBody>
+              <a:bodyPr wrap="square" rtlCol="0">
+                <a:spAutoFit/>
+              </a:bodyPr>
+              <a:lstStyle/>
+              <a:p>
+                <a:pPr algn="ctr"/>
+                <a14:m>
+                  <m:oMath xmlns:m="http://schemas.openxmlformats.org/officeDocument/2006/math">
+                    <m:r>
+                      <a:rPr lang="en-US" sz="4900" smtClean="0">
+                        <a:latin typeface="Cambria Math" charset="0"/>
+                        <a:ea typeface="Cambria Math" charset="0"/>
+                        <a:cs typeface="Cambria Math" charset="0"/>
+                      </a:rPr>
+                      <m:t>(</m:t>
+                    </m:r>
+                    <m:r>
+                      <a:rPr lang="en-US" sz="4900" b="0" i="0" smtClean="0">
+                        <a:latin typeface="Cambria Math" charset="0"/>
+                        <a:ea typeface="Cambria Math" charset="0"/>
+                        <a:cs typeface="Cambria Math" charset="0"/>
+                      </a:rPr>
+                      <m:t>31115 ∗1.075)</m:t>
+                    </m:r>
+                    <m:r>
+                      <a:rPr lang="en-US" sz="4900" b="0" i="1" smtClean="0">
+                        <a:latin typeface="Cambria Math" charset="0"/>
+                        <a:ea typeface="Cambria Math" charset="0"/>
+                        <a:cs typeface="Cambria Math" charset="0"/>
+                      </a:rPr>
+                      <m:t> ∗ </m:t>
+                    </m:r>
+                    <m:f>
+                      <m:fPr>
+                        <m:ctrlPr>
+                          <a:rPr lang="mr-IN" sz="4900" b="0" i="1" smtClean="0">
+                            <a:latin typeface="Cambria Math" charset="0"/>
+                            <a:ea typeface="Cambria Math" charset="0"/>
+                            <a:cs typeface="Cambria Math" charset="0"/>
+                          </a:rPr>
+                        </m:ctrlPr>
+                      </m:fPr>
+                      <m:num>
+                        <m:f>
+                          <m:fPr>
+                            <m:ctrlPr>
+                              <a:rPr lang="mr-IN" sz="4900" b="0" i="1" smtClean="0">
+                                <a:latin typeface="Cambria Math" charset="0"/>
+                                <a:ea typeface="Cambria Math" charset="0"/>
+                                <a:cs typeface="Cambria Math" charset="0"/>
+                              </a:rPr>
+                            </m:ctrlPr>
+                          </m:fPr>
+                          <m:num>
+                            <m:r>
+                              <a:rPr lang="en-US" sz="4900" b="0" i="1" smtClean="0">
+                                <a:latin typeface="Cambria Math" charset="0"/>
+                                <a:ea typeface="Cambria Math" charset="0"/>
+                                <a:cs typeface="Cambria Math" charset="0"/>
+                              </a:rPr>
+                              <m:t>0.0702</m:t>
+                            </m:r>
+                          </m:num>
+                          <m:den>
+                            <m:r>
+                              <a:rPr lang="en-US" sz="4900" b="0" i="1" smtClean="0">
+                                <a:latin typeface="Cambria Math" charset="0"/>
+                                <a:ea typeface="Cambria Math" charset="0"/>
+                                <a:cs typeface="Cambria Math" charset="0"/>
+                              </a:rPr>
+                              <m:t>12</m:t>
+                            </m:r>
+                          </m:den>
+                        </m:f>
+                        <m:d>
+                          <m:dPr>
+                            <m:ctrlPr>
+                              <a:rPr lang="en-US" sz="4900" b="0" i="1" smtClean="0">
+                                <a:latin typeface="Cambria Math" charset="0"/>
+                                <a:ea typeface="Cambria Math" charset="0"/>
+                                <a:cs typeface="Cambria Math" charset="0"/>
+                              </a:rPr>
+                            </m:ctrlPr>
+                          </m:dPr>
+                          <m:e>
+                            <m:r>
+                              <a:rPr lang="en-US" sz="4900" b="0" i="0" smtClean="0">
+                                <a:latin typeface="Cambria Math" charset="0"/>
+                                <a:ea typeface="Cambria Math" charset="0"/>
+                                <a:cs typeface="Cambria Math" charset="0"/>
+                              </a:rPr>
+                              <m:t>1+</m:t>
+                            </m:r>
+                            <m:f>
+                              <m:fPr>
+                                <m:ctrlPr>
+                                  <a:rPr lang="mr-IN" sz="4900" b="0" i="1" smtClean="0">
+                                    <a:latin typeface="Cambria Math" charset="0"/>
+                                    <a:ea typeface="Cambria Math" charset="0"/>
+                                    <a:cs typeface="Cambria Math" charset="0"/>
+                                  </a:rPr>
+                                </m:ctrlPr>
+                              </m:fPr>
+                              <m:num>
+                                <m:r>
+                                  <a:rPr lang="en-US" sz="4900" b="0" i="1" smtClean="0">
+                                    <a:latin typeface="Cambria Math" charset="0"/>
+                                    <a:ea typeface="Cambria Math" charset="0"/>
+                                    <a:cs typeface="Cambria Math" charset="0"/>
+                                  </a:rPr>
+                                  <m:t>0.0702</m:t>
+                                </m:r>
+                              </m:num>
+                              <m:den>
+                                <m:r>
+                                  <a:rPr lang="en-US" sz="4900" b="0" i="1" smtClean="0">
+                                    <a:latin typeface="Cambria Math" charset="0"/>
+                                    <a:ea typeface="Cambria Math" charset="0"/>
+                                    <a:cs typeface="Cambria Math" charset="0"/>
+                                  </a:rPr>
+                                  <m:t>12</m:t>
+                                </m:r>
+                              </m:den>
+                            </m:f>
+                          </m:e>
+                        </m:d>
+                        <m:r>
+                          <a:rPr lang="en-US" sz="4900" b="0" i="1" baseline="30000" smtClean="0">
+                            <a:latin typeface="Cambria Math" charset="0"/>
+                            <a:ea typeface="Cambria Math" charset="0"/>
+                            <a:cs typeface="Cambria Math" charset="0"/>
+                          </a:rPr>
+                          <m:t>60</m:t>
+                        </m:r>
+                        <m:r>
+                          <a:rPr lang="en-US" sz="4900" b="0" i="1" smtClean="0">
+                            <a:latin typeface="Cambria Math" charset="0"/>
+                            <a:ea typeface="Cambria Math" charset="0"/>
+                            <a:cs typeface="Cambria Math" charset="0"/>
+                          </a:rPr>
+                          <m:t> </m:t>
+                        </m:r>
+                      </m:num>
+                      <m:den>
+                        <m:d>
+                          <m:dPr>
+                            <m:ctrlPr>
+                              <a:rPr lang="en-US" sz="4900" b="0" i="1" smtClean="0">
+                                <a:latin typeface="Cambria Math" charset="0"/>
+                                <a:ea typeface="Cambria Math" charset="0"/>
+                                <a:cs typeface="Cambria Math" charset="0"/>
+                              </a:rPr>
+                            </m:ctrlPr>
+                          </m:dPr>
+                          <m:e>
+                            <m:r>
+                              <a:rPr lang="en-US" sz="4900" b="0" i="0" smtClean="0">
+                                <a:latin typeface="Cambria Math" charset="0"/>
+                                <a:ea typeface="Cambria Math" charset="0"/>
+                                <a:cs typeface="Cambria Math" charset="0"/>
+                              </a:rPr>
+                              <m:t>1+</m:t>
+                            </m:r>
+                            <m:f>
+                              <m:fPr>
+                                <m:ctrlPr>
+                                  <a:rPr lang="mr-IN" sz="4900" b="0" i="1" smtClean="0">
+                                    <a:latin typeface="Cambria Math" charset="0"/>
+                                    <a:ea typeface="Cambria Math" charset="0"/>
+                                    <a:cs typeface="Cambria Math" charset="0"/>
+                                  </a:rPr>
+                                </m:ctrlPr>
+                              </m:fPr>
+                              <m:num>
+                                <m:r>
+                                  <a:rPr lang="en-US" sz="4900" b="0" i="1" smtClean="0">
+                                    <a:latin typeface="Cambria Math" charset="0"/>
+                                    <a:ea typeface="Cambria Math" charset="0"/>
+                                    <a:cs typeface="Cambria Math" charset="0"/>
+                                  </a:rPr>
+                                  <m:t>0.0702</m:t>
+                                </m:r>
+                              </m:num>
+                              <m:den>
+                                <m:r>
+                                  <a:rPr lang="en-US" sz="4900" b="0" i="1" smtClean="0">
+                                    <a:latin typeface="Cambria Math" charset="0"/>
+                                    <a:ea typeface="Cambria Math" charset="0"/>
+                                    <a:cs typeface="Cambria Math" charset="0"/>
+                                  </a:rPr>
+                                  <m:t>12</m:t>
+                                </m:r>
+                              </m:den>
+                            </m:f>
+                          </m:e>
+                        </m:d>
+                        <m:r>
+                          <a:rPr lang="en-US" sz="4900" b="0" i="1" baseline="30000" smtClean="0">
+                            <a:latin typeface="Cambria Math" charset="0"/>
+                            <a:ea typeface="Cambria Math" charset="0"/>
+                            <a:cs typeface="Cambria Math" charset="0"/>
+                          </a:rPr>
+                          <m:t>60</m:t>
+                        </m:r>
+                        <m:r>
+                          <a:rPr lang="en-US" sz="4900" b="0" i="1" smtClean="0">
+                            <a:latin typeface="Cambria Math" charset="0"/>
+                            <a:ea typeface="Cambria Math" charset="0"/>
+                            <a:cs typeface="Cambria Math" charset="0"/>
+                          </a:rPr>
+                          <m:t>−1</m:t>
+                        </m:r>
+                      </m:den>
+                    </m:f>
+                  </m:oMath>
+                </a14:m>
+                <a:r>
+                  <a:rPr lang="en-US" sz="4900" dirty="0" smtClean="0">
+                    <a:latin typeface="Cambria Math" charset="0"/>
+                    <a:ea typeface="Cambria Math" charset="0"/>
+                    <a:cs typeface="Cambria Math" charset="0"/>
+                  </a:rPr>
+                  <a:t> = $662.64</a:t>
+                </a:r>
+              </a:p>
+            </p:txBody>
+          </p:sp>
+        </mc:Choice>
+        <mc:Fallback>
+          <p:sp>
+            <p:nvSpPr>
+              <p:cNvPr id="9" name="TextBox 8"/>
+              <p:cNvSpPr txBox="1">
+                <a:spLocks noRot="1" noChangeAspect="1" noMove="1" noResize="1" noEditPoints="1" noAdjustHandles="1" noChangeArrowheads="1" noChangeShapeType="1" noTextEdit="1"/>
+              </p:cNvSpPr>
+              <p:nvPr/>
+            </p:nvSpPr>
+            <p:spPr>
+              <a:xfrm>
+                <a:off x="-498189" y="4343820"/>
+                <a:ext cx="12366339" cy="1819985"/>
+              </a:xfrm>
+              <a:prstGeom prst="rect">
+                <a:avLst/>
+              </a:prstGeom>
+              <a:blipFill rotWithShape="0">
+                <a:blip r:embed="rId3"/>
+                <a:stretch>
+                  <a:fillRect r="-1774"/>
+                </a:stretch>
+              </a:blipFill>
+            </p:spPr>
+            <p:txBody>
+              <a:bodyPr/>
+              <a:lstStyle/>
+              <a:p>
+                <a:r>
+                  <a:rPr lang="en-US">
+                    <a:noFill/>
+                  </a:rPr>
+                  <a:t> </a:t>
+                </a:r>
+              </a:p>
+            </p:txBody>
+          </p:sp>
+        </mc:Fallback>
+      </mc:AlternateContent>
+      <p:pic>
+        <p:nvPicPr>
+          <p:cNvPr id="4" name="Picture 3"/>
+          <p:cNvPicPr>
+            <a:picLocks noChangeAspect="1"/>
+          </p:cNvPicPr>
+          <p:nvPr/>
+        </p:nvPicPr>
+        <p:blipFill>
+          <a:blip r:embed="rId4">
+            <a:extLst>
+              <a:ext uri="{28A0092B-C50C-407E-A947-70E740481C1C}">
+                <a14:useLocalDpi xmlns:a14="http://schemas.microsoft.com/office/drawing/2010/main" val="0"/>
+              </a:ext>
+            </a:extLst>
+          </a:blip>
+          <a:stretch>
+            <a:fillRect/>
+          </a:stretch>
+        </p:blipFill>
+        <p:spPr>
+          <a:xfrm>
+            <a:off x="6643730" y="995433"/>
+            <a:ext cx="5224420" cy="2561389"/>
+          </a:xfrm>
+          <a:prstGeom prst="rect">
+            <a:avLst/>
+          </a:prstGeom>
+        </p:spPr>
+      </p:pic>
     </p:spTree>
     <p:extLst>
       <p:ext uri="{BB962C8B-B14F-4D97-AF65-F5344CB8AC3E}">
@@ -4222,20 +4207,20 @@
       </p:grpSpPr>
       <p:grpSp>
         <p:nvGrpSpPr>
-          <p:cNvPr id="4" name="Group 3"/>
+          <p:cNvPr id="5" name="Group 4"/>
           <p:cNvGrpSpPr/>
           <p:nvPr/>
         </p:nvGrpSpPr>
         <p:grpSpPr>
           <a:xfrm>
             <a:off x="-707739" y="-74652"/>
-            <a:ext cx="14035082" cy="5639190"/>
+            <a:ext cx="14745192" cy="5639190"/>
             <a:chOff x="-707739" y="-74652"/>
-            <a:chExt cx="14035082" cy="5639190"/>
+            <a:chExt cx="14745192" cy="5639190"/>
           </a:xfrm>
         </p:grpSpPr>
-        <mc:AlternateContent xmlns:mc="http://schemas.openxmlformats.org/markup-compatibility/2006" xmlns:a14="http://schemas.microsoft.com/office/drawing/2010/main">
-          <mc:Choice Requires="a14">
+        <mc:AlternateContent xmlns:mc="http://schemas.openxmlformats.org/markup-compatibility/2006">
+          <mc:Choice xmlns:a14="http://schemas.microsoft.com/office/drawing/2010/main" Requires="a14">
             <p:sp>
               <p:nvSpPr>
                 <p:cNvPr id="6" name="TextBox 5"/>
@@ -4418,7 +4403,7 @@
               </p:txBody>
             </p:sp>
           </mc:Choice>
-          <mc:Fallback xmlns="">
+          <mc:Fallback>
             <p:sp>
               <p:nvSpPr>
                 <p:cNvPr id="6" name="TextBox 5"/>
@@ -4547,8 +4532,8 @@
             </a:p>
           </p:txBody>
         </p:sp>
-        <mc:AlternateContent xmlns:mc="http://schemas.openxmlformats.org/markup-compatibility/2006" xmlns:a14="http://schemas.microsoft.com/office/drawing/2010/main">
-          <mc:Choice Requires="a14">
+        <mc:AlternateContent xmlns:mc="http://schemas.openxmlformats.org/markup-compatibility/2006">
+          <mc:Choice xmlns:a14="http://schemas.microsoft.com/office/drawing/2010/main" Requires="a14">
             <p:sp>
               <p:nvSpPr>
                 <p:cNvPr id="10" name="TextBox 9"/>
@@ -4823,7 +4808,7 @@
               </p:txBody>
             </p:sp>
           </mc:Choice>
-          <mc:Fallback xmlns="">
+          <mc:Fallback>
             <p:sp>
               <p:nvSpPr>
                 <p:cNvPr id="10" name="TextBox 9"/>
@@ -4864,7 +4849,7 @@
         </mc:AlternateContent>
         <p:pic>
           <p:nvPicPr>
-            <p:cNvPr id="3" name="Picture 2"/>
+            <p:cNvPr id="2" name="Picture 1"/>
             <p:cNvPicPr>
               <a:picLocks noChangeAspect="1"/>
             </p:cNvPicPr>
@@ -4884,8 +4869,8 @@
           </p:blipFill>
           <p:spPr>
             <a:xfrm>
-              <a:off x="7301004" y="768278"/>
-              <a:ext cx="6026339" cy="2505456"/>
+              <a:off x="6645561" y="995433"/>
+              <a:ext cx="7391892" cy="2560320"/>
             </a:xfrm>
             <a:prstGeom prst="rect">
               <a:avLst/>
@@ -5820,8 +5805,8 @@
             </a:p>
           </p:txBody>
         </p:sp>
-        <mc:AlternateContent xmlns:mc="http://schemas.openxmlformats.org/markup-compatibility/2006">
-          <mc:Choice xmlns:a14="http://schemas.microsoft.com/office/drawing/2010/main" Requires="a14">
+        <mc:AlternateContent xmlns:mc="http://schemas.openxmlformats.org/markup-compatibility/2006" xmlns:a14="http://schemas.microsoft.com/office/drawing/2010/main">
+          <mc:Choice Requires="a14">
             <p:sp>
               <p:nvSpPr>
                 <p:cNvPr id="9" name="TextBox 8"/>
@@ -6052,21 +6037,13 @@
                       <a:ea typeface="Cambria Math" charset="0"/>
                       <a:cs typeface="Cambria Math" charset="0"/>
                     </a:rPr>
-                    <a:t>=$</a:t>
-                  </a:r>
-                  <a:r>
-                    <a:rPr lang="en-US" sz="3200" dirty="0" smtClean="0">
-                      <a:latin typeface="Cambria Math" charset="0"/>
-                      <a:ea typeface="Cambria Math" charset="0"/>
-                      <a:cs typeface="Cambria Math" charset="0"/>
-                    </a:rPr>
-                    <a:t>687.23</a:t>
+                    <a:t>=$687.23</a:t>
                   </a:r>
                 </a:p>
               </p:txBody>
             </p:sp>
           </mc:Choice>
-          <mc:Fallback>
+          <mc:Fallback xmlns="">
             <p:sp>
               <p:nvSpPr>
                 <p:cNvPr id="9" name="TextBox 8"/>
@@ -6139,8 +6116,8 @@
             </a:p>
           </p:txBody>
         </p:sp>
-        <mc:AlternateContent xmlns:mc="http://schemas.openxmlformats.org/markup-compatibility/2006">
-          <mc:Choice xmlns:a14="http://schemas.microsoft.com/office/drawing/2010/main" Requires="a14">
+        <mc:AlternateContent xmlns:mc="http://schemas.openxmlformats.org/markup-compatibility/2006" xmlns:a14="http://schemas.microsoft.com/office/drawing/2010/main">
+          <mc:Choice Requires="a14">
             <p:sp>
               <p:nvSpPr>
                 <p:cNvPr id="12" name="TextBox 11"/>
@@ -6377,7 +6354,7 @@
               </p:txBody>
             </p:sp>
           </mc:Choice>
-          <mc:Fallback>
+          <mc:Fallback xmlns="">
             <p:sp>
               <p:nvSpPr>
                 <p:cNvPr id="12" name="TextBox 11"/>
@@ -6416,8 +6393,8 @@
             </p:sp>
           </mc:Fallback>
         </mc:AlternateContent>
-        <mc:AlternateContent xmlns:mc="http://schemas.openxmlformats.org/markup-compatibility/2006">
-          <mc:Choice xmlns:a14="http://schemas.microsoft.com/office/drawing/2010/main" Requires="a14">
+        <mc:AlternateContent xmlns:mc="http://schemas.openxmlformats.org/markup-compatibility/2006" xmlns:a14="http://schemas.microsoft.com/office/drawing/2010/main">
+          <mc:Choice Requires="a14">
             <p:sp>
               <p:nvSpPr>
                 <p:cNvPr id="13" name="TextBox 12"/>
@@ -6600,7 +6577,7 @@
               </p:txBody>
             </p:sp>
           </mc:Choice>
-          <mc:Fallback>
+          <mc:Fallback xmlns="">
             <p:sp>
               <p:nvSpPr>
                 <p:cNvPr id="13" name="TextBox 12"/>
@@ -6639,8 +6616,8 @@
             </p:sp>
           </mc:Fallback>
         </mc:AlternateContent>
-        <mc:AlternateContent xmlns:mc="http://schemas.openxmlformats.org/markup-compatibility/2006">
-          <mc:Choice xmlns:a14="http://schemas.microsoft.com/office/drawing/2010/main" Requires="a14">
+        <mc:AlternateContent xmlns:mc="http://schemas.openxmlformats.org/markup-compatibility/2006" xmlns:a14="http://schemas.microsoft.com/office/drawing/2010/main">
+          <mc:Choice Requires="a14">
             <p:sp>
               <p:nvSpPr>
                 <p:cNvPr id="14" name="Rectangle 13"/>
@@ -6705,7 +6682,7 @@
               </p:txBody>
             </p:sp>
           </mc:Choice>
-          <mc:Fallback>
+          <mc:Fallback xmlns="">
             <p:sp>
               <p:nvSpPr>
                 <p:cNvPr id="14" name="Rectangle 13"/>

</xml_diff>